<commit_message>
FE : Order and Troncon refactor + validation rules on Signature
</commit_message>
<xml_diff>
--- a/Design.pptx
+++ b/Design.pptx
@@ -104,6 +104,11 @@
       </a:defRPr>
     </a:lvl9pPr>
   </p:defaultTextStyle>
+  <p:extLst>
+    <p:ext uri="{EFAFB233-063F-42B5-8137-9DF3F51BA10A}">
+      <p15:sldGuideLst xmlns:p15="http://schemas.microsoft.com/office/powerpoint/2012/main"/>
+    </p:ext>
+  </p:extLst>
 </p:presentation>
 </file>
 
@@ -254,7 +259,7 @@
           <a:p>
             <a:fld id="{3E4F7BE1-B4D8-464A-B5E4-E95C61BD2B05}" type="datetimeFigureOut">
               <a:rPr lang="fr-FR" smtClean="0"/>
-              <a:t>27/12/2018</a:t>
+              <a:t>28/12/2018</a:t>
             </a:fld>
             <a:endParaRPr lang="fr-FR"/>
           </a:p>
@@ -452,7 +457,7 @@
           <a:p>
             <a:fld id="{3E4F7BE1-B4D8-464A-B5E4-E95C61BD2B05}" type="datetimeFigureOut">
               <a:rPr lang="fr-FR" smtClean="0"/>
-              <a:t>27/12/2018</a:t>
+              <a:t>28/12/2018</a:t>
             </a:fld>
             <a:endParaRPr lang="fr-FR"/>
           </a:p>
@@ -660,7 +665,7 @@
           <a:p>
             <a:fld id="{3E4F7BE1-B4D8-464A-B5E4-E95C61BD2B05}" type="datetimeFigureOut">
               <a:rPr lang="fr-FR" smtClean="0"/>
-              <a:t>27/12/2018</a:t>
+              <a:t>28/12/2018</a:t>
             </a:fld>
             <a:endParaRPr lang="fr-FR"/>
           </a:p>
@@ -858,7 +863,7 @@
           <a:p>
             <a:fld id="{3E4F7BE1-B4D8-464A-B5E4-E95C61BD2B05}" type="datetimeFigureOut">
               <a:rPr lang="fr-FR" smtClean="0"/>
-              <a:t>27/12/2018</a:t>
+              <a:t>28/12/2018</a:t>
             </a:fld>
             <a:endParaRPr lang="fr-FR"/>
           </a:p>
@@ -1133,7 +1138,7 @@
           <a:p>
             <a:fld id="{3E4F7BE1-B4D8-464A-B5E4-E95C61BD2B05}" type="datetimeFigureOut">
               <a:rPr lang="fr-FR" smtClean="0"/>
-              <a:t>27/12/2018</a:t>
+              <a:t>28/12/2018</a:t>
             </a:fld>
             <a:endParaRPr lang="fr-FR"/>
           </a:p>
@@ -1398,7 +1403,7 @@
           <a:p>
             <a:fld id="{3E4F7BE1-B4D8-464A-B5E4-E95C61BD2B05}" type="datetimeFigureOut">
               <a:rPr lang="fr-FR" smtClean="0"/>
-              <a:t>27/12/2018</a:t>
+              <a:t>28/12/2018</a:t>
             </a:fld>
             <a:endParaRPr lang="fr-FR"/>
           </a:p>
@@ -1810,7 +1815,7 @@
           <a:p>
             <a:fld id="{3E4F7BE1-B4D8-464A-B5E4-E95C61BD2B05}" type="datetimeFigureOut">
               <a:rPr lang="fr-FR" smtClean="0"/>
-              <a:t>27/12/2018</a:t>
+              <a:t>28/12/2018</a:t>
             </a:fld>
             <a:endParaRPr lang="fr-FR"/>
           </a:p>
@@ -1951,7 +1956,7 @@
           <a:p>
             <a:fld id="{3E4F7BE1-B4D8-464A-B5E4-E95C61BD2B05}" type="datetimeFigureOut">
               <a:rPr lang="fr-FR" smtClean="0"/>
-              <a:t>27/12/2018</a:t>
+              <a:t>28/12/2018</a:t>
             </a:fld>
             <a:endParaRPr lang="fr-FR"/>
           </a:p>
@@ -2064,7 +2069,7 @@
           <a:p>
             <a:fld id="{3E4F7BE1-B4D8-464A-B5E4-E95C61BD2B05}" type="datetimeFigureOut">
               <a:rPr lang="fr-FR" smtClean="0"/>
-              <a:t>27/12/2018</a:t>
+              <a:t>28/12/2018</a:t>
             </a:fld>
             <a:endParaRPr lang="fr-FR"/>
           </a:p>
@@ -2375,7 +2380,7 @@
           <a:p>
             <a:fld id="{3E4F7BE1-B4D8-464A-B5E4-E95C61BD2B05}" type="datetimeFigureOut">
               <a:rPr lang="fr-FR" smtClean="0"/>
-              <a:t>27/12/2018</a:t>
+              <a:t>28/12/2018</a:t>
             </a:fld>
             <a:endParaRPr lang="fr-FR"/>
           </a:p>
@@ -2663,7 +2668,7 @@
           <a:p>
             <a:fld id="{3E4F7BE1-B4D8-464A-B5E4-E95C61BD2B05}" type="datetimeFigureOut">
               <a:rPr lang="fr-FR" smtClean="0"/>
-              <a:t>27/12/2018</a:t>
+              <a:t>28/12/2018</a:t>
             </a:fld>
             <a:endParaRPr lang="fr-FR"/>
           </a:p>
@@ -2904,7 +2909,7 @@
           <a:p>
             <a:fld id="{3E4F7BE1-B4D8-464A-B5E4-E95C61BD2B05}" type="datetimeFigureOut">
               <a:rPr lang="fr-FR" smtClean="0"/>
-              <a:t>27/12/2018</a:t>
+              <a:t>28/12/2018</a:t>
             </a:fld>
             <a:endParaRPr lang="fr-FR"/>
           </a:p>
@@ -4654,6 +4659,293 @@
           </a:p>
         </p:txBody>
       </p:sp>
+      <p:graphicFrame>
+        <p:nvGraphicFramePr>
+          <p:cNvPr id="2" name="Tableau 1">
+            <a:extLst>
+              <a:ext uri="{FF2B5EF4-FFF2-40B4-BE49-F238E27FC236}">
+                <a16:creationId xmlns:a16="http://schemas.microsoft.com/office/drawing/2014/main" id="{357FCADB-0F98-4B0A-9E0A-4B3AFCBF1A6F}"/>
+              </a:ext>
+            </a:extLst>
+          </p:cNvPr>
+          <p:cNvGraphicFramePr>
+            <a:graphicFrameLocks noGrp="1"/>
+          </p:cNvGraphicFramePr>
+          <p:nvPr>
+            <p:extLst>
+              <p:ext uri="{D42A27DB-BD31-4B8C-83A1-F6EECF244321}">
+                <p14:modId xmlns:p14="http://schemas.microsoft.com/office/powerpoint/2010/main" val="1148199509"/>
+              </p:ext>
+            </p:extLst>
+          </p:nvPr>
+        </p:nvGraphicFramePr>
+        <p:xfrm>
+          <a:off x="2032000" y="719666"/>
+          <a:ext cx="8127999" cy="1854200"/>
+        </p:xfrm>
+        <a:graphic>
+          <a:graphicData uri="http://schemas.openxmlformats.org/drawingml/2006/table">
+            <a:tbl>
+              <a:tblPr firstRow="1" bandRow="1">
+                <a:tableStyleId>{5C22544A-7EE6-4342-B048-85BDC9FD1C3A}</a:tableStyleId>
+              </a:tblPr>
+              <a:tblGrid>
+                <a:gridCol w="2709333">
+                  <a:extLst>
+                    <a:ext uri="{9D8B030D-6E8A-4147-A177-3AD203B41FA5}">
+                      <a16:colId xmlns:a16="http://schemas.microsoft.com/office/drawing/2014/main" val="3687413721"/>
+                    </a:ext>
+                  </a:extLst>
+                </a:gridCol>
+                <a:gridCol w="2709333">
+                  <a:extLst>
+                    <a:ext uri="{9D8B030D-6E8A-4147-A177-3AD203B41FA5}">
+                      <a16:colId xmlns:a16="http://schemas.microsoft.com/office/drawing/2014/main" val="1960617149"/>
+                    </a:ext>
+                  </a:extLst>
+                </a:gridCol>
+                <a:gridCol w="2709333">
+                  <a:extLst>
+                    <a:ext uri="{9D8B030D-6E8A-4147-A177-3AD203B41FA5}">
+                      <a16:colId xmlns:a16="http://schemas.microsoft.com/office/drawing/2014/main" val="2108856536"/>
+                    </a:ext>
+                  </a:extLst>
+                </a:gridCol>
+              </a:tblGrid>
+              <a:tr h="370840">
+                <a:tc>
+                  <a:txBody>
+                    <a:bodyPr/>
+                    <a:lstStyle/>
+                    <a:p>
+                      <a:r>
+                        <a:rPr lang="fr-FR" dirty="0"/>
+                        <a:t>Signature demandée</a:t>
+                      </a:r>
+                    </a:p>
+                  </a:txBody>
+                  <a:tcPr/>
+                </a:tc>
+                <a:tc>
+                  <a:txBody>
+                    <a:bodyPr/>
+                    <a:lstStyle/>
+                    <a:p>
+                      <a:r>
+                        <a:rPr lang="fr-FR" dirty="0"/>
+                        <a:t>Signature obtenu</a:t>
+                      </a:r>
+                    </a:p>
+                  </a:txBody>
+                  <a:tcPr/>
+                </a:tc>
+                <a:tc>
+                  <a:txBody>
+                    <a:bodyPr/>
+                    <a:lstStyle/>
+                    <a:p>
+                      <a:r>
+                        <a:rPr lang="fr-FR" dirty="0"/>
+                        <a:t>Blocage désactivé</a:t>
+                      </a:r>
+                    </a:p>
+                  </a:txBody>
+                  <a:tcPr/>
+                </a:tc>
+                <a:extLst>
+                  <a:ext uri="{0D108BD9-81ED-4DB2-BD59-A6C34878D82A}">
+                    <a16:rowId xmlns:a16="http://schemas.microsoft.com/office/drawing/2014/main" val="3156101132"/>
+                  </a:ext>
+                </a:extLst>
+              </a:tr>
+              <a:tr h="370840">
+                <a:tc>
+                  <a:txBody>
+                    <a:bodyPr/>
+                    <a:lstStyle/>
+                    <a:p>
+                      <a:r>
+                        <a:rPr lang="fr-FR" dirty="0"/>
+                        <a:t>Non</a:t>
+                      </a:r>
+                    </a:p>
+                  </a:txBody>
+                  <a:tcPr/>
+                </a:tc>
+                <a:tc>
+                  <a:txBody>
+                    <a:bodyPr/>
+                    <a:lstStyle/>
+                    <a:p>
+                      <a:r>
+                        <a:rPr lang="fr-FR" dirty="0"/>
+                        <a:t>Non</a:t>
+                      </a:r>
+                    </a:p>
+                  </a:txBody>
+                  <a:tcPr/>
+                </a:tc>
+                <a:tc>
+                  <a:txBody>
+                    <a:bodyPr/>
+                    <a:lstStyle/>
+                    <a:p>
+                      <a:r>
+                        <a:rPr lang="fr-FR" dirty="0"/>
+                        <a:t>Non</a:t>
+                      </a:r>
+                    </a:p>
+                  </a:txBody>
+                  <a:tcPr/>
+                </a:tc>
+                <a:extLst>
+                  <a:ext uri="{0D108BD9-81ED-4DB2-BD59-A6C34878D82A}">
+                    <a16:rowId xmlns:a16="http://schemas.microsoft.com/office/drawing/2014/main" val="1759850170"/>
+                  </a:ext>
+                </a:extLst>
+              </a:tr>
+              <a:tr h="370840">
+                <a:tc>
+                  <a:txBody>
+                    <a:bodyPr/>
+                    <a:lstStyle/>
+                    <a:p>
+                      <a:r>
+                        <a:rPr lang="fr-FR" dirty="0"/>
+                        <a:t>Non</a:t>
+                      </a:r>
+                    </a:p>
+                  </a:txBody>
+                  <a:tcPr/>
+                </a:tc>
+                <a:tc>
+                  <a:txBody>
+                    <a:bodyPr/>
+                    <a:lstStyle/>
+                    <a:p>
+                      <a:r>
+                        <a:rPr lang="fr-FR" dirty="0"/>
+                        <a:t>Oui</a:t>
+                      </a:r>
+                    </a:p>
+                  </a:txBody>
+                  <a:tcPr/>
+                </a:tc>
+                <a:tc>
+                  <a:txBody>
+                    <a:bodyPr/>
+                    <a:lstStyle/>
+                    <a:p>
+                      <a:r>
+                        <a:rPr lang="fr-FR" dirty="0"/>
+                        <a:t>Non</a:t>
+                      </a:r>
+                    </a:p>
+                  </a:txBody>
+                  <a:tcPr/>
+                </a:tc>
+                <a:extLst>
+                  <a:ext uri="{0D108BD9-81ED-4DB2-BD59-A6C34878D82A}">
+                    <a16:rowId xmlns:a16="http://schemas.microsoft.com/office/drawing/2014/main" val="1959083968"/>
+                  </a:ext>
+                </a:extLst>
+              </a:tr>
+              <a:tr h="370840">
+                <a:tc>
+                  <a:txBody>
+                    <a:bodyPr/>
+                    <a:lstStyle/>
+                    <a:p>
+                      <a:r>
+                        <a:rPr lang="fr-FR" dirty="0"/>
+                        <a:t>Oui</a:t>
+                      </a:r>
+                    </a:p>
+                  </a:txBody>
+                  <a:tcPr/>
+                </a:tc>
+                <a:tc>
+                  <a:txBody>
+                    <a:bodyPr/>
+                    <a:lstStyle/>
+                    <a:p>
+                      <a:r>
+                        <a:rPr lang="fr-FR" dirty="0"/>
+                        <a:t>Non</a:t>
+                      </a:r>
+                    </a:p>
+                  </a:txBody>
+                  <a:tcPr/>
+                </a:tc>
+                <a:tc>
+                  <a:txBody>
+                    <a:bodyPr/>
+                    <a:lstStyle/>
+                    <a:p>
+                      <a:r>
+                        <a:rPr lang="fr-FR" dirty="0"/>
+                        <a:t>Oui</a:t>
+                      </a:r>
+                    </a:p>
+                  </a:txBody>
+                  <a:tcPr/>
+                </a:tc>
+                <a:extLst>
+                  <a:ext uri="{0D108BD9-81ED-4DB2-BD59-A6C34878D82A}">
+                    <a16:rowId xmlns:a16="http://schemas.microsoft.com/office/drawing/2014/main" val="488480734"/>
+                  </a:ext>
+                </a:extLst>
+              </a:tr>
+              <a:tr h="370840">
+                <a:tc>
+                  <a:txBody>
+                    <a:bodyPr/>
+                    <a:lstStyle/>
+                    <a:p>
+                      <a:r>
+                        <a:rPr lang="fr-FR" dirty="0"/>
+                        <a:t>Oui</a:t>
+                      </a:r>
+                    </a:p>
+                  </a:txBody>
+                  <a:tcPr/>
+                </a:tc>
+                <a:tc>
+                  <a:txBody>
+                    <a:bodyPr/>
+                    <a:lstStyle/>
+                    <a:p>
+                      <a:r>
+                        <a:rPr lang="fr-FR" dirty="0"/>
+                        <a:t>Oui</a:t>
+                      </a:r>
+                    </a:p>
+                  </a:txBody>
+                  <a:tcPr/>
+                </a:tc>
+                <a:tc>
+                  <a:txBody>
+                    <a:bodyPr/>
+                    <a:lstStyle/>
+                    <a:p>
+                      <a:r>
+                        <a:rPr lang="fr-FR" dirty="0"/>
+                        <a:t>Non</a:t>
+                      </a:r>
+                    </a:p>
+                  </a:txBody>
+                  <a:tcPr/>
+                </a:tc>
+                <a:extLst>
+                  <a:ext uri="{0D108BD9-81ED-4DB2-BD59-A6C34878D82A}">
+                    <a16:rowId xmlns:a16="http://schemas.microsoft.com/office/drawing/2014/main" val="6665161"/>
+                  </a:ext>
+                </a:extLst>
+              </a:tr>
+            </a:tbl>
+          </a:graphicData>
+        </a:graphic>
+      </p:graphicFrame>
     </p:spTree>
     <p:extLst>
       <p:ext uri="{BB962C8B-B14F-4D97-AF65-F5344CB8AC3E}">

</xml_diff>

<commit_message>
FE : Improve Order + TronconEdit
</commit_message>
<xml_diff>
--- a/Design.pptx
+++ b/Design.pptx
@@ -6,6 +6,7 @@
   </p:sldMasterIdLst>
   <p:sldIdLst>
     <p:sldId id="256" r:id="rId2"/>
+    <p:sldId id="257" r:id="rId3"/>
   </p:sldIdLst>
   <p:sldSz cx="12192000" cy="6858000"/>
   <p:notesSz cx="6858000" cy="9144000"/>
@@ -259,7 +260,7 @@
           <a:p>
             <a:fld id="{3E4F7BE1-B4D8-464A-B5E4-E95C61BD2B05}" type="datetimeFigureOut">
               <a:rPr lang="fr-FR" smtClean="0"/>
-              <a:t>28/12/2018</a:t>
+              <a:t>31/12/2018</a:t>
             </a:fld>
             <a:endParaRPr lang="fr-FR"/>
           </a:p>
@@ -457,7 +458,7 @@
           <a:p>
             <a:fld id="{3E4F7BE1-B4D8-464A-B5E4-E95C61BD2B05}" type="datetimeFigureOut">
               <a:rPr lang="fr-FR" smtClean="0"/>
-              <a:t>28/12/2018</a:t>
+              <a:t>31/12/2018</a:t>
             </a:fld>
             <a:endParaRPr lang="fr-FR"/>
           </a:p>
@@ -665,7 +666,7 @@
           <a:p>
             <a:fld id="{3E4F7BE1-B4D8-464A-B5E4-E95C61BD2B05}" type="datetimeFigureOut">
               <a:rPr lang="fr-FR" smtClean="0"/>
-              <a:t>28/12/2018</a:t>
+              <a:t>31/12/2018</a:t>
             </a:fld>
             <a:endParaRPr lang="fr-FR"/>
           </a:p>
@@ -863,7 +864,7 @@
           <a:p>
             <a:fld id="{3E4F7BE1-B4D8-464A-B5E4-E95C61BD2B05}" type="datetimeFigureOut">
               <a:rPr lang="fr-FR" smtClean="0"/>
-              <a:t>28/12/2018</a:t>
+              <a:t>31/12/2018</a:t>
             </a:fld>
             <a:endParaRPr lang="fr-FR"/>
           </a:p>
@@ -1138,7 +1139,7 @@
           <a:p>
             <a:fld id="{3E4F7BE1-B4D8-464A-B5E4-E95C61BD2B05}" type="datetimeFigureOut">
               <a:rPr lang="fr-FR" smtClean="0"/>
-              <a:t>28/12/2018</a:t>
+              <a:t>31/12/2018</a:t>
             </a:fld>
             <a:endParaRPr lang="fr-FR"/>
           </a:p>
@@ -1403,7 +1404,7 @@
           <a:p>
             <a:fld id="{3E4F7BE1-B4D8-464A-B5E4-E95C61BD2B05}" type="datetimeFigureOut">
               <a:rPr lang="fr-FR" smtClean="0"/>
-              <a:t>28/12/2018</a:t>
+              <a:t>31/12/2018</a:t>
             </a:fld>
             <a:endParaRPr lang="fr-FR"/>
           </a:p>
@@ -1815,7 +1816,7 @@
           <a:p>
             <a:fld id="{3E4F7BE1-B4D8-464A-B5E4-E95C61BD2B05}" type="datetimeFigureOut">
               <a:rPr lang="fr-FR" smtClean="0"/>
-              <a:t>28/12/2018</a:t>
+              <a:t>31/12/2018</a:t>
             </a:fld>
             <a:endParaRPr lang="fr-FR"/>
           </a:p>
@@ -1956,7 +1957,7 @@
           <a:p>
             <a:fld id="{3E4F7BE1-B4D8-464A-B5E4-E95C61BD2B05}" type="datetimeFigureOut">
               <a:rPr lang="fr-FR" smtClean="0"/>
-              <a:t>28/12/2018</a:t>
+              <a:t>31/12/2018</a:t>
             </a:fld>
             <a:endParaRPr lang="fr-FR"/>
           </a:p>
@@ -2069,7 +2070,7 @@
           <a:p>
             <a:fld id="{3E4F7BE1-B4D8-464A-B5E4-E95C61BD2B05}" type="datetimeFigureOut">
               <a:rPr lang="fr-FR" smtClean="0"/>
-              <a:t>28/12/2018</a:t>
+              <a:t>31/12/2018</a:t>
             </a:fld>
             <a:endParaRPr lang="fr-FR"/>
           </a:p>
@@ -2380,7 +2381,7 @@
           <a:p>
             <a:fld id="{3E4F7BE1-B4D8-464A-B5E4-E95C61BD2B05}" type="datetimeFigureOut">
               <a:rPr lang="fr-FR" smtClean="0"/>
-              <a:t>28/12/2018</a:t>
+              <a:t>31/12/2018</a:t>
             </a:fld>
             <a:endParaRPr lang="fr-FR"/>
           </a:p>
@@ -2668,7 +2669,7 @@
           <a:p>
             <a:fld id="{3E4F7BE1-B4D8-464A-B5E4-E95C61BD2B05}" type="datetimeFigureOut">
               <a:rPr lang="fr-FR" smtClean="0"/>
-              <a:t>28/12/2018</a:t>
+              <a:t>31/12/2018</a:t>
             </a:fld>
             <a:endParaRPr lang="fr-FR"/>
           </a:p>
@@ -2909,7 +2910,7 @@
           <a:p>
             <a:fld id="{3E4F7BE1-B4D8-464A-B5E4-E95C61BD2B05}" type="datetimeFigureOut">
               <a:rPr lang="fr-FR" smtClean="0"/>
-              <a:t>28/12/2018</a:t>
+              <a:t>31/12/2018</a:t>
             </a:fld>
             <a:endParaRPr lang="fr-FR"/>
           </a:p>
@@ -4959,6 +4960,3130 @@
 </p:sld>
 </file>
 
+<file path=ppt/slides/slide2.xml><?xml version="1.0" encoding="utf-8"?>
+<p:sld xmlns:a="http://schemas.openxmlformats.org/drawingml/2006/main" xmlns:r="http://schemas.openxmlformats.org/officeDocument/2006/relationships" xmlns:p="http://schemas.openxmlformats.org/presentationml/2006/main">
+  <p:cSld>
+    <p:spTree>
+      <p:nvGrpSpPr>
+        <p:cNvPr id="1" name=""/>
+        <p:cNvGrpSpPr/>
+        <p:nvPr/>
+      </p:nvGrpSpPr>
+      <p:grpSpPr>
+        <a:xfrm>
+          <a:off x="0" y="0"/>
+          <a:ext cx="0" cy="0"/>
+          <a:chOff x="0" y="0"/>
+          <a:chExt cx="0" cy="0"/>
+        </a:xfrm>
+      </p:grpSpPr>
+      <p:graphicFrame>
+        <p:nvGraphicFramePr>
+          <p:cNvPr id="3" name="Tableau 2">
+            <a:extLst>
+              <a:ext uri="{FF2B5EF4-FFF2-40B4-BE49-F238E27FC236}">
+                <a16:creationId xmlns:a16="http://schemas.microsoft.com/office/drawing/2014/main" id="{53F63AFF-25B2-4B56-B75B-C25B2C0E5A59}"/>
+              </a:ext>
+            </a:extLst>
+          </p:cNvPr>
+          <p:cNvGraphicFramePr>
+            <a:graphicFrameLocks noGrp="1"/>
+          </p:cNvGraphicFramePr>
+          <p:nvPr>
+            <p:extLst>
+              <p:ext uri="{D42A27DB-BD31-4B8C-83A1-F6EECF244321}">
+                <p14:modId xmlns:p14="http://schemas.microsoft.com/office/powerpoint/2010/main" val="1105032151"/>
+              </p:ext>
+            </p:extLst>
+          </p:nvPr>
+        </p:nvGraphicFramePr>
+        <p:xfrm>
+          <a:off x="2032002" y="1321646"/>
+          <a:ext cx="8127996" cy="1854200"/>
+        </p:xfrm>
+        <a:graphic>
+          <a:graphicData uri="http://schemas.openxmlformats.org/drawingml/2006/table">
+            <a:tbl>
+              <a:tblPr firstRow="1" bandRow="1">
+                <a:tableStyleId>{5C22544A-7EE6-4342-B048-85BDC9FD1C3A}</a:tableStyleId>
+              </a:tblPr>
+              <a:tblGrid>
+                <a:gridCol w="677333">
+                  <a:extLst>
+                    <a:ext uri="{9D8B030D-6E8A-4147-A177-3AD203B41FA5}">
+                      <a16:colId xmlns:a16="http://schemas.microsoft.com/office/drawing/2014/main" val="4007388370"/>
+                    </a:ext>
+                  </a:extLst>
+                </a:gridCol>
+                <a:gridCol w="677333">
+                  <a:extLst>
+                    <a:ext uri="{9D8B030D-6E8A-4147-A177-3AD203B41FA5}">
+                      <a16:colId xmlns:a16="http://schemas.microsoft.com/office/drawing/2014/main" val="3853247849"/>
+                    </a:ext>
+                  </a:extLst>
+                </a:gridCol>
+                <a:gridCol w="677333">
+                  <a:extLst>
+                    <a:ext uri="{9D8B030D-6E8A-4147-A177-3AD203B41FA5}">
+                      <a16:colId xmlns:a16="http://schemas.microsoft.com/office/drawing/2014/main" val="3811464320"/>
+                    </a:ext>
+                  </a:extLst>
+                </a:gridCol>
+                <a:gridCol w="677333">
+                  <a:extLst>
+                    <a:ext uri="{9D8B030D-6E8A-4147-A177-3AD203B41FA5}">
+                      <a16:colId xmlns:a16="http://schemas.microsoft.com/office/drawing/2014/main" val="701571514"/>
+                    </a:ext>
+                  </a:extLst>
+                </a:gridCol>
+                <a:gridCol w="677333">
+                  <a:extLst>
+                    <a:ext uri="{9D8B030D-6E8A-4147-A177-3AD203B41FA5}">
+                      <a16:colId xmlns:a16="http://schemas.microsoft.com/office/drawing/2014/main" val="2090525235"/>
+                    </a:ext>
+                  </a:extLst>
+                </a:gridCol>
+                <a:gridCol w="677333">
+                  <a:extLst>
+                    <a:ext uri="{9D8B030D-6E8A-4147-A177-3AD203B41FA5}">
+                      <a16:colId xmlns:a16="http://schemas.microsoft.com/office/drawing/2014/main" val="3439850729"/>
+                    </a:ext>
+                  </a:extLst>
+                </a:gridCol>
+                <a:gridCol w="677333">
+                  <a:extLst>
+                    <a:ext uri="{9D8B030D-6E8A-4147-A177-3AD203B41FA5}">
+                      <a16:colId xmlns:a16="http://schemas.microsoft.com/office/drawing/2014/main" val="131470306"/>
+                    </a:ext>
+                  </a:extLst>
+                </a:gridCol>
+                <a:gridCol w="677333">
+                  <a:extLst>
+                    <a:ext uri="{9D8B030D-6E8A-4147-A177-3AD203B41FA5}">
+                      <a16:colId xmlns:a16="http://schemas.microsoft.com/office/drawing/2014/main" val="3361251054"/>
+                    </a:ext>
+                  </a:extLst>
+                </a:gridCol>
+                <a:gridCol w="677333">
+                  <a:extLst>
+                    <a:ext uri="{9D8B030D-6E8A-4147-A177-3AD203B41FA5}">
+                      <a16:colId xmlns:a16="http://schemas.microsoft.com/office/drawing/2014/main" val="1982278795"/>
+                    </a:ext>
+                  </a:extLst>
+                </a:gridCol>
+                <a:gridCol w="677333">
+                  <a:extLst>
+                    <a:ext uri="{9D8B030D-6E8A-4147-A177-3AD203B41FA5}">
+                      <a16:colId xmlns:a16="http://schemas.microsoft.com/office/drawing/2014/main" val="2525089062"/>
+                    </a:ext>
+                  </a:extLst>
+                </a:gridCol>
+                <a:gridCol w="677333">
+                  <a:extLst>
+                    <a:ext uri="{9D8B030D-6E8A-4147-A177-3AD203B41FA5}">
+                      <a16:colId xmlns:a16="http://schemas.microsoft.com/office/drawing/2014/main" val="3767385281"/>
+                    </a:ext>
+                  </a:extLst>
+                </a:gridCol>
+                <a:gridCol w="677333">
+                  <a:extLst>
+                    <a:ext uri="{9D8B030D-6E8A-4147-A177-3AD203B41FA5}">
+                      <a16:colId xmlns:a16="http://schemas.microsoft.com/office/drawing/2014/main" val="2328813377"/>
+                    </a:ext>
+                  </a:extLst>
+                </a:gridCol>
+              </a:tblGrid>
+              <a:tr h="370840">
+                <a:tc>
+                  <a:txBody>
+                    <a:bodyPr/>
+                    <a:lstStyle/>
+                    <a:p>
+                      <a:pPr algn="r"/>
+                      <a:r>
+                        <a:rPr lang="fr-FR" dirty="0"/>
+                        <a:t>2</a:t>
+                      </a:r>
+                    </a:p>
+                  </a:txBody>
+                  <a:tcPr/>
+                </a:tc>
+                <a:tc>
+                  <a:txBody>
+                    <a:bodyPr/>
+                    <a:lstStyle/>
+                    <a:p>
+                      <a:pPr algn="r"/>
+                      <a:r>
+                        <a:rPr lang="fr-FR" dirty="0"/>
+                        <a:t>4</a:t>
+                      </a:r>
+                    </a:p>
+                  </a:txBody>
+                  <a:tcPr/>
+                </a:tc>
+                <a:tc>
+                  <a:txBody>
+                    <a:bodyPr/>
+                    <a:lstStyle/>
+                    <a:p>
+                      <a:pPr algn="r"/>
+                      <a:r>
+                        <a:rPr lang="fr-FR" dirty="0"/>
+                        <a:t>6</a:t>
+                      </a:r>
+                    </a:p>
+                  </a:txBody>
+                  <a:tcPr/>
+                </a:tc>
+                <a:tc>
+                  <a:txBody>
+                    <a:bodyPr/>
+                    <a:lstStyle/>
+                    <a:p>
+                      <a:pPr algn="r"/>
+                      <a:r>
+                        <a:rPr lang="fr-FR" dirty="0"/>
+                        <a:t>8</a:t>
+                      </a:r>
+                    </a:p>
+                  </a:txBody>
+                  <a:tcPr/>
+                </a:tc>
+                <a:tc>
+                  <a:txBody>
+                    <a:bodyPr/>
+                    <a:lstStyle/>
+                    <a:p>
+                      <a:pPr algn="r"/>
+                      <a:r>
+                        <a:rPr lang="fr-FR" dirty="0"/>
+                        <a:t>10</a:t>
+                      </a:r>
+                    </a:p>
+                  </a:txBody>
+                  <a:tcPr/>
+                </a:tc>
+                <a:tc>
+                  <a:txBody>
+                    <a:bodyPr/>
+                    <a:lstStyle/>
+                    <a:p>
+                      <a:pPr algn="r"/>
+                      <a:r>
+                        <a:rPr lang="fr-FR" dirty="0"/>
+                        <a:t>12</a:t>
+                      </a:r>
+                    </a:p>
+                  </a:txBody>
+                  <a:tcPr/>
+                </a:tc>
+                <a:tc>
+                  <a:txBody>
+                    <a:bodyPr/>
+                    <a:lstStyle/>
+                    <a:p>
+                      <a:pPr algn="r"/>
+                      <a:r>
+                        <a:rPr lang="fr-FR" dirty="0"/>
+                        <a:t>14</a:t>
+                      </a:r>
+                    </a:p>
+                  </a:txBody>
+                  <a:tcPr/>
+                </a:tc>
+                <a:tc>
+                  <a:txBody>
+                    <a:bodyPr/>
+                    <a:lstStyle/>
+                    <a:p>
+                      <a:pPr algn="r"/>
+                      <a:r>
+                        <a:rPr lang="fr-FR" dirty="0"/>
+                        <a:t>16</a:t>
+                      </a:r>
+                    </a:p>
+                  </a:txBody>
+                  <a:tcPr/>
+                </a:tc>
+                <a:tc>
+                  <a:txBody>
+                    <a:bodyPr/>
+                    <a:lstStyle/>
+                    <a:p>
+                      <a:pPr algn="r"/>
+                      <a:r>
+                        <a:rPr lang="fr-FR" dirty="0"/>
+                        <a:t>18</a:t>
+                      </a:r>
+                    </a:p>
+                  </a:txBody>
+                  <a:tcPr/>
+                </a:tc>
+                <a:tc>
+                  <a:txBody>
+                    <a:bodyPr/>
+                    <a:lstStyle/>
+                    <a:p>
+                      <a:pPr algn="r"/>
+                      <a:r>
+                        <a:rPr lang="fr-FR" dirty="0"/>
+                        <a:t>20</a:t>
+                      </a:r>
+                    </a:p>
+                  </a:txBody>
+                  <a:tcPr/>
+                </a:tc>
+                <a:tc>
+                  <a:txBody>
+                    <a:bodyPr/>
+                    <a:lstStyle/>
+                    <a:p>
+                      <a:pPr algn="r"/>
+                      <a:r>
+                        <a:rPr lang="fr-FR" dirty="0"/>
+                        <a:t>22</a:t>
+                      </a:r>
+                    </a:p>
+                  </a:txBody>
+                  <a:tcPr/>
+                </a:tc>
+                <a:tc>
+                  <a:txBody>
+                    <a:bodyPr/>
+                    <a:lstStyle/>
+                    <a:p>
+                      <a:pPr algn="r"/>
+                      <a:r>
+                        <a:rPr lang="fr-FR" dirty="0"/>
+                        <a:t>24</a:t>
+                      </a:r>
+                    </a:p>
+                  </a:txBody>
+                  <a:tcPr/>
+                </a:tc>
+                <a:extLst>
+                  <a:ext uri="{0D108BD9-81ED-4DB2-BD59-A6C34878D82A}">
+                    <a16:rowId xmlns:a16="http://schemas.microsoft.com/office/drawing/2014/main" val="305590700"/>
+                  </a:ext>
+                </a:extLst>
+              </a:tr>
+              <a:tr h="370840">
+                <a:tc>
+                  <a:txBody>
+                    <a:bodyPr/>
+                    <a:lstStyle/>
+                    <a:p>
+                      <a:endParaRPr lang="fr-FR"/>
+                    </a:p>
+                  </a:txBody>
+                  <a:tcPr/>
+                </a:tc>
+                <a:tc>
+                  <a:txBody>
+                    <a:bodyPr/>
+                    <a:lstStyle/>
+                    <a:p>
+                      <a:endParaRPr lang="fr-FR"/>
+                    </a:p>
+                  </a:txBody>
+                  <a:tcPr/>
+                </a:tc>
+                <a:tc>
+                  <a:txBody>
+                    <a:bodyPr/>
+                    <a:lstStyle/>
+                    <a:p>
+                      <a:endParaRPr lang="fr-FR"/>
+                    </a:p>
+                  </a:txBody>
+                  <a:tcPr/>
+                </a:tc>
+                <a:tc>
+                  <a:txBody>
+                    <a:bodyPr/>
+                    <a:lstStyle/>
+                    <a:p>
+                      <a:endParaRPr lang="fr-FR"/>
+                    </a:p>
+                  </a:txBody>
+                  <a:tcPr/>
+                </a:tc>
+                <a:tc>
+                  <a:txBody>
+                    <a:bodyPr/>
+                    <a:lstStyle/>
+                    <a:p>
+                      <a:endParaRPr lang="fr-FR" dirty="0"/>
+                    </a:p>
+                  </a:txBody>
+                  <a:tcPr/>
+                </a:tc>
+                <a:tc>
+                  <a:txBody>
+                    <a:bodyPr/>
+                    <a:lstStyle/>
+                    <a:p>
+                      <a:endParaRPr lang="fr-FR" dirty="0"/>
+                    </a:p>
+                  </a:txBody>
+                  <a:tcPr/>
+                </a:tc>
+                <a:tc>
+                  <a:txBody>
+                    <a:bodyPr/>
+                    <a:lstStyle/>
+                    <a:p>
+                      <a:endParaRPr lang="fr-FR" dirty="0"/>
+                    </a:p>
+                  </a:txBody>
+                  <a:tcPr/>
+                </a:tc>
+                <a:tc>
+                  <a:txBody>
+                    <a:bodyPr/>
+                    <a:lstStyle/>
+                    <a:p>
+                      <a:endParaRPr lang="fr-FR" dirty="0"/>
+                    </a:p>
+                  </a:txBody>
+                  <a:tcPr/>
+                </a:tc>
+                <a:tc>
+                  <a:txBody>
+                    <a:bodyPr/>
+                    <a:lstStyle/>
+                    <a:p>
+                      <a:endParaRPr lang="fr-FR" dirty="0"/>
+                    </a:p>
+                  </a:txBody>
+                  <a:tcPr/>
+                </a:tc>
+                <a:tc>
+                  <a:txBody>
+                    <a:bodyPr/>
+                    <a:lstStyle/>
+                    <a:p>
+                      <a:endParaRPr lang="fr-FR" dirty="0"/>
+                    </a:p>
+                  </a:txBody>
+                  <a:tcPr/>
+                </a:tc>
+                <a:tc>
+                  <a:txBody>
+                    <a:bodyPr/>
+                    <a:lstStyle/>
+                    <a:p>
+                      <a:endParaRPr lang="fr-FR" dirty="0"/>
+                    </a:p>
+                  </a:txBody>
+                  <a:tcPr/>
+                </a:tc>
+                <a:tc>
+                  <a:txBody>
+                    <a:bodyPr/>
+                    <a:lstStyle/>
+                    <a:p>
+                      <a:endParaRPr lang="fr-FR" dirty="0"/>
+                    </a:p>
+                  </a:txBody>
+                  <a:tcPr/>
+                </a:tc>
+                <a:extLst>
+                  <a:ext uri="{0D108BD9-81ED-4DB2-BD59-A6C34878D82A}">
+                    <a16:rowId xmlns:a16="http://schemas.microsoft.com/office/drawing/2014/main" val="869477688"/>
+                  </a:ext>
+                </a:extLst>
+              </a:tr>
+              <a:tr h="370840">
+                <a:tc>
+                  <a:txBody>
+                    <a:bodyPr/>
+                    <a:lstStyle/>
+                    <a:p>
+                      <a:endParaRPr lang="fr-FR"/>
+                    </a:p>
+                  </a:txBody>
+                  <a:tcPr/>
+                </a:tc>
+                <a:tc>
+                  <a:txBody>
+                    <a:bodyPr/>
+                    <a:lstStyle/>
+                    <a:p>
+                      <a:endParaRPr lang="fr-FR"/>
+                    </a:p>
+                  </a:txBody>
+                  <a:tcPr/>
+                </a:tc>
+                <a:tc>
+                  <a:txBody>
+                    <a:bodyPr/>
+                    <a:lstStyle/>
+                    <a:p>
+                      <a:endParaRPr lang="fr-FR"/>
+                    </a:p>
+                  </a:txBody>
+                  <a:tcPr/>
+                </a:tc>
+                <a:tc>
+                  <a:txBody>
+                    <a:bodyPr/>
+                    <a:lstStyle/>
+                    <a:p>
+                      <a:endParaRPr lang="fr-FR"/>
+                    </a:p>
+                  </a:txBody>
+                  <a:tcPr/>
+                </a:tc>
+                <a:tc>
+                  <a:txBody>
+                    <a:bodyPr/>
+                    <a:lstStyle/>
+                    <a:p>
+                      <a:endParaRPr lang="fr-FR"/>
+                    </a:p>
+                  </a:txBody>
+                  <a:tcPr/>
+                </a:tc>
+                <a:tc>
+                  <a:txBody>
+                    <a:bodyPr/>
+                    <a:lstStyle/>
+                    <a:p>
+                      <a:endParaRPr lang="fr-FR"/>
+                    </a:p>
+                  </a:txBody>
+                  <a:tcPr/>
+                </a:tc>
+                <a:tc>
+                  <a:txBody>
+                    <a:bodyPr/>
+                    <a:lstStyle/>
+                    <a:p>
+                      <a:endParaRPr lang="fr-FR"/>
+                    </a:p>
+                  </a:txBody>
+                  <a:tcPr/>
+                </a:tc>
+                <a:tc>
+                  <a:txBody>
+                    <a:bodyPr/>
+                    <a:lstStyle/>
+                    <a:p>
+                      <a:endParaRPr lang="fr-FR"/>
+                    </a:p>
+                  </a:txBody>
+                  <a:tcPr/>
+                </a:tc>
+                <a:tc>
+                  <a:txBody>
+                    <a:bodyPr/>
+                    <a:lstStyle/>
+                    <a:p>
+                      <a:endParaRPr lang="fr-FR"/>
+                    </a:p>
+                  </a:txBody>
+                  <a:tcPr/>
+                </a:tc>
+                <a:tc>
+                  <a:txBody>
+                    <a:bodyPr/>
+                    <a:lstStyle/>
+                    <a:p>
+                      <a:endParaRPr lang="fr-FR"/>
+                    </a:p>
+                  </a:txBody>
+                  <a:tcPr/>
+                </a:tc>
+                <a:tc>
+                  <a:txBody>
+                    <a:bodyPr/>
+                    <a:lstStyle/>
+                    <a:p>
+                      <a:endParaRPr lang="fr-FR"/>
+                    </a:p>
+                  </a:txBody>
+                  <a:tcPr/>
+                </a:tc>
+                <a:tc>
+                  <a:txBody>
+                    <a:bodyPr/>
+                    <a:lstStyle/>
+                    <a:p>
+                      <a:endParaRPr lang="fr-FR"/>
+                    </a:p>
+                  </a:txBody>
+                  <a:tcPr/>
+                </a:tc>
+                <a:extLst>
+                  <a:ext uri="{0D108BD9-81ED-4DB2-BD59-A6C34878D82A}">
+                    <a16:rowId xmlns:a16="http://schemas.microsoft.com/office/drawing/2014/main" val="1351728357"/>
+                  </a:ext>
+                </a:extLst>
+              </a:tr>
+              <a:tr h="370840">
+                <a:tc>
+                  <a:txBody>
+                    <a:bodyPr/>
+                    <a:lstStyle/>
+                    <a:p>
+                      <a:endParaRPr lang="fr-FR"/>
+                    </a:p>
+                  </a:txBody>
+                  <a:tcPr/>
+                </a:tc>
+                <a:tc>
+                  <a:txBody>
+                    <a:bodyPr/>
+                    <a:lstStyle/>
+                    <a:p>
+                      <a:endParaRPr lang="fr-FR"/>
+                    </a:p>
+                  </a:txBody>
+                  <a:tcPr/>
+                </a:tc>
+                <a:tc>
+                  <a:txBody>
+                    <a:bodyPr/>
+                    <a:lstStyle/>
+                    <a:p>
+                      <a:endParaRPr lang="fr-FR"/>
+                    </a:p>
+                  </a:txBody>
+                  <a:tcPr/>
+                </a:tc>
+                <a:tc>
+                  <a:txBody>
+                    <a:bodyPr/>
+                    <a:lstStyle/>
+                    <a:p>
+                      <a:endParaRPr lang="fr-FR"/>
+                    </a:p>
+                  </a:txBody>
+                  <a:tcPr/>
+                </a:tc>
+                <a:tc>
+                  <a:txBody>
+                    <a:bodyPr/>
+                    <a:lstStyle/>
+                    <a:p>
+                      <a:endParaRPr lang="fr-FR"/>
+                    </a:p>
+                  </a:txBody>
+                  <a:tcPr/>
+                </a:tc>
+                <a:tc>
+                  <a:txBody>
+                    <a:bodyPr/>
+                    <a:lstStyle/>
+                    <a:p>
+                      <a:endParaRPr lang="fr-FR"/>
+                    </a:p>
+                  </a:txBody>
+                  <a:tcPr/>
+                </a:tc>
+                <a:tc>
+                  <a:txBody>
+                    <a:bodyPr/>
+                    <a:lstStyle/>
+                    <a:p>
+                      <a:endParaRPr lang="fr-FR"/>
+                    </a:p>
+                  </a:txBody>
+                  <a:tcPr/>
+                </a:tc>
+                <a:tc>
+                  <a:txBody>
+                    <a:bodyPr/>
+                    <a:lstStyle/>
+                    <a:p>
+                      <a:endParaRPr lang="fr-FR"/>
+                    </a:p>
+                  </a:txBody>
+                  <a:tcPr/>
+                </a:tc>
+                <a:tc>
+                  <a:txBody>
+                    <a:bodyPr/>
+                    <a:lstStyle/>
+                    <a:p>
+                      <a:endParaRPr lang="fr-FR"/>
+                    </a:p>
+                  </a:txBody>
+                  <a:tcPr/>
+                </a:tc>
+                <a:tc>
+                  <a:txBody>
+                    <a:bodyPr/>
+                    <a:lstStyle/>
+                    <a:p>
+                      <a:endParaRPr lang="fr-FR"/>
+                    </a:p>
+                  </a:txBody>
+                  <a:tcPr/>
+                </a:tc>
+                <a:tc>
+                  <a:txBody>
+                    <a:bodyPr/>
+                    <a:lstStyle/>
+                    <a:p>
+                      <a:endParaRPr lang="fr-FR"/>
+                    </a:p>
+                  </a:txBody>
+                  <a:tcPr/>
+                </a:tc>
+                <a:tc>
+                  <a:txBody>
+                    <a:bodyPr/>
+                    <a:lstStyle/>
+                    <a:p>
+                      <a:endParaRPr lang="fr-FR"/>
+                    </a:p>
+                  </a:txBody>
+                  <a:tcPr/>
+                </a:tc>
+                <a:extLst>
+                  <a:ext uri="{0D108BD9-81ED-4DB2-BD59-A6C34878D82A}">
+                    <a16:rowId xmlns:a16="http://schemas.microsoft.com/office/drawing/2014/main" val="2225049468"/>
+                  </a:ext>
+                </a:extLst>
+              </a:tr>
+              <a:tr h="370840">
+                <a:tc>
+                  <a:txBody>
+                    <a:bodyPr/>
+                    <a:lstStyle/>
+                    <a:p>
+                      <a:endParaRPr lang="fr-FR"/>
+                    </a:p>
+                  </a:txBody>
+                  <a:tcPr/>
+                </a:tc>
+                <a:tc>
+                  <a:txBody>
+                    <a:bodyPr/>
+                    <a:lstStyle/>
+                    <a:p>
+                      <a:endParaRPr lang="fr-FR"/>
+                    </a:p>
+                  </a:txBody>
+                  <a:tcPr/>
+                </a:tc>
+                <a:tc>
+                  <a:txBody>
+                    <a:bodyPr/>
+                    <a:lstStyle/>
+                    <a:p>
+                      <a:endParaRPr lang="fr-FR"/>
+                    </a:p>
+                  </a:txBody>
+                  <a:tcPr/>
+                </a:tc>
+                <a:tc>
+                  <a:txBody>
+                    <a:bodyPr/>
+                    <a:lstStyle/>
+                    <a:p>
+                      <a:endParaRPr lang="fr-FR"/>
+                    </a:p>
+                  </a:txBody>
+                  <a:tcPr/>
+                </a:tc>
+                <a:tc>
+                  <a:txBody>
+                    <a:bodyPr/>
+                    <a:lstStyle/>
+                    <a:p>
+                      <a:endParaRPr lang="fr-FR"/>
+                    </a:p>
+                  </a:txBody>
+                  <a:tcPr/>
+                </a:tc>
+                <a:tc>
+                  <a:txBody>
+                    <a:bodyPr/>
+                    <a:lstStyle/>
+                    <a:p>
+                      <a:endParaRPr lang="fr-FR"/>
+                    </a:p>
+                  </a:txBody>
+                  <a:tcPr/>
+                </a:tc>
+                <a:tc>
+                  <a:txBody>
+                    <a:bodyPr/>
+                    <a:lstStyle/>
+                    <a:p>
+                      <a:endParaRPr lang="fr-FR"/>
+                    </a:p>
+                  </a:txBody>
+                  <a:tcPr/>
+                </a:tc>
+                <a:tc>
+                  <a:txBody>
+                    <a:bodyPr/>
+                    <a:lstStyle/>
+                    <a:p>
+                      <a:endParaRPr lang="fr-FR"/>
+                    </a:p>
+                  </a:txBody>
+                  <a:tcPr/>
+                </a:tc>
+                <a:tc>
+                  <a:txBody>
+                    <a:bodyPr/>
+                    <a:lstStyle/>
+                    <a:p>
+                      <a:endParaRPr lang="fr-FR"/>
+                    </a:p>
+                  </a:txBody>
+                  <a:tcPr/>
+                </a:tc>
+                <a:tc>
+                  <a:txBody>
+                    <a:bodyPr/>
+                    <a:lstStyle/>
+                    <a:p>
+                      <a:endParaRPr lang="fr-FR"/>
+                    </a:p>
+                  </a:txBody>
+                  <a:tcPr/>
+                </a:tc>
+                <a:tc>
+                  <a:txBody>
+                    <a:bodyPr/>
+                    <a:lstStyle/>
+                    <a:p>
+                      <a:endParaRPr lang="fr-FR"/>
+                    </a:p>
+                  </a:txBody>
+                  <a:tcPr/>
+                </a:tc>
+                <a:tc>
+                  <a:txBody>
+                    <a:bodyPr/>
+                    <a:lstStyle/>
+                    <a:p>
+                      <a:endParaRPr lang="fr-FR"/>
+                    </a:p>
+                  </a:txBody>
+                  <a:tcPr/>
+                </a:tc>
+                <a:extLst>
+                  <a:ext uri="{0D108BD9-81ED-4DB2-BD59-A6C34878D82A}">
+                    <a16:rowId xmlns:a16="http://schemas.microsoft.com/office/drawing/2014/main" val="2471833283"/>
+                  </a:ext>
+                </a:extLst>
+              </a:tr>
+            </a:tbl>
+          </a:graphicData>
+        </a:graphic>
+      </p:graphicFrame>
+      <p:sp>
+        <p:nvSpPr>
+          <p:cNvPr id="4" name="Rectangle : coins arrondis 3">
+            <a:extLst>
+              <a:ext uri="{FF2B5EF4-FFF2-40B4-BE49-F238E27FC236}">
+                <a16:creationId xmlns:a16="http://schemas.microsoft.com/office/drawing/2014/main" id="{8B52735B-1ACA-47C5-B4A9-E6BDB1BAF83C}"/>
+              </a:ext>
+            </a:extLst>
+          </p:cNvPr>
+          <p:cNvSpPr/>
+          <p:nvPr/>
+        </p:nvSpPr>
+        <p:spPr>
+          <a:xfrm>
+            <a:off x="2110742" y="1760220"/>
+            <a:ext cx="3916680" cy="254000"/>
+          </a:xfrm>
+          <a:prstGeom prst="roundRect">
+            <a:avLst/>
+          </a:prstGeom>
+          <a:solidFill>
+            <a:schemeClr val="bg1">
+              <a:lumMod val="95000"/>
+            </a:schemeClr>
+          </a:solidFill>
+        </p:spPr>
+        <p:style>
+          <a:lnRef idx="2">
+            <a:schemeClr val="accent1">
+              <a:shade val="50000"/>
+            </a:schemeClr>
+          </a:lnRef>
+          <a:fillRef idx="1">
+            <a:schemeClr val="accent1"/>
+          </a:fillRef>
+          <a:effectRef idx="0">
+            <a:schemeClr val="accent1"/>
+          </a:effectRef>
+          <a:fontRef idx="minor">
+            <a:schemeClr val="lt1"/>
+          </a:fontRef>
+        </p:style>
+        <p:txBody>
+          <a:bodyPr lIns="36000" rIns="36000" rtlCol="0" anchor="ctr">
+            <a:normAutofit fontScale="62500" lnSpcReduction="20000"/>
+          </a:bodyPr>
+          <a:lstStyle/>
+          <a:p>
+            <a:pPr algn="ctr"/>
+            <a:r>
+              <a:rPr lang="fr-FR" dirty="0" err="1">
+                <a:solidFill>
+                  <a:schemeClr val="tx1"/>
+                </a:solidFill>
+              </a:rPr>
+              <a:t>Ref</a:t>
+            </a:r>
+            <a:r>
+              <a:rPr lang="fr-FR" dirty="0">
+                <a:solidFill>
+                  <a:schemeClr val="tx1"/>
+                </a:solidFill>
+              </a:rPr>
+              <a:t> </a:t>
+            </a:r>
+            <a:r>
+              <a:rPr lang="fr-FR" dirty="0" err="1">
+                <a:solidFill>
+                  <a:schemeClr val="tx1"/>
+                </a:solidFill>
+              </a:rPr>
+              <a:t>TRonçon</a:t>
+            </a:r>
+            <a:endParaRPr lang="fr-FR" dirty="0">
+              <a:solidFill>
+                <a:schemeClr val="tx1"/>
+              </a:solidFill>
+            </a:endParaRPr>
+          </a:p>
+        </p:txBody>
+      </p:sp>
+      <p:sp>
+        <p:nvSpPr>
+          <p:cNvPr id="17" name="Rectangle : coins arrondis 16">
+            <a:extLst>
+              <a:ext uri="{FF2B5EF4-FFF2-40B4-BE49-F238E27FC236}">
+                <a16:creationId xmlns:a16="http://schemas.microsoft.com/office/drawing/2014/main" id="{B903EBAD-5366-425E-9495-0A47E7F0547F}"/>
+              </a:ext>
+            </a:extLst>
+          </p:cNvPr>
+          <p:cNvSpPr/>
+          <p:nvPr/>
+        </p:nvSpPr>
+        <p:spPr>
+          <a:xfrm>
+            <a:off x="2110742" y="2121746"/>
+            <a:ext cx="5257800" cy="254000"/>
+          </a:xfrm>
+          <a:prstGeom prst="roundRect">
+            <a:avLst/>
+          </a:prstGeom>
+          <a:solidFill>
+            <a:schemeClr val="bg1">
+              <a:lumMod val="95000"/>
+            </a:schemeClr>
+          </a:solidFill>
+        </p:spPr>
+        <p:style>
+          <a:lnRef idx="2">
+            <a:schemeClr val="accent1">
+              <a:shade val="50000"/>
+            </a:schemeClr>
+          </a:lnRef>
+          <a:fillRef idx="1">
+            <a:schemeClr val="accent1"/>
+          </a:fillRef>
+          <a:effectRef idx="0">
+            <a:schemeClr val="accent1"/>
+          </a:effectRef>
+          <a:fontRef idx="minor">
+            <a:schemeClr val="lt1"/>
+          </a:fontRef>
+        </p:style>
+        <p:txBody>
+          <a:bodyPr lIns="36000" rIns="36000" rtlCol="0" anchor="ctr">
+            <a:normAutofit fontScale="62500" lnSpcReduction="20000"/>
+          </a:bodyPr>
+          <a:lstStyle/>
+          <a:p>
+            <a:pPr algn="ctr"/>
+            <a:r>
+              <a:rPr lang="fr-FR" dirty="0">
+                <a:solidFill>
+                  <a:schemeClr val="tx1"/>
+                </a:solidFill>
+              </a:rPr>
+              <a:t>(Pt-Edit) Pb Infos</a:t>
+            </a:r>
+          </a:p>
+        </p:txBody>
+      </p:sp>
+      <p:sp>
+        <p:nvSpPr>
+          <p:cNvPr id="18" name="Rectangle : coins arrondis 17">
+            <a:extLst>
+              <a:ext uri="{FF2B5EF4-FFF2-40B4-BE49-F238E27FC236}">
+                <a16:creationId xmlns:a16="http://schemas.microsoft.com/office/drawing/2014/main" id="{ABA0AA29-3C4C-47F2-BF38-B28369B374B5}"/>
+              </a:ext>
+            </a:extLst>
+          </p:cNvPr>
+          <p:cNvSpPr/>
+          <p:nvPr/>
+        </p:nvSpPr>
+        <p:spPr>
+          <a:xfrm>
+            <a:off x="7528562" y="2121746"/>
+            <a:ext cx="1219200" cy="254000"/>
+          </a:xfrm>
+          <a:prstGeom prst="roundRect">
+            <a:avLst/>
+          </a:prstGeom>
+          <a:solidFill>
+            <a:schemeClr val="bg1">
+              <a:lumMod val="95000"/>
+            </a:schemeClr>
+          </a:solidFill>
+        </p:spPr>
+        <p:style>
+          <a:lnRef idx="2">
+            <a:schemeClr val="accent1">
+              <a:shade val="50000"/>
+            </a:schemeClr>
+          </a:lnRef>
+          <a:fillRef idx="1">
+            <a:schemeClr val="accent1"/>
+          </a:fillRef>
+          <a:effectRef idx="0">
+            <a:schemeClr val="accent1"/>
+          </a:effectRef>
+          <a:fontRef idx="minor">
+            <a:schemeClr val="lt1"/>
+          </a:fontRef>
+        </p:style>
+        <p:txBody>
+          <a:bodyPr lIns="36000" rIns="36000" rtlCol="0" anchor="ctr">
+            <a:normAutofit fontScale="62500" lnSpcReduction="20000"/>
+          </a:bodyPr>
+          <a:lstStyle/>
+          <a:p>
+            <a:pPr algn="ctr"/>
+            <a:r>
+              <a:rPr lang="fr-FR" dirty="0">
+                <a:solidFill>
+                  <a:schemeClr val="tx1"/>
+                </a:solidFill>
+              </a:rPr>
+              <a:t>Nb EL</a:t>
+            </a:r>
+          </a:p>
+        </p:txBody>
+      </p:sp>
+      <p:sp>
+        <p:nvSpPr>
+          <p:cNvPr id="19" name="Rectangle : coins arrondis 18">
+            <a:extLst>
+              <a:ext uri="{FF2B5EF4-FFF2-40B4-BE49-F238E27FC236}">
+                <a16:creationId xmlns:a16="http://schemas.microsoft.com/office/drawing/2014/main" id="{EEBF7D02-5C36-4C96-BCE6-BB6F8FE8812D}"/>
+              </a:ext>
+            </a:extLst>
+          </p:cNvPr>
+          <p:cNvSpPr/>
+          <p:nvPr/>
+        </p:nvSpPr>
+        <p:spPr>
+          <a:xfrm>
+            <a:off x="8862062" y="2121746"/>
+            <a:ext cx="1219200" cy="254000"/>
+          </a:xfrm>
+          <a:prstGeom prst="roundRect">
+            <a:avLst/>
+          </a:prstGeom>
+          <a:solidFill>
+            <a:schemeClr val="bg1">
+              <a:lumMod val="95000"/>
+            </a:schemeClr>
+          </a:solidFill>
+        </p:spPr>
+        <p:style>
+          <a:lnRef idx="2">
+            <a:schemeClr val="accent1">
+              <a:shade val="50000"/>
+            </a:schemeClr>
+          </a:lnRef>
+          <a:fillRef idx="1">
+            <a:schemeClr val="accent1"/>
+          </a:fillRef>
+          <a:effectRef idx="0">
+            <a:schemeClr val="accent1"/>
+          </a:effectRef>
+          <a:fontRef idx="minor">
+            <a:schemeClr val="lt1"/>
+          </a:fontRef>
+        </p:style>
+        <p:txBody>
+          <a:bodyPr lIns="36000" rIns="36000" rtlCol="0" anchor="ctr">
+            <a:normAutofit fontScale="62500" lnSpcReduction="20000"/>
+          </a:bodyPr>
+          <a:lstStyle/>
+          <a:p>
+            <a:pPr algn="ctr"/>
+            <a:r>
+              <a:rPr lang="fr-FR" dirty="0">
+                <a:solidFill>
+                  <a:schemeClr val="tx1"/>
+                </a:solidFill>
+              </a:rPr>
+              <a:t>Nb Fibre</a:t>
+            </a:r>
+          </a:p>
+        </p:txBody>
+      </p:sp>
+      <p:sp>
+        <p:nvSpPr>
+          <p:cNvPr id="20" name="Rectangle : coins arrondis 19">
+            <a:extLst>
+              <a:ext uri="{FF2B5EF4-FFF2-40B4-BE49-F238E27FC236}">
+                <a16:creationId xmlns:a16="http://schemas.microsoft.com/office/drawing/2014/main" id="{17CFC845-581E-47AA-8EC4-E12AB770C163}"/>
+              </a:ext>
+            </a:extLst>
+          </p:cNvPr>
+          <p:cNvSpPr/>
+          <p:nvPr/>
+        </p:nvSpPr>
+        <p:spPr>
+          <a:xfrm>
+            <a:off x="7528562" y="2496818"/>
+            <a:ext cx="1219200" cy="254000"/>
+          </a:xfrm>
+          <a:prstGeom prst="roundRect">
+            <a:avLst/>
+          </a:prstGeom>
+          <a:solidFill>
+            <a:schemeClr val="bg1">
+              <a:lumMod val="95000"/>
+            </a:schemeClr>
+          </a:solidFill>
+        </p:spPr>
+        <p:style>
+          <a:lnRef idx="2">
+            <a:schemeClr val="accent1">
+              <a:shade val="50000"/>
+            </a:schemeClr>
+          </a:lnRef>
+          <a:fillRef idx="1">
+            <a:schemeClr val="accent1"/>
+          </a:fillRef>
+          <a:effectRef idx="0">
+            <a:schemeClr val="accent1"/>
+          </a:effectRef>
+          <a:fontRef idx="minor">
+            <a:schemeClr val="lt1"/>
+          </a:fontRef>
+        </p:style>
+        <p:txBody>
+          <a:bodyPr lIns="36000" rIns="36000" rtlCol="0" anchor="ctr">
+            <a:normAutofit fontScale="62500" lnSpcReduction="20000"/>
+          </a:bodyPr>
+          <a:lstStyle/>
+          <a:p>
+            <a:pPr algn="ctr"/>
+            <a:r>
+              <a:rPr lang="fr-FR" dirty="0">
+                <a:solidFill>
+                  <a:schemeClr val="tx1"/>
+                </a:solidFill>
+              </a:rPr>
+              <a:t>Date </a:t>
+            </a:r>
+            <a:r>
+              <a:rPr lang="fr-FR" dirty="0" err="1">
+                <a:solidFill>
+                  <a:schemeClr val="tx1"/>
+                </a:solidFill>
+              </a:rPr>
+              <a:t>Instal</a:t>
+            </a:r>
+            <a:r>
+              <a:rPr lang="fr-FR" dirty="0">
+                <a:solidFill>
+                  <a:schemeClr val="tx1"/>
+                </a:solidFill>
+              </a:rPr>
+              <a:t>.</a:t>
+            </a:r>
+          </a:p>
+        </p:txBody>
+      </p:sp>
+      <p:sp>
+        <p:nvSpPr>
+          <p:cNvPr id="21" name="Rectangle : coins arrondis 20">
+            <a:extLst>
+              <a:ext uri="{FF2B5EF4-FFF2-40B4-BE49-F238E27FC236}">
+                <a16:creationId xmlns:a16="http://schemas.microsoft.com/office/drawing/2014/main" id="{37D34A93-337D-4D56-A225-088721107B5D}"/>
+              </a:ext>
+            </a:extLst>
+          </p:cNvPr>
+          <p:cNvSpPr/>
+          <p:nvPr/>
+        </p:nvSpPr>
+        <p:spPr>
+          <a:xfrm>
+            <a:off x="8862062" y="2496818"/>
+            <a:ext cx="1219200" cy="254000"/>
+          </a:xfrm>
+          <a:prstGeom prst="roundRect">
+            <a:avLst/>
+          </a:prstGeom>
+          <a:solidFill>
+            <a:schemeClr val="bg1">
+              <a:lumMod val="95000"/>
+            </a:schemeClr>
+          </a:solidFill>
+        </p:spPr>
+        <p:style>
+          <a:lnRef idx="2">
+            <a:schemeClr val="accent1">
+              <a:shade val="50000"/>
+            </a:schemeClr>
+          </a:lnRef>
+          <a:fillRef idx="1">
+            <a:schemeClr val="accent1"/>
+          </a:fillRef>
+          <a:effectRef idx="0">
+            <a:schemeClr val="accent1"/>
+          </a:effectRef>
+          <a:fontRef idx="minor">
+            <a:schemeClr val="lt1"/>
+          </a:fontRef>
+        </p:style>
+        <p:txBody>
+          <a:bodyPr lIns="36000" rIns="36000" rtlCol="0" anchor="ctr">
+            <a:normAutofit fontScale="62500" lnSpcReduction="20000"/>
+          </a:bodyPr>
+          <a:lstStyle/>
+          <a:p>
+            <a:pPr algn="ctr"/>
+            <a:r>
+              <a:rPr lang="fr-FR" dirty="0">
+                <a:solidFill>
+                  <a:schemeClr val="tx1"/>
+                </a:solidFill>
+              </a:rPr>
+              <a:t>Date Mesures</a:t>
+            </a:r>
+          </a:p>
+        </p:txBody>
+      </p:sp>
+      <p:sp>
+        <p:nvSpPr>
+          <p:cNvPr id="22" name="Rectangle : coins arrondis 21">
+            <a:extLst>
+              <a:ext uri="{FF2B5EF4-FFF2-40B4-BE49-F238E27FC236}">
+                <a16:creationId xmlns:a16="http://schemas.microsoft.com/office/drawing/2014/main" id="{7DBF3BD9-69DA-45D8-9147-8AA07B507A85}"/>
+              </a:ext>
+            </a:extLst>
+          </p:cNvPr>
+          <p:cNvSpPr/>
+          <p:nvPr/>
+        </p:nvSpPr>
+        <p:spPr>
+          <a:xfrm>
+            <a:off x="2110742" y="2496818"/>
+            <a:ext cx="5257800" cy="254000"/>
+          </a:xfrm>
+          <a:prstGeom prst="roundRect">
+            <a:avLst/>
+          </a:prstGeom>
+          <a:solidFill>
+            <a:schemeClr val="bg1">
+              <a:lumMod val="95000"/>
+            </a:schemeClr>
+          </a:solidFill>
+        </p:spPr>
+        <p:style>
+          <a:lnRef idx="2">
+            <a:schemeClr val="accent1">
+              <a:shade val="50000"/>
+            </a:schemeClr>
+          </a:lnRef>
+          <a:fillRef idx="1">
+            <a:schemeClr val="accent1"/>
+          </a:fillRef>
+          <a:effectRef idx="0">
+            <a:schemeClr val="accent1"/>
+          </a:effectRef>
+          <a:fontRef idx="minor">
+            <a:schemeClr val="lt1"/>
+          </a:fontRef>
+        </p:style>
+        <p:txBody>
+          <a:bodyPr lIns="36000" rIns="36000" rtlCol="0" anchor="ctr">
+            <a:normAutofit fontScale="62500" lnSpcReduction="20000"/>
+          </a:bodyPr>
+          <a:lstStyle/>
+          <a:p>
+            <a:pPr algn="ctr"/>
+            <a:r>
+              <a:rPr lang="fr-FR" dirty="0">
+                <a:solidFill>
+                  <a:schemeClr val="tx1"/>
+                </a:solidFill>
+              </a:rPr>
+              <a:t>Commentaire </a:t>
+            </a:r>
+            <a:r>
+              <a:rPr lang="fr-FR" dirty="0" err="1">
+                <a:solidFill>
+                  <a:schemeClr val="tx1"/>
+                </a:solidFill>
+              </a:rPr>
+              <a:t>Troncon</a:t>
+            </a:r>
+            <a:endParaRPr lang="fr-FR" dirty="0">
+              <a:solidFill>
+                <a:schemeClr val="tx1"/>
+              </a:solidFill>
+            </a:endParaRPr>
+          </a:p>
+        </p:txBody>
+      </p:sp>
+      <p:sp>
+        <p:nvSpPr>
+          <p:cNvPr id="23" name="ZoneTexte 22">
+            <a:extLst>
+              <a:ext uri="{FF2B5EF4-FFF2-40B4-BE49-F238E27FC236}">
+                <a16:creationId xmlns:a16="http://schemas.microsoft.com/office/drawing/2014/main" id="{544DD4B1-706D-4644-AEAE-AE08AB72A82B}"/>
+              </a:ext>
+            </a:extLst>
+          </p:cNvPr>
+          <p:cNvSpPr txBox="1"/>
+          <p:nvPr/>
+        </p:nvSpPr>
+        <p:spPr>
+          <a:xfrm>
+            <a:off x="335280" y="160020"/>
+            <a:ext cx="4145280" cy="523220"/>
+          </a:xfrm>
+          <a:prstGeom prst="rect">
+            <a:avLst/>
+          </a:prstGeom>
+          <a:noFill/>
+        </p:spPr>
+        <p:txBody>
+          <a:bodyPr wrap="square" rtlCol="0">
+            <a:spAutoFit/>
+          </a:bodyPr>
+          <a:lstStyle/>
+          <a:p>
+            <a:r>
+              <a:rPr lang="fr-FR" sz="2800" dirty="0" err="1"/>
+              <a:t>troncon-edit</a:t>
+            </a:r>
+            <a:endParaRPr lang="fr-FR" sz="2800" dirty="0"/>
+          </a:p>
+        </p:txBody>
+      </p:sp>
+      <p:sp>
+        <p:nvSpPr>
+          <p:cNvPr id="24" name="Rectangle : coins arrondis 23">
+            <a:extLst>
+              <a:ext uri="{FF2B5EF4-FFF2-40B4-BE49-F238E27FC236}">
+                <a16:creationId xmlns:a16="http://schemas.microsoft.com/office/drawing/2014/main" id="{A076EE58-8C65-456E-AD87-3D5A73CEEFDE}"/>
+              </a:ext>
+            </a:extLst>
+          </p:cNvPr>
+          <p:cNvSpPr/>
+          <p:nvPr/>
+        </p:nvSpPr>
+        <p:spPr>
+          <a:xfrm>
+            <a:off x="6149342" y="1746674"/>
+            <a:ext cx="1219200" cy="254000"/>
+          </a:xfrm>
+          <a:prstGeom prst="roundRect">
+            <a:avLst/>
+          </a:prstGeom>
+          <a:solidFill>
+            <a:schemeClr val="bg1">
+              <a:lumMod val="95000"/>
+            </a:schemeClr>
+          </a:solidFill>
+        </p:spPr>
+        <p:style>
+          <a:lnRef idx="2">
+            <a:schemeClr val="accent1">
+              <a:shade val="50000"/>
+            </a:schemeClr>
+          </a:lnRef>
+          <a:fillRef idx="1">
+            <a:schemeClr val="accent1"/>
+          </a:fillRef>
+          <a:effectRef idx="0">
+            <a:schemeClr val="accent1"/>
+          </a:effectRef>
+          <a:fontRef idx="minor">
+            <a:schemeClr val="lt1"/>
+          </a:fontRef>
+        </p:style>
+        <p:txBody>
+          <a:bodyPr lIns="36000" rIns="36000" rtlCol="0" anchor="ctr">
+            <a:normAutofit fontScale="62500" lnSpcReduction="20000"/>
+          </a:bodyPr>
+          <a:lstStyle/>
+          <a:p>
+            <a:pPr algn="ctr"/>
+            <a:r>
+              <a:rPr lang="fr-FR" dirty="0" err="1">
+                <a:solidFill>
+                  <a:schemeClr val="tx1"/>
+                </a:solidFill>
+              </a:rPr>
+              <a:t>Bloquage</a:t>
+            </a:r>
+            <a:r>
+              <a:rPr lang="fr-FR" dirty="0">
+                <a:solidFill>
+                  <a:schemeClr val="tx1"/>
+                </a:solidFill>
+              </a:rPr>
+              <a:t>?</a:t>
+            </a:r>
+          </a:p>
+        </p:txBody>
+      </p:sp>
+      <p:sp>
+        <p:nvSpPr>
+          <p:cNvPr id="25" name="Rectangle : coins arrondis 24">
+            <a:extLst>
+              <a:ext uri="{FF2B5EF4-FFF2-40B4-BE49-F238E27FC236}">
+                <a16:creationId xmlns:a16="http://schemas.microsoft.com/office/drawing/2014/main" id="{70CCE9CC-2636-4B56-A750-1ACB43EE0050}"/>
+              </a:ext>
+            </a:extLst>
+          </p:cNvPr>
+          <p:cNvSpPr/>
+          <p:nvPr/>
+        </p:nvSpPr>
+        <p:spPr>
+          <a:xfrm>
+            <a:off x="7528562" y="1746674"/>
+            <a:ext cx="1219200" cy="254000"/>
+          </a:xfrm>
+          <a:prstGeom prst="roundRect">
+            <a:avLst/>
+          </a:prstGeom>
+          <a:solidFill>
+            <a:schemeClr val="bg1">
+              <a:lumMod val="95000"/>
+            </a:schemeClr>
+          </a:solidFill>
+        </p:spPr>
+        <p:style>
+          <a:lnRef idx="2">
+            <a:schemeClr val="accent1">
+              <a:shade val="50000"/>
+            </a:schemeClr>
+          </a:lnRef>
+          <a:fillRef idx="1">
+            <a:schemeClr val="accent1"/>
+          </a:fillRef>
+          <a:effectRef idx="0">
+            <a:schemeClr val="accent1"/>
+          </a:effectRef>
+          <a:fontRef idx="minor">
+            <a:schemeClr val="lt1"/>
+          </a:fontRef>
+        </p:style>
+        <p:txBody>
+          <a:bodyPr lIns="36000" rIns="36000" rtlCol="0" anchor="ctr">
+            <a:normAutofit fontScale="62500" lnSpcReduction="20000"/>
+          </a:bodyPr>
+          <a:lstStyle/>
+          <a:p>
+            <a:pPr algn="ctr"/>
+            <a:r>
+              <a:rPr lang="fr-FR" dirty="0" err="1">
+                <a:solidFill>
+                  <a:schemeClr val="tx1"/>
+                </a:solidFill>
+              </a:rPr>
+              <a:t>Sign</a:t>
+            </a:r>
+            <a:r>
+              <a:rPr lang="fr-FR" dirty="0">
+                <a:solidFill>
+                  <a:schemeClr val="tx1"/>
+                </a:solidFill>
+              </a:rPr>
+              <a:t>. Demandée?</a:t>
+            </a:r>
+          </a:p>
+        </p:txBody>
+      </p:sp>
+      <p:sp>
+        <p:nvSpPr>
+          <p:cNvPr id="26" name="Rectangle : coins arrondis 25">
+            <a:extLst>
+              <a:ext uri="{FF2B5EF4-FFF2-40B4-BE49-F238E27FC236}">
+                <a16:creationId xmlns:a16="http://schemas.microsoft.com/office/drawing/2014/main" id="{EDAE632D-9816-4167-8B43-62F32791445E}"/>
+              </a:ext>
+            </a:extLst>
+          </p:cNvPr>
+          <p:cNvSpPr/>
+          <p:nvPr/>
+        </p:nvSpPr>
+        <p:spPr>
+          <a:xfrm>
+            <a:off x="8862058" y="1746674"/>
+            <a:ext cx="1219200" cy="254000"/>
+          </a:xfrm>
+          <a:prstGeom prst="roundRect">
+            <a:avLst/>
+          </a:prstGeom>
+          <a:solidFill>
+            <a:schemeClr val="bg1">
+              <a:lumMod val="95000"/>
+            </a:schemeClr>
+          </a:solidFill>
+        </p:spPr>
+        <p:style>
+          <a:lnRef idx="2">
+            <a:schemeClr val="accent1">
+              <a:shade val="50000"/>
+            </a:schemeClr>
+          </a:lnRef>
+          <a:fillRef idx="1">
+            <a:schemeClr val="accent1"/>
+          </a:fillRef>
+          <a:effectRef idx="0">
+            <a:schemeClr val="accent1"/>
+          </a:effectRef>
+          <a:fontRef idx="minor">
+            <a:schemeClr val="lt1"/>
+          </a:fontRef>
+        </p:style>
+        <p:txBody>
+          <a:bodyPr lIns="36000" rIns="36000" rtlCol="0" anchor="ctr">
+            <a:normAutofit fontScale="62500" lnSpcReduction="20000"/>
+          </a:bodyPr>
+          <a:lstStyle/>
+          <a:p>
+            <a:pPr algn="ctr"/>
+            <a:r>
+              <a:rPr lang="fr-FR" dirty="0" err="1">
+                <a:solidFill>
+                  <a:schemeClr val="tx1"/>
+                </a:solidFill>
+              </a:rPr>
+              <a:t>Sign</a:t>
+            </a:r>
+            <a:r>
+              <a:rPr lang="fr-FR" dirty="0">
+                <a:solidFill>
+                  <a:schemeClr val="tx1"/>
+                </a:solidFill>
+              </a:rPr>
+              <a:t>. obtenue?</a:t>
+            </a:r>
+          </a:p>
+        </p:txBody>
+      </p:sp>
+      <p:graphicFrame>
+        <p:nvGraphicFramePr>
+          <p:cNvPr id="27" name="Tableau 26">
+            <a:extLst>
+              <a:ext uri="{FF2B5EF4-FFF2-40B4-BE49-F238E27FC236}">
+                <a16:creationId xmlns:a16="http://schemas.microsoft.com/office/drawing/2014/main" id="{F48E3728-F32C-4861-823E-8C5E62DC85E0}"/>
+              </a:ext>
+            </a:extLst>
+          </p:cNvPr>
+          <p:cNvGraphicFramePr>
+            <a:graphicFrameLocks noGrp="1"/>
+          </p:cNvGraphicFramePr>
+          <p:nvPr>
+            <p:extLst>
+              <p:ext uri="{D42A27DB-BD31-4B8C-83A1-F6EECF244321}">
+                <p14:modId xmlns:p14="http://schemas.microsoft.com/office/powerpoint/2010/main" val="972308909"/>
+              </p:ext>
+            </p:extLst>
+          </p:nvPr>
+        </p:nvGraphicFramePr>
+        <p:xfrm>
+          <a:off x="2032002" y="3493346"/>
+          <a:ext cx="8127996" cy="1854200"/>
+        </p:xfrm>
+        <a:graphic>
+          <a:graphicData uri="http://schemas.openxmlformats.org/drawingml/2006/table">
+            <a:tbl>
+              <a:tblPr firstRow="1" bandRow="1">
+                <a:tableStyleId>{5C22544A-7EE6-4342-B048-85BDC9FD1C3A}</a:tableStyleId>
+              </a:tblPr>
+              <a:tblGrid>
+                <a:gridCol w="677333">
+                  <a:extLst>
+                    <a:ext uri="{9D8B030D-6E8A-4147-A177-3AD203B41FA5}">
+                      <a16:colId xmlns:a16="http://schemas.microsoft.com/office/drawing/2014/main" val="4007388370"/>
+                    </a:ext>
+                  </a:extLst>
+                </a:gridCol>
+                <a:gridCol w="677333">
+                  <a:extLst>
+                    <a:ext uri="{9D8B030D-6E8A-4147-A177-3AD203B41FA5}">
+                      <a16:colId xmlns:a16="http://schemas.microsoft.com/office/drawing/2014/main" val="3853247849"/>
+                    </a:ext>
+                  </a:extLst>
+                </a:gridCol>
+                <a:gridCol w="677333">
+                  <a:extLst>
+                    <a:ext uri="{9D8B030D-6E8A-4147-A177-3AD203B41FA5}">
+                      <a16:colId xmlns:a16="http://schemas.microsoft.com/office/drawing/2014/main" val="3811464320"/>
+                    </a:ext>
+                  </a:extLst>
+                </a:gridCol>
+                <a:gridCol w="677333">
+                  <a:extLst>
+                    <a:ext uri="{9D8B030D-6E8A-4147-A177-3AD203B41FA5}">
+                      <a16:colId xmlns:a16="http://schemas.microsoft.com/office/drawing/2014/main" val="701571514"/>
+                    </a:ext>
+                  </a:extLst>
+                </a:gridCol>
+                <a:gridCol w="677333">
+                  <a:extLst>
+                    <a:ext uri="{9D8B030D-6E8A-4147-A177-3AD203B41FA5}">
+                      <a16:colId xmlns:a16="http://schemas.microsoft.com/office/drawing/2014/main" val="2090525235"/>
+                    </a:ext>
+                  </a:extLst>
+                </a:gridCol>
+                <a:gridCol w="677333">
+                  <a:extLst>
+                    <a:ext uri="{9D8B030D-6E8A-4147-A177-3AD203B41FA5}">
+                      <a16:colId xmlns:a16="http://schemas.microsoft.com/office/drawing/2014/main" val="3439850729"/>
+                    </a:ext>
+                  </a:extLst>
+                </a:gridCol>
+                <a:gridCol w="677333">
+                  <a:extLst>
+                    <a:ext uri="{9D8B030D-6E8A-4147-A177-3AD203B41FA5}">
+                      <a16:colId xmlns:a16="http://schemas.microsoft.com/office/drawing/2014/main" val="131470306"/>
+                    </a:ext>
+                  </a:extLst>
+                </a:gridCol>
+                <a:gridCol w="677333">
+                  <a:extLst>
+                    <a:ext uri="{9D8B030D-6E8A-4147-A177-3AD203B41FA5}">
+                      <a16:colId xmlns:a16="http://schemas.microsoft.com/office/drawing/2014/main" val="3361251054"/>
+                    </a:ext>
+                  </a:extLst>
+                </a:gridCol>
+                <a:gridCol w="677333">
+                  <a:extLst>
+                    <a:ext uri="{9D8B030D-6E8A-4147-A177-3AD203B41FA5}">
+                      <a16:colId xmlns:a16="http://schemas.microsoft.com/office/drawing/2014/main" val="1982278795"/>
+                    </a:ext>
+                  </a:extLst>
+                </a:gridCol>
+                <a:gridCol w="677333">
+                  <a:extLst>
+                    <a:ext uri="{9D8B030D-6E8A-4147-A177-3AD203B41FA5}">
+                      <a16:colId xmlns:a16="http://schemas.microsoft.com/office/drawing/2014/main" val="2525089062"/>
+                    </a:ext>
+                  </a:extLst>
+                </a:gridCol>
+                <a:gridCol w="677333">
+                  <a:extLst>
+                    <a:ext uri="{9D8B030D-6E8A-4147-A177-3AD203B41FA5}">
+                      <a16:colId xmlns:a16="http://schemas.microsoft.com/office/drawing/2014/main" val="3767385281"/>
+                    </a:ext>
+                  </a:extLst>
+                </a:gridCol>
+                <a:gridCol w="677333">
+                  <a:extLst>
+                    <a:ext uri="{9D8B030D-6E8A-4147-A177-3AD203B41FA5}">
+                      <a16:colId xmlns:a16="http://schemas.microsoft.com/office/drawing/2014/main" val="2328813377"/>
+                    </a:ext>
+                  </a:extLst>
+                </a:gridCol>
+              </a:tblGrid>
+              <a:tr h="370840">
+                <a:tc>
+                  <a:txBody>
+                    <a:bodyPr/>
+                    <a:lstStyle/>
+                    <a:p>
+                      <a:pPr algn="r"/>
+                      <a:r>
+                        <a:rPr lang="fr-FR" dirty="0"/>
+                        <a:t>2</a:t>
+                      </a:r>
+                    </a:p>
+                  </a:txBody>
+                  <a:tcPr/>
+                </a:tc>
+                <a:tc>
+                  <a:txBody>
+                    <a:bodyPr/>
+                    <a:lstStyle/>
+                    <a:p>
+                      <a:pPr algn="r"/>
+                      <a:r>
+                        <a:rPr lang="fr-FR" dirty="0"/>
+                        <a:t>4</a:t>
+                      </a:r>
+                    </a:p>
+                  </a:txBody>
+                  <a:tcPr/>
+                </a:tc>
+                <a:tc>
+                  <a:txBody>
+                    <a:bodyPr/>
+                    <a:lstStyle/>
+                    <a:p>
+                      <a:pPr algn="r"/>
+                      <a:r>
+                        <a:rPr lang="fr-FR" dirty="0"/>
+                        <a:t>6</a:t>
+                      </a:r>
+                    </a:p>
+                  </a:txBody>
+                  <a:tcPr/>
+                </a:tc>
+                <a:tc>
+                  <a:txBody>
+                    <a:bodyPr/>
+                    <a:lstStyle/>
+                    <a:p>
+                      <a:pPr algn="r"/>
+                      <a:r>
+                        <a:rPr lang="fr-FR" dirty="0"/>
+                        <a:t>8</a:t>
+                      </a:r>
+                    </a:p>
+                  </a:txBody>
+                  <a:tcPr/>
+                </a:tc>
+                <a:tc>
+                  <a:txBody>
+                    <a:bodyPr/>
+                    <a:lstStyle/>
+                    <a:p>
+                      <a:pPr algn="r"/>
+                      <a:r>
+                        <a:rPr lang="fr-FR" dirty="0"/>
+                        <a:t>10</a:t>
+                      </a:r>
+                    </a:p>
+                  </a:txBody>
+                  <a:tcPr/>
+                </a:tc>
+                <a:tc>
+                  <a:txBody>
+                    <a:bodyPr/>
+                    <a:lstStyle/>
+                    <a:p>
+                      <a:pPr algn="r"/>
+                      <a:r>
+                        <a:rPr lang="fr-FR" dirty="0"/>
+                        <a:t>12</a:t>
+                      </a:r>
+                    </a:p>
+                  </a:txBody>
+                  <a:tcPr/>
+                </a:tc>
+                <a:tc>
+                  <a:txBody>
+                    <a:bodyPr/>
+                    <a:lstStyle/>
+                    <a:p>
+                      <a:pPr algn="r"/>
+                      <a:r>
+                        <a:rPr lang="fr-FR" dirty="0"/>
+                        <a:t>14</a:t>
+                      </a:r>
+                    </a:p>
+                  </a:txBody>
+                  <a:tcPr/>
+                </a:tc>
+                <a:tc>
+                  <a:txBody>
+                    <a:bodyPr/>
+                    <a:lstStyle/>
+                    <a:p>
+                      <a:pPr algn="r"/>
+                      <a:r>
+                        <a:rPr lang="fr-FR" dirty="0"/>
+                        <a:t>16</a:t>
+                      </a:r>
+                    </a:p>
+                  </a:txBody>
+                  <a:tcPr/>
+                </a:tc>
+                <a:tc>
+                  <a:txBody>
+                    <a:bodyPr/>
+                    <a:lstStyle/>
+                    <a:p>
+                      <a:pPr algn="r"/>
+                      <a:r>
+                        <a:rPr lang="fr-FR" dirty="0"/>
+                        <a:t>18</a:t>
+                      </a:r>
+                    </a:p>
+                  </a:txBody>
+                  <a:tcPr/>
+                </a:tc>
+                <a:tc>
+                  <a:txBody>
+                    <a:bodyPr/>
+                    <a:lstStyle/>
+                    <a:p>
+                      <a:pPr algn="r"/>
+                      <a:r>
+                        <a:rPr lang="fr-FR" dirty="0"/>
+                        <a:t>20</a:t>
+                      </a:r>
+                    </a:p>
+                  </a:txBody>
+                  <a:tcPr/>
+                </a:tc>
+                <a:tc>
+                  <a:txBody>
+                    <a:bodyPr/>
+                    <a:lstStyle/>
+                    <a:p>
+                      <a:pPr algn="r"/>
+                      <a:r>
+                        <a:rPr lang="fr-FR" dirty="0"/>
+                        <a:t>22</a:t>
+                      </a:r>
+                    </a:p>
+                  </a:txBody>
+                  <a:tcPr/>
+                </a:tc>
+                <a:tc>
+                  <a:txBody>
+                    <a:bodyPr/>
+                    <a:lstStyle/>
+                    <a:p>
+                      <a:pPr algn="r"/>
+                      <a:r>
+                        <a:rPr lang="fr-FR" dirty="0"/>
+                        <a:t>24</a:t>
+                      </a:r>
+                    </a:p>
+                  </a:txBody>
+                  <a:tcPr/>
+                </a:tc>
+                <a:extLst>
+                  <a:ext uri="{0D108BD9-81ED-4DB2-BD59-A6C34878D82A}">
+                    <a16:rowId xmlns:a16="http://schemas.microsoft.com/office/drawing/2014/main" val="305590700"/>
+                  </a:ext>
+                </a:extLst>
+              </a:tr>
+              <a:tr h="370840">
+                <a:tc>
+                  <a:txBody>
+                    <a:bodyPr/>
+                    <a:lstStyle/>
+                    <a:p>
+                      <a:endParaRPr lang="fr-FR"/>
+                    </a:p>
+                  </a:txBody>
+                  <a:tcPr/>
+                </a:tc>
+                <a:tc>
+                  <a:txBody>
+                    <a:bodyPr/>
+                    <a:lstStyle/>
+                    <a:p>
+                      <a:endParaRPr lang="fr-FR"/>
+                    </a:p>
+                  </a:txBody>
+                  <a:tcPr/>
+                </a:tc>
+                <a:tc>
+                  <a:txBody>
+                    <a:bodyPr/>
+                    <a:lstStyle/>
+                    <a:p>
+                      <a:endParaRPr lang="fr-FR"/>
+                    </a:p>
+                  </a:txBody>
+                  <a:tcPr/>
+                </a:tc>
+                <a:tc>
+                  <a:txBody>
+                    <a:bodyPr/>
+                    <a:lstStyle/>
+                    <a:p>
+                      <a:endParaRPr lang="fr-FR"/>
+                    </a:p>
+                  </a:txBody>
+                  <a:tcPr/>
+                </a:tc>
+                <a:tc>
+                  <a:txBody>
+                    <a:bodyPr/>
+                    <a:lstStyle/>
+                    <a:p>
+                      <a:endParaRPr lang="fr-FR" dirty="0"/>
+                    </a:p>
+                  </a:txBody>
+                  <a:tcPr/>
+                </a:tc>
+                <a:tc>
+                  <a:txBody>
+                    <a:bodyPr/>
+                    <a:lstStyle/>
+                    <a:p>
+                      <a:endParaRPr lang="fr-FR" dirty="0"/>
+                    </a:p>
+                  </a:txBody>
+                  <a:tcPr/>
+                </a:tc>
+                <a:tc>
+                  <a:txBody>
+                    <a:bodyPr/>
+                    <a:lstStyle/>
+                    <a:p>
+                      <a:endParaRPr lang="fr-FR" dirty="0"/>
+                    </a:p>
+                  </a:txBody>
+                  <a:tcPr/>
+                </a:tc>
+                <a:tc>
+                  <a:txBody>
+                    <a:bodyPr/>
+                    <a:lstStyle/>
+                    <a:p>
+                      <a:endParaRPr lang="fr-FR" dirty="0"/>
+                    </a:p>
+                  </a:txBody>
+                  <a:tcPr/>
+                </a:tc>
+                <a:tc>
+                  <a:txBody>
+                    <a:bodyPr/>
+                    <a:lstStyle/>
+                    <a:p>
+                      <a:endParaRPr lang="fr-FR" dirty="0"/>
+                    </a:p>
+                  </a:txBody>
+                  <a:tcPr/>
+                </a:tc>
+                <a:tc>
+                  <a:txBody>
+                    <a:bodyPr/>
+                    <a:lstStyle/>
+                    <a:p>
+                      <a:endParaRPr lang="fr-FR" dirty="0"/>
+                    </a:p>
+                  </a:txBody>
+                  <a:tcPr/>
+                </a:tc>
+                <a:tc>
+                  <a:txBody>
+                    <a:bodyPr/>
+                    <a:lstStyle/>
+                    <a:p>
+                      <a:endParaRPr lang="fr-FR" dirty="0"/>
+                    </a:p>
+                  </a:txBody>
+                  <a:tcPr/>
+                </a:tc>
+                <a:tc>
+                  <a:txBody>
+                    <a:bodyPr/>
+                    <a:lstStyle/>
+                    <a:p>
+                      <a:endParaRPr lang="fr-FR" dirty="0"/>
+                    </a:p>
+                  </a:txBody>
+                  <a:tcPr/>
+                </a:tc>
+                <a:extLst>
+                  <a:ext uri="{0D108BD9-81ED-4DB2-BD59-A6C34878D82A}">
+                    <a16:rowId xmlns:a16="http://schemas.microsoft.com/office/drawing/2014/main" val="869477688"/>
+                  </a:ext>
+                </a:extLst>
+              </a:tr>
+              <a:tr h="370840">
+                <a:tc>
+                  <a:txBody>
+                    <a:bodyPr/>
+                    <a:lstStyle/>
+                    <a:p>
+                      <a:endParaRPr lang="fr-FR"/>
+                    </a:p>
+                  </a:txBody>
+                  <a:tcPr/>
+                </a:tc>
+                <a:tc>
+                  <a:txBody>
+                    <a:bodyPr/>
+                    <a:lstStyle/>
+                    <a:p>
+                      <a:endParaRPr lang="fr-FR"/>
+                    </a:p>
+                  </a:txBody>
+                  <a:tcPr/>
+                </a:tc>
+                <a:tc>
+                  <a:txBody>
+                    <a:bodyPr/>
+                    <a:lstStyle/>
+                    <a:p>
+                      <a:endParaRPr lang="fr-FR"/>
+                    </a:p>
+                  </a:txBody>
+                  <a:tcPr/>
+                </a:tc>
+                <a:tc>
+                  <a:txBody>
+                    <a:bodyPr/>
+                    <a:lstStyle/>
+                    <a:p>
+                      <a:endParaRPr lang="fr-FR" dirty="0"/>
+                    </a:p>
+                  </a:txBody>
+                  <a:tcPr/>
+                </a:tc>
+                <a:tc>
+                  <a:txBody>
+                    <a:bodyPr/>
+                    <a:lstStyle/>
+                    <a:p>
+                      <a:endParaRPr lang="fr-FR" dirty="0"/>
+                    </a:p>
+                  </a:txBody>
+                  <a:tcPr/>
+                </a:tc>
+                <a:tc>
+                  <a:txBody>
+                    <a:bodyPr/>
+                    <a:lstStyle/>
+                    <a:p>
+                      <a:endParaRPr lang="fr-FR"/>
+                    </a:p>
+                  </a:txBody>
+                  <a:tcPr/>
+                </a:tc>
+                <a:tc>
+                  <a:txBody>
+                    <a:bodyPr/>
+                    <a:lstStyle/>
+                    <a:p>
+                      <a:endParaRPr lang="fr-FR" dirty="0"/>
+                    </a:p>
+                  </a:txBody>
+                  <a:tcPr/>
+                </a:tc>
+                <a:tc>
+                  <a:txBody>
+                    <a:bodyPr/>
+                    <a:lstStyle/>
+                    <a:p>
+                      <a:endParaRPr lang="fr-FR"/>
+                    </a:p>
+                  </a:txBody>
+                  <a:tcPr/>
+                </a:tc>
+                <a:tc>
+                  <a:txBody>
+                    <a:bodyPr/>
+                    <a:lstStyle/>
+                    <a:p>
+                      <a:endParaRPr lang="fr-FR"/>
+                    </a:p>
+                  </a:txBody>
+                  <a:tcPr/>
+                </a:tc>
+                <a:tc>
+                  <a:txBody>
+                    <a:bodyPr/>
+                    <a:lstStyle/>
+                    <a:p>
+                      <a:endParaRPr lang="fr-FR" dirty="0"/>
+                    </a:p>
+                  </a:txBody>
+                  <a:tcPr/>
+                </a:tc>
+                <a:tc>
+                  <a:txBody>
+                    <a:bodyPr/>
+                    <a:lstStyle/>
+                    <a:p>
+                      <a:endParaRPr lang="fr-FR"/>
+                    </a:p>
+                  </a:txBody>
+                  <a:tcPr/>
+                </a:tc>
+                <a:tc>
+                  <a:txBody>
+                    <a:bodyPr/>
+                    <a:lstStyle/>
+                    <a:p>
+                      <a:endParaRPr lang="fr-FR"/>
+                    </a:p>
+                  </a:txBody>
+                  <a:tcPr/>
+                </a:tc>
+                <a:extLst>
+                  <a:ext uri="{0D108BD9-81ED-4DB2-BD59-A6C34878D82A}">
+                    <a16:rowId xmlns:a16="http://schemas.microsoft.com/office/drawing/2014/main" val="1351728357"/>
+                  </a:ext>
+                </a:extLst>
+              </a:tr>
+              <a:tr h="370840">
+                <a:tc>
+                  <a:txBody>
+                    <a:bodyPr/>
+                    <a:lstStyle/>
+                    <a:p>
+                      <a:endParaRPr lang="fr-FR"/>
+                    </a:p>
+                  </a:txBody>
+                  <a:tcPr/>
+                </a:tc>
+                <a:tc>
+                  <a:txBody>
+                    <a:bodyPr/>
+                    <a:lstStyle/>
+                    <a:p>
+                      <a:endParaRPr lang="fr-FR"/>
+                    </a:p>
+                  </a:txBody>
+                  <a:tcPr/>
+                </a:tc>
+                <a:tc>
+                  <a:txBody>
+                    <a:bodyPr/>
+                    <a:lstStyle/>
+                    <a:p>
+                      <a:endParaRPr lang="fr-FR"/>
+                    </a:p>
+                  </a:txBody>
+                  <a:tcPr/>
+                </a:tc>
+                <a:tc>
+                  <a:txBody>
+                    <a:bodyPr/>
+                    <a:lstStyle/>
+                    <a:p>
+                      <a:endParaRPr lang="fr-FR"/>
+                    </a:p>
+                  </a:txBody>
+                  <a:tcPr/>
+                </a:tc>
+                <a:tc>
+                  <a:txBody>
+                    <a:bodyPr/>
+                    <a:lstStyle/>
+                    <a:p>
+                      <a:endParaRPr lang="fr-FR"/>
+                    </a:p>
+                  </a:txBody>
+                  <a:tcPr/>
+                </a:tc>
+                <a:tc>
+                  <a:txBody>
+                    <a:bodyPr/>
+                    <a:lstStyle/>
+                    <a:p>
+                      <a:endParaRPr lang="fr-FR"/>
+                    </a:p>
+                  </a:txBody>
+                  <a:tcPr/>
+                </a:tc>
+                <a:tc>
+                  <a:txBody>
+                    <a:bodyPr/>
+                    <a:lstStyle/>
+                    <a:p>
+                      <a:endParaRPr lang="fr-FR"/>
+                    </a:p>
+                  </a:txBody>
+                  <a:tcPr/>
+                </a:tc>
+                <a:tc>
+                  <a:txBody>
+                    <a:bodyPr/>
+                    <a:lstStyle/>
+                    <a:p>
+                      <a:endParaRPr lang="fr-FR"/>
+                    </a:p>
+                  </a:txBody>
+                  <a:tcPr/>
+                </a:tc>
+                <a:tc>
+                  <a:txBody>
+                    <a:bodyPr/>
+                    <a:lstStyle/>
+                    <a:p>
+                      <a:endParaRPr lang="fr-FR"/>
+                    </a:p>
+                  </a:txBody>
+                  <a:tcPr/>
+                </a:tc>
+                <a:tc>
+                  <a:txBody>
+                    <a:bodyPr/>
+                    <a:lstStyle/>
+                    <a:p>
+                      <a:endParaRPr lang="fr-FR"/>
+                    </a:p>
+                  </a:txBody>
+                  <a:tcPr/>
+                </a:tc>
+                <a:tc>
+                  <a:txBody>
+                    <a:bodyPr/>
+                    <a:lstStyle/>
+                    <a:p>
+                      <a:endParaRPr lang="fr-FR"/>
+                    </a:p>
+                  </a:txBody>
+                  <a:tcPr/>
+                </a:tc>
+                <a:tc>
+                  <a:txBody>
+                    <a:bodyPr/>
+                    <a:lstStyle/>
+                    <a:p>
+                      <a:endParaRPr lang="fr-FR"/>
+                    </a:p>
+                  </a:txBody>
+                  <a:tcPr/>
+                </a:tc>
+                <a:extLst>
+                  <a:ext uri="{0D108BD9-81ED-4DB2-BD59-A6C34878D82A}">
+                    <a16:rowId xmlns:a16="http://schemas.microsoft.com/office/drawing/2014/main" val="2225049468"/>
+                  </a:ext>
+                </a:extLst>
+              </a:tr>
+              <a:tr h="370840">
+                <a:tc>
+                  <a:txBody>
+                    <a:bodyPr/>
+                    <a:lstStyle/>
+                    <a:p>
+                      <a:endParaRPr lang="fr-FR" dirty="0"/>
+                    </a:p>
+                  </a:txBody>
+                  <a:tcPr/>
+                </a:tc>
+                <a:tc>
+                  <a:txBody>
+                    <a:bodyPr/>
+                    <a:lstStyle/>
+                    <a:p>
+                      <a:endParaRPr lang="fr-FR"/>
+                    </a:p>
+                  </a:txBody>
+                  <a:tcPr/>
+                </a:tc>
+                <a:tc>
+                  <a:txBody>
+                    <a:bodyPr/>
+                    <a:lstStyle/>
+                    <a:p>
+                      <a:endParaRPr lang="fr-FR"/>
+                    </a:p>
+                  </a:txBody>
+                  <a:tcPr/>
+                </a:tc>
+                <a:tc>
+                  <a:txBody>
+                    <a:bodyPr/>
+                    <a:lstStyle/>
+                    <a:p>
+                      <a:endParaRPr lang="fr-FR"/>
+                    </a:p>
+                  </a:txBody>
+                  <a:tcPr/>
+                </a:tc>
+                <a:tc>
+                  <a:txBody>
+                    <a:bodyPr/>
+                    <a:lstStyle/>
+                    <a:p>
+                      <a:endParaRPr lang="fr-FR"/>
+                    </a:p>
+                  </a:txBody>
+                  <a:tcPr/>
+                </a:tc>
+                <a:tc>
+                  <a:txBody>
+                    <a:bodyPr/>
+                    <a:lstStyle/>
+                    <a:p>
+                      <a:endParaRPr lang="fr-FR"/>
+                    </a:p>
+                  </a:txBody>
+                  <a:tcPr/>
+                </a:tc>
+                <a:tc>
+                  <a:txBody>
+                    <a:bodyPr/>
+                    <a:lstStyle/>
+                    <a:p>
+                      <a:endParaRPr lang="fr-FR"/>
+                    </a:p>
+                  </a:txBody>
+                  <a:tcPr/>
+                </a:tc>
+                <a:tc>
+                  <a:txBody>
+                    <a:bodyPr/>
+                    <a:lstStyle/>
+                    <a:p>
+                      <a:endParaRPr lang="fr-FR"/>
+                    </a:p>
+                  </a:txBody>
+                  <a:tcPr/>
+                </a:tc>
+                <a:tc>
+                  <a:txBody>
+                    <a:bodyPr/>
+                    <a:lstStyle/>
+                    <a:p>
+                      <a:endParaRPr lang="fr-FR"/>
+                    </a:p>
+                  </a:txBody>
+                  <a:tcPr/>
+                </a:tc>
+                <a:tc>
+                  <a:txBody>
+                    <a:bodyPr/>
+                    <a:lstStyle/>
+                    <a:p>
+                      <a:endParaRPr lang="fr-FR"/>
+                    </a:p>
+                  </a:txBody>
+                  <a:tcPr/>
+                </a:tc>
+                <a:tc>
+                  <a:txBody>
+                    <a:bodyPr/>
+                    <a:lstStyle/>
+                    <a:p>
+                      <a:endParaRPr lang="fr-FR"/>
+                    </a:p>
+                  </a:txBody>
+                  <a:tcPr/>
+                </a:tc>
+                <a:tc>
+                  <a:txBody>
+                    <a:bodyPr/>
+                    <a:lstStyle/>
+                    <a:p>
+                      <a:endParaRPr lang="fr-FR" dirty="0"/>
+                    </a:p>
+                  </a:txBody>
+                  <a:tcPr/>
+                </a:tc>
+                <a:extLst>
+                  <a:ext uri="{0D108BD9-81ED-4DB2-BD59-A6C34878D82A}">
+                    <a16:rowId xmlns:a16="http://schemas.microsoft.com/office/drawing/2014/main" val="2471833283"/>
+                  </a:ext>
+                </a:extLst>
+              </a:tr>
+            </a:tbl>
+          </a:graphicData>
+        </a:graphic>
+      </p:graphicFrame>
+      <p:sp>
+        <p:nvSpPr>
+          <p:cNvPr id="28" name="Rectangle : coins arrondis 27">
+            <a:extLst>
+              <a:ext uri="{FF2B5EF4-FFF2-40B4-BE49-F238E27FC236}">
+                <a16:creationId xmlns:a16="http://schemas.microsoft.com/office/drawing/2014/main" id="{8B79720D-3538-414C-8342-C3A2F5DA5690}"/>
+              </a:ext>
+            </a:extLst>
+          </p:cNvPr>
+          <p:cNvSpPr/>
+          <p:nvPr/>
+        </p:nvSpPr>
+        <p:spPr>
+          <a:xfrm>
+            <a:off x="2110742" y="3931920"/>
+            <a:ext cx="1899918" cy="254000"/>
+          </a:xfrm>
+          <a:prstGeom prst="roundRect">
+            <a:avLst/>
+          </a:prstGeom>
+          <a:solidFill>
+            <a:schemeClr val="bg1">
+              <a:lumMod val="95000"/>
+            </a:schemeClr>
+          </a:solidFill>
+        </p:spPr>
+        <p:style>
+          <a:lnRef idx="2">
+            <a:schemeClr val="accent1">
+              <a:shade val="50000"/>
+            </a:schemeClr>
+          </a:lnRef>
+          <a:fillRef idx="1">
+            <a:schemeClr val="accent1"/>
+          </a:fillRef>
+          <a:effectRef idx="0">
+            <a:schemeClr val="accent1"/>
+          </a:effectRef>
+          <a:fontRef idx="minor">
+            <a:schemeClr val="lt1"/>
+          </a:fontRef>
+        </p:style>
+        <p:txBody>
+          <a:bodyPr lIns="36000" rIns="36000" rtlCol="0" anchor="ctr">
+            <a:normAutofit fontScale="62500" lnSpcReduction="20000"/>
+          </a:bodyPr>
+          <a:lstStyle/>
+          <a:p>
+            <a:pPr algn="ctr"/>
+            <a:r>
+              <a:rPr lang="fr-FR" dirty="0" err="1">
+                <a:solidFill>
+                  <a:schemeClr val="tx1"/>
+                </a:solidFill>
+              </a:rPr>
+              <a:t>Ref</a:t>
+            </a:r>
+            <a:r>
+              <a:rPr lang="fr-FR" dirty="0">
+                <a:solidFill>
+                  <a:schemeClr val="tx1"/>
+                </a:solidFill>
+              </a:rPr>
+              <a:t> </a:t>
+            </a:r>
+            <a:r>
+              <a:rPr lang="fr-FR" dirty="0" err="1">
+                <a:solidFill>
+                  <a:schemeClr val="tx1"/>
+                </a:solidFill>
+              </a:rPr>
+              <a:t>TRonçon</a:t>
+            </a:r>
+            <a:endParaRPr lang="fr-FR" dirty="0">
+              <a:solidFill>
+                <a:schemeClr val="tx1"/>
+              </a:solidFill>
+            </a:endParaRPr>
+          </a:p>
+        </p:txBody>
+      </p:sp>
+      <p:sp>
+        <p:nvSpPr>
+          <p:cNvPr id="29" name="Rectangle : coins arrondis 28">
+            <a:extLst>
+              <a:ext uri="{FF2B5EF4-FFF2-40B4-BE49-F238E27FC236}">
+                <a16:creationId xmlns:a16="http://schemas.microsoft.com/office/drawing/2014/main" id="{85068A1D-72CE-4723-9B73-90CEE8DB6CAA}"/>
+              </a:ext>
+            </a:extLst>
+          </p:cNvPr>
+          <p:cNvSpPr/>
+          <p:nvPr/>
+        </p:nvSpPr>
+        <p:spPr>
+          <a:xfrm>
+            <a:off x="5095875" y="3925990"/>
+            <a:ext cx="5001894" cy="254000"/>
+          </a:xfrm>
+          <a:prstGeom prst="roundRect">
+            <a:avLst/>
+          </a:prstGeom>
+          <a:solidFill>
+            <a:schemeClr val="bg1">
+              <a:lumMod val="95000"/>
+            </a:schemeClr>
+          </a:solidFill>
+        </p:spPr>
+        <p:style>
+          <a:lnRef idx="2">
+            <a:schemeClr val="accent1">
+              <a:shade val="50000"/>
+            </a:schemeClr>
+          </a:lnRef>
+          <a:fillRef idx="1">
+            <a:schemeClr val="accent1"/>
+          </a:fillRef>
+          <a:effectRef idx="0">
+            <a:schemeClr val="accent1"/>
+          </a:effectRef>
+          <a:fontRef idx="minor">
+            <a:schemeClr val="lt1"/>
+          </a:fontRef>
+        </p:style>
+        <p:txBody>
+          <a:bodyPr lIns="36000" rIns="36000" rtlCol="0" anchor="ctr">
+            <a:normAutofit fontScale="62500" lnSpcReduction="20000"/>
+          </a:bodyPr>
+          <a:lstStyle/>
+          <a:p>
+            <a:pPr algn="ctr"/>
+            <a:r>
+              <a:rPr lang="fr-FR" dirty="0">
+                <a:solidFill>
+                  <a:schemeClr val="tx1"/>
+                </a:solidFill>
+              </a:rPr>
+              <a:t>(Pt-Edit) Pb Infos</a:t>
+            </a:r>
+          </a:p>
+        </p:txBody>
+      </p:sp>
+      <p:sp>
+        <p:nvSpPr>
+          <p:cNvPr id="30" name="Rectangle : coins arrondis 29">
+            <a:extLst>
+              <a:ext uri="{FF2B5EF4-FFF2-40B4-BE49-F238E27FC236}">
+                <a16:creationId xmlns:a16="http://schemas.microsoft.com/office/drawing/2014/main" id="{19520F62-186C-4A31-A229-AB236B518557}"/>
+              </a:ext>
+            </a:extLst>
+          </p:cNvPr>
+          <p:cNvSpPr/>
+          <p:nvPr/>
+        </p:nvSpPr>
+        <p:spPr>
+          <a:xfrm>
+            <a:off x="5126356" y="4293446"/>
+            <a:ext cx="883920" cy="254000"/>
+          </a:xfrm>
+          <a:prstGeom prst="roundRect">
+            <a:avLst/>
+          </a:prstGeom>
+          <a:solidFill>
+            <a:schemeClr val="bg1">
+              <a:lumMod val="95000"/>
+            </a:schemeClr>
+          </a:solidFill>
+        </p:spPr>
+        <p:style>
+          <a:lnRef idx="2">
+            <a:schemeClr val="accent1">
+              <a:shade val="50000"/>
+            </a:schemeClr>
+          </a:lnRef>
+          <a:fillRef idx="1">
+            <a:schemeClr val="accent1"/>
+          </a:fillRef>
+          <a:effectRef idx="0">
+            <a:schemeClr val="accent1"/>
+          </a:effectRef>
+          <a:fontRef idx="minor">
+            <a:schemeClr val="lt1"/>
+          </a:fontRef>
+        </p:style>
+        <p:txBody>
+          <a:bodyPr lIns="36000" rIns="36000" rtlCol="0" anchor="ctr">
+            <a:normAutofit fontScale="62500" lnSpcReduction="20000"/>
+          </a:bodyPr>
+          <a:lstStyle/>
+          <a:p>
+            <a:pPr algn="ctr"/>
+            <a:r>
+              <a:rPr lang="fr-FR" dirty="0">
+                <a:solidFill>
+                  <a:schemeClr val="tx1"/>
+                </a:solidFill>
+              </a:rPr>
+              <a:t>Nb EL</a:t>
+            </a:r>
+          </a:p>
+        </p:txBody>
+      </p:sp>
+      <p:sp>
+        <p:nvSpPr>
+          <p:cNvPr id="31" name="Rectangle : coins arrondis 30">
+            <a:extLst>
+              <a:ext uri="{FF2B5EF4-FFF2-40B4-BE49-F238E27FC236}">
+                <a16:creationId xmlns:a16="http://schemas.microsoft.com/office/drawing/2014/main" id="{6BF087DC-5C91-43FF-B401-654B050E8ACD}"/>
+              </a:ext>
+            </a:extLst>
+          </p:cNvPr>
+          <p:cNvSpPr/>
+          <p:nvPr/>
+        </p:nvSpPr>
+        <p:spPr>
+          <a:xfrm>
+            <a:off x="6149342" y="4293446"/>
+            <a:ext cx="883920" cy="254000"/>
+          </a:xfrm>
+          <a:prstGeom prst="roundRect">
+            <a:avLst/>
+          </a:prstGeom>
+          <a:solidFill>
+            <a:schemeClr val="bg1">
+              <a:lumMod val="95000"/>
+            </a:schemeClr>
+          </a:solidFill>
+        </p:spPr>
+        <p:style>
+          <a:lnRef idx="2">
+            <a:schemeClr val="accent1">
+              <a:shade val="50000"/>
+            </a:schemeClr>
+          </a:lnRef>
+          <a:fillRef idx="1">
+            <a:schemeClr val="accent1"/>
+          </a:fillRef>
+          <a:effectRef idx="0">
+            <a:schemeClr val="accent1"/>
+          </a:effectRef>
+          <a:fontRef idx="minor">
+            <a:schemeClr val="lt1"/>
+          </a:fontRef>
+        </p:style>
+        <p:txBody>
+          <a:bodyPr lIns="36000" rIns="36000" rtlCol="0" anchor="ctr">
+            <a:normAutofit fontScale="62500" lnSpcReduction="20000"/>
+          </a:bodyPr>
+          <a:lstStyle/>
+          <a:p>
+            <a:pPr algn="ctr"/>
+            <a:r>
+              <a:rPr lang="fr-FR" dirty="0">
+                <a:solidFill>
+                  <a:schemeClr val="tx1"/>
+                </a:solidFill>
+              </a:rPr>
+              <a:t>Nb Fibre</a:t>
+            </a:r>
+          </a:p>
+        </p:txBody>
+      </p:sp>
+      <p:sp>
+        <p:nvSpPr>
+          <p:cNvPr id="34" name="Rectangle : coins arrondis 33">
+            <a:extLst>
+              <a:ext uri="{FF2B5EF4-FFF2-40B4-BE49-F238E27FC236}">
+                <a16:creationId xmlns:a16="http://schemas.microsoft.com/office/drawing/2014/main" id="{69FF1D95-5165-4D90-8390-E3E40564F0A5}"/>
+              </a:ext>
+            </a:extLst>
+          </p:cNvPr>
+          <p:cNvSpPr/>
+          <p:nvPr/>
+        </p:nvSpPr>
+        <p:spPr>
+          <a:xfrm>
+            <a:off x="2110742" y="4668518"/>
+            <a:ext cx="7970516" cy="254000"/>
+          </a:xfrm>
+          <a:prstGeom prst="roundRect">
+            <a:avLst/>
+          </a:prstGeom>
+          <a:solidFill>
+            <a:schemeClr val="bg1">
+              <a:lumMod val="95000"/>
+            </a:schemeClr>
+          </a:solidFill>
+        </p:spPr>
+        <p:style>
+          <a:lnRef idx="2">
+            <a:schemeClr val="accent1">
+              <a:shade val="50000"/>
+            </a:schemeClr>
+          </a:lnRef>
+          <a:fillRef idx="1">
+            <a:schemeClr val="accent1"/>
+          </a:fillRef>
+          <a:effectRef idx="0">
+            <a:schemeClr val="accent1"/>
+          </a:effectRef>
+          <a:fontRef idx="minor">
+            <a:schemeClr val="lt1"/>
+          </a:fontRef>
+        </p:style>
+        <p:txBody>
+          <a:bodyPr lIns="36000" rIns="36000" rtlCol="0" anchor="ctr">
+            <a:normAutofit fontScale="62500" lnSpcReduction="20000"/>
+          </a:bodyPr>
+          <a:lstStyle/>
+          <a:p>
+            <a:pPr algn="ctr"/>
+            <a:r>
+              <a:rPr lang="fr-FR" dirty="0">
+                <a:solidFill>
+                  <a:schemeClr val="tx1"/>
+                </a:solidFill>
+              </a:rPr>
+              <a:t>Commentaire </a:t>
+            </a:r>
+            <a:r>
+              <a:rPr lang="fr-FR" dirty="0" err="1">
+                <a:solidFill>
+                  <a:schemeClr val="tx1"/>
+                </a:solidFill>
+              </a:rPr>
+              <a:t>Troncon</a:t>
+            </a:r>
+            <a:endParaRPr lang="fr-FR" dirty="0">
+              <a:solidFill>
+                <a:schemeClr val="tx1"/>
+              </a:solidFill>
+            </a:endParaRPr>
+          </a:p>
+        </p:txBody>
+      </p:sp>
+      <p:sp>
+        <p:nvSpPr>
+          <p:cNvPr id="35" name="Rectangle : coins arrondis 34">
+            <a:extLst>
+              <a:ext uri="{FF2B5EF4-FFF2-40B4-BE49-F238E27FC236}">
+                <a16:creationId xmlns:a16="http://schemas.microsoft.com/office/drawing/2014/main" id="{FED62D74-432E-45F4-BEC4-2FD64C1A127D}"/>
+              </a:ext>
+            </a:extLst>
+          </p:cNvPr>
+          <p:cNvSpPr/>
+          <p:nvPr/>
+        </p:nvSpPr>
+        <p:spPr>
+          <a:xfrm>
+            <a:off x="2110742" y="4298521"/>
+            <a:ext cx="870583" cy="254000"/>
+          </a:xfrm>
+          <a:prstGeom prst="roundRect">
+            <a:avLst/>
+          </a:prstGeom>
+          <a:solidFill>
+            <a:schemeClr val="bg1">
+              <a:lumMod val="95000"/>
+            </a:schemeClr>
+          </a:solidFill>
+        </p:spPr>
+        <p:style>
+          <a:lnRef idx="2">
+            <a:schemeClr val="accent1">
+              <a:shade val="50000"/>
+            </a:schemeClr>
+          </a:lnRef>
+          <a:fillRef idx="1">
+            <a:schemeClr val="accent1"/>
+          </a:fillRef>
+          <a:effectRef idx="0">
+            <a:schemeClr val="accent1"/>
+          </a:effectRef>
+          <a:fontRef idx="minor">
+            <a:schemeClr val="lt1"/>
+          </a:fontRef>
+        </p:style>
+        <p:txBody>
+          <a:bodyPr lIns="36000" rIns="36000" rtlCol="0" anchor="ctr">
+            <a:normAutofit fontScale="62500" lnSpcReduction="20000"/>
+          </a:bodyPr>
+          <a:lstStyle/>
+          <a:p>
+            <a:pPr algn="ctr"/>
+            <a:r>
+              <a:rPr lang="fr-FR" dirty="0" err="1">
+                <a:solidFill>
+                  <a:schemeClr val="tx1"/>
+                </a:solidFill>
+              </a:rPr>
+              <a:t>Bloquage</a:t>
+            </a:r>
+            <a:r>
+              <a:rPr lang="fr-FR" dirty="0">
+                <a:solidFill>
+                  <a:schemeClr val="tx1"/>
+                </a:solidFill>
+              </a:rPr>
+              <a:t>?</a:t>
+            </a:r>
+          </a:p>
+        </p:txBody>
+      </p:sp>
+      <p:sp>
+        <p:nvSpPr>
+          <p:cNvPr id="36" name="Rectangle : coins arrondis 35">
+            <a:extLst>
+              <a:ext uri="{FF2B5EF4-FFF2-40B4-BE49-F238E27FC236}">
+                <a16:creationId xmlns:a16="http://schemas.microsoft.com/office/drawing/2014/main" id="{84E482BA-EFFD-45E8-A1C4-D22AB0E01093}"/>
+              </a:ext>
+            </a:extLst>
+          </p:cNvPr>
+          <p:cNvSpPr/>
+          <p:nvPr/>
+        </p:nvSpPr>
+        <p:spPr>
+          <a:xfrm>
+            <a:off x="3075948" y="4300219"/>
+            <a:ext cx="934712" cy="254000"/>
+          </a:xfrm>
+          <a:prstGeom prst="roundRect">
+            <a:avLst/>
+          </a:prstGeom>
+          <a:solidFill>
+            <a:schemeClr val="bg1">
+              <a:lumMod val="95000"/>
+            </a:schemeClr>
+          </a:solidFill>
+        </p:spPr>
+        <p:style>
+          <a:lnRef idx="2">
+            <a:schemeClr val="accent1">
+              <a:shade val="50000"/>
+            </a:schemeClr>
+          </a:lnRef>
+          <a:fillRef idx="1">
+            <a:schemeClr val="accent1"/>
+          </a:fillRef>
+          <a:effectRef idx="0">
+            <a:schemeClr val="accent1"/>
+          </a:effectRef>
+          <a:fontRef idx="minor">
+            <a:schemeClr val="lt1"/>
+          </a:fontRef>
+        </p:style>
+        <p:txBody>
+          <a:bodyPr lIns="36000" rIns="36000" rtlCol="0" anchor="ctr">
+            <a:normAutofit fontScale="47500" lnSpcReduction="20000"/>
+          </a:bodyPr>
+          <a:lstStyle/>
+          <a:p>
+            <a:pPr algn="ctr"/>
+            <a:r>
+              <a:rPr lang="fr-FR" dirty="0" err="1">
+                <a:solidFill>
+                  <a:schemeClr val="tx1"/>
+                </a:solidFill>
+              </a:rPr>
+              <a:t>Sign</a:t>
+            </a:r>
+            <a:r>
+              <a:rPr lang="fr-FR" dirty="0">
+                <a:solidFill>
+                  <a:schemeClr val="tx1"/>
+                </a:solidFill>
+              </a:rPr>
+              <a:t>. Demandée?</a:t>
+            </a:r>
+          </a:p>
+        </p:txBody>
+      </p:sp>
+      <p:sp>
+        <p:nvSpPr>
+          <p:cNvPr id="37" name="Rectangle : coins arrondis 36">
+            <a:extLst>
+              <a:ext uri="{FF2B5EF4-FFF2-40B4-BE49-F238E27FC236}">
+                <a16:creationId xmlns:a16="http://schemas.microsoft.com/office/drawing/2014/main" id="{FBF0D8E9-74E2-48AC-9A51-4E02B558267A}"/>
+              </a:ext>
+            </a:extLst>
+          </p:cNvPr>
+          <p:cNvSpPr/>
+          <p:nvPr/>
+        </p:nvSpPr>
+        <p:spPr>
+          <a:xfrm>
+            <a:off x="4105283" y="4293446"/>
+            <a:ext cx="928363" cy="254000"/>
+          </a:xfrm>
+          <a:prstGeom prst="roundRect">
+            <a:avLst/>
+          </a:prstGeom>
+          <a:solidFill>
+            <a:schemeClr val="bg1">
+              <a:lumMod val="95000"/>
+            </a:schemeClr>
+          </a:solidFill>
+        </p:spPr>
+        <p:style>
+          <a:lnRef idx="2">
+            <a:schemeClr val="accent1">
+              <a:shade val="50000"/>
+            </a:schemeClr>
+          </a:lnRef>
+          <a:fillRef idx="1">
+            <a:schemeClr val="accent1"/>
+          </a:fillRef>
+          <a:effectRef idx="0">
+            <a:schemeClr val="accent1"/>
+          </a:effectRef>
+          <a:fontRef idx="minor">
+            <a:schemeClr val="lt1"/>
+          </a:fontRef>
+        </p:style>
+        <p:txBody>
+          <a:bodyPr lIns="36000" rIns="36000" rtlCol="0" anchor="ctr">
+            <a:normAutofit fontScale="55000" lnSpcReduction="20000"/>
+          </a:bodyPr>
+          <a:lstStyle/>
+          <a:p>
+            <a:pPr algn="ctr"/>
+            <a:r>
+              <a:rPr lang="fr-FR" dirty="0" err="1">
+                <a:solidFill>
+                  <a:schemeClr val="tx1"/>
+                </a:solidFill>
+              </a:rPr>
+              <a:t>Sign</a:t>
+            </a:r>
+            <a:r>
+              <a:rPr lang="fr-FR" dirty="0">
+                <a:solidFill>
+                  <a:schemeClr val="tx1"/>
+                </a:solidFill>
+              </a:rPr>
+              <a:t>. obtenue?</a:t>
+            </a:r>
+          </a:p>
+        </p:txBody>
+      </p:sp>
+      <p:sp>
+        <p:nvSpPr>
+          <p:cNvPr id="38" name="Rectangle : coins arrondis 37">
+            <a:extLst>
+              <a:ext uri="{FF2B5EF4-FFF2-40B4-BE49-F238E27FC236}">
+                <a16:creationId xmlns:a16="http://schemas.microsoft.com/office/drawing/2014/main" id="{42B50EE1-6EE5-459D-B390-6397E4C73EDF}"/>
+              </a:ext>
+            </a:extLst>
+          </p:cNvPr>
+          <p:cNvSpPr/>
+          <p:nvPr/>
+        </p:nvSpPr>
+        <p:spPr>
+          <a:xfrm>
+            <a:off x="7528562" y="4300219"/>
+            <a:ext cx="1219200" cy="254000"/>
+          </a:xfrm>
+          <a:prstGeom prst="roundRect">
+            <a:avLst/>
+          </a:prstGeom>
+          <a:solidFill>
+            <a:schemeClr val="bg1">
+              <a:lumMod val="95000"/>
+            </a:schemeClr>
+          </a:solidFill>
+        </p:spPr>
+        <p:style>
+          <a:lnRef idx="2">
+            <a:schemeClr val="accent1">
+              <a:shade val="50000"/>
+            </a:schemeClr>
+          </a:lnRef>
+          <a:fillRef idx="1">
+            <a:schemeClr val="accent1"/>
+          </a:fillRef>
+          <a:effectRef idx="0">
+            <a:schemeClr val="accent1"/>
+          </a:effectRef>
+          <a:fontRef idx="minor">
+            <a:schemeClr val="lt1"/>
+          </a:fontRef>
+        </p:style>
+        <p:txBody>
+          <a:bodyPr lIns="36000" rIns="36000" rtlCol="0" anchor="ctr">
+            <a:normAutofit fontScale="62500" lnSpcReduction="20000"/>
+          </a:bodyPr>
+          <a:lstStyle/>
+          <a:p>
+            <a:pPr algn="ctr"/>
+            <a:r>
+              <a:rPr lang="fr-FR" dirty="0">
+                <a:solidFill>
+                  <a:schemeClr val="tx1"/>
+                </a:solidFill>
+              </a:rPr>
+              <a:t>Date </a:t>
+            </a:r>
+            <a:r>
+              <a:rPr lang="fr-FR" dirty="0" err="1">
+                <a:solidFill>
+                  <a:schemeClr val="tx1"/>
+                </a:solidFill>
+              </a:rPr>
+              <a:t>Instal</a:t>
+            </a:r>
+            <a:r>
+              <a:rPr lang="fr-FR" dirty="0">
+                <a:solidFill>
+                  <a:schemeClr val="tx1"/>
+                </a:solidFill>
+              </a:rPr>
+              <a:t>.</a:t>
+            </a:r>
+          </a:p>
+        </p:txBody>
+      </p:sp>
+      <p:sp>
+        <p:nvSpPr>
+          <p:cNvPr id="39" name="Rectangle : coins arrondis 38">
+            <a:extLst>
+              <a:ext uri="{FF2B5EF4-FFF2-40B4-BE49-F238E27FC236}">
+                <a16:creationId xmlns:a16="http://schemas.microsoft.com/office/drawing/2014/main" id="{1B6BC3EB-6C7A-42C4-9082-DC0100328EA7}"/>
+              </a:ext>
+            </a:extLst>
+          </p:cNvPr>
+          <p:cNvSpPr/>
+          <p:nvPr/>
+        </p:nvSpPr>
+        <p:spPr>
+          <a:xfrm>
+            <a:off x="8862062" y="4300219"/>
+            <a:ext cx="1219200" cy="254000"/>
+          </a:xfrm>
+          <a:prstGeom prst="roundRect">
+            <a:avLst/>
+          </a:prstGeom>
+          <a:solidFill>
+            <a:schemeClr val="bg1">
+              <a:lumMod val="95000"/>
+            </a:schemeClr>
+          </a:solidFill>
+        </p:spPr>
+        <p:style>
+          <a:lnRef idx="2">
+            <a:schemeClr val="accent1">
+              <a:shade val="50000"/>
+            </a:schemeClr>
+          </a:lnRef>
+          <a:fillRef idx="1">
+            <a:schemeClr val="accent1"/>
+          </a:fillRef>
+          <a:effectRef idx="0">
+            <a:schemeClr val="accent1"/>
+          </a:effectRef>
+          <a:fontRef idx="minor">
+            <a:schemeClr val="lt1"/>
+          </a:fontRef>
+        </p:style>
+        <p:txBody>
+          <a:bodyPr lIns="36000" rIns="36000" rtlCol="0" anchor="ctr">
+            <a:normAutofit fontScale="62500" lnSpcReduction="20000"/>
+          </a:bodyPr>
+          <a:lstStyle/>
+          <a:p>
+            <a:pPr algn="ctr"/>
+            <a:r>
+              <a:rPr lang="fr-FR" dirty="0">
+                <a:solidFill>
+                  <a:schemeClr val="tx1"/>
+                </a:solidFill>
+              </a:rPr>
+              <a:t>Date Mesures</a:t>
+            </a:r>
+          </a:p>
+        </p:txBody>
+      </p:sp>
+      <p:cxnSp>
+        <p:nvCxnSpPr>
+          <p:cNvPr id="43" name="Connecteur : en angle 42">
+            <a:extLst>
+              <a:ext uri="{FF2B5EF4-FFF2-40B4-BE49-F238E27FC236}">
+                <a16:creationId xmlns:a16="http://schemas.microsoft.com/office/drawing/2014/main" id="{003AA5E5-6936-414C-A0F8-8720F54CCA1D}"/>
+              </a:ext>
+            </a:extLst>
+          </p:cNvPr>
+          <p:cNvCxnSpPr>
+            <a:endCxn id="34" idx="1"/>
+          </p:cNvCxnSpPr>
+          <p:nvPr/>
+        </p:nvCxnSpPr>
+        <p:spPr>
+          <a:xfrm rot="5400000">
+            <a:off x="1937071" y="4621846"/>
+            <a:ext cx="347343" cy="12700"/>
+          </a:xfrm>
+          <a:prstGeom prst="bentConnector4">
+            <a:avLst>
+              <a:gd name="adj1" fmla="val -3931"/>
+              <a:gd name="adj2" fmla="val 1749984"/>
+            </a:avLst>
+          </a:prstGeom>
+          <a:ln>
+            <a:tailEnd type="triangle"/>
+          </a:ln>
+        </p:spPr>
+        <p:style>
+          <a:lnRef idx="1">
+            <a:schemeClr val="accent1"/>
+          </a:lnRef>
+          <a:fillRef idx="0">
+            <a:schemeClr val="accent1"/>
+          </a:fillRef>
+          <a:effectRef idx="0">
+            <a:schemeClr val="accent1"/>
+          </a:effectRef>
+          <a:fontRef idx="minor">
+            <a:schemeClr val="tx1"/>
+          </a:fontRef>
+        </p:style>
+      </p:cxnSp>
+      <p:sp>
+        <p:nvSpPr>
+          <p:cNvPr id="46" name="Rectangle : coins arrondis 45">
+            <a:extLst>
+              <a:ext uri="{FF2B5EF4-FFF2-40B4-BE49-F238E27FC236}">
+                <a16:creationId xmlns:a16="http://schemas.microsoft.com/office/drawing/2014/main" id="{681707BD-FE61-407D-8EFD-4766C8B41E72}"/>
+              </a:ext>
+            </a:extLst>
+          </p:cNvPr>
+          <p:cNvSpPr/>
+          <p:nvPr/>
+        </p:nvSpPr>
+        <p:spPr>
+          <a:xfrm>
+            <a:off x="4110358" y="3931920"/>
+            <a:ext cx="923288" cy="254000"/>
+          </a:xfrm>
+          <a:prstGeom prst="roundRect">
+            <a:avLst/>
+          </a:prstGeom>
+          <a:solidFill>
+            <a:schemeClr val="bg1">
+              <a:lumMod val="95000"/>
+            </a:schemeClr>
+          </a:solidFill>
+        </p:spPr>
+        <p:style>
+          <a:lnRef idx="2">
+            <a:schemeClr val="accent1">
+              <a:shade val="50000"/>
+            </a:schemeClr>
+          </a:lnRef>
+          <a:fillRef idx="1">
+            <a:schemeClr val="accent1"/>
+          </a:fillRef>
+          <a:effectRef idx="0">
+            <a:schemeClr val="accent1"/>
+          </a:effectRef>
+          <a:fontRef idx="minor">
+            <a:schemeClr val="lt1"/>
+          </a:fontRef>
+        </p:style>
+        <p:txBody>
+          <a:bodyPr lIns="36000" rIns="36000" rtlCol="0" anchor="ctr">
+            <a:normAutofit fontScale="62500" lnSpcReduction="20000"/>
+          </a:bodyPr>
+          <a:lstStyle/>
+          <a:p>
+            <a:pPr algn="ctr"/>
+            <a:r>
+              <a:rPr lang="fr-FR" dirty="0">
+                <a:solidFill>
+                  <a:schemeClr val="tx1"/>
+                </a:solidFill>
+              </a:rPr>
+              <a:t>Etat Tronçon</a:t>
+            </a:r>
+          </a:p>
+        </p:txBody>
+      </p:sp>
+    </p:spTree>
+    <p:extLst>
+      <p:ext uri="{BB962C8B-B14F-4D97-AF65-F5344CB8AC3E}">
+        <p14:creationId xmlns:p14="http://schemas.microsoft.com/office/powerpoint/2010/main" val="3536465343"/>
+      </p:ext>
+    </p:extLst>
+  </p:cSld>
+  <p:clrMapOvr>
+    <a:masterClrMapping/>
+  </p:clrMapOvr>
+</p:sld>
+</file>
+
 <file path=ppt/theme/theme1.xml><?xml version="1.0" encoding="utf-8"?>
 <a:theme xmlns:a="http://schemas.openxmlformats.org/drawingml/2006/main" name="Thème Office">
   <a:themeElements>

</xml_diff>

<commit_message>
FE : Init Update Worksite (wip : add update modal)
</commit_message>
<xml_diff>
--- a/Design.pptx
+++ b/Design.pptx
@@ -7,6 +7,7 @@
   <p:sldIdLst>
     <p:sldId id="256" r:id="rId2"/>
     <p:sldId id="257" r:id="rId3"/>
+    <p:sldId id="258" r:id="rId4"/>
   </p:sldIdLst>
   <p:sldSz cx="12192000" cy="6858000"/>
   <p:notesSz cx="6858000" cy="9144000"/>
@@ -260,7 +261,7 @@
           <a:p>
             <a:fld id="{3E4F7BE1-B4D8-464A-B5E4-E95C61BD2B05}" type="datetimeFigureOut">
               <a:rPr lang="fr-FR" smtClean="0"/>
-              <a:t>31/12/2018</a:t>
+              <a:t>12/01/2019</a:t>
             </a:fld>
             <a:endParaRPr lang="fr-FR"/>
           </a:p>
@@ -458,7 +459,7 @@
           <a:p>
             <a:fld id="{3E4F7BE1-B4D8-464A-B5E4-E95C61BD2B05}" type="datetimeFigureOut">
               <a:rPr lang="fr-FR" smtClean="0"/>
-              <a:t>31/12/2018</a:t>
+              <a:t>12/01/2019</a:t>
             </a:fld>
             <a:endParaRPr lang="fr-FR"/>
           </a:p>
@@ -666,7 +667,7 @@
           <a:p>
             <a:fld id="{3E4F7BE1-B4D8-464A-B5E4-E95C61BD2B05}" type="datetimeFigureOut">
               <a:rPr lang="fr-FR" smtClean="0"/>
-              <a:t>31/12/2018</a:t>
+              <a:t>12/01/2019</a:t>
             </a:fld>
             <a:endParaRPr lang="fr-FR"/>
           </a:p>
@@ -864,7 +865,7 @@
           <a:p>
             <a:fld id="{3E4F7BE1-B4D8-464A-B5E4-E95C61BD2B05}" type="datetimeFigureOut">
               <a:rPr lang="fr-FR" smtClean="0"/>
-              <a:t>31/12/2018</a:t>
+              <a:t>12/01/2019</a:t>
             </a:fld>
             <a:endParaRPr lang="fr-FR"/>
           </a:p>
@@ -1139,7 +1140,7 @@
           <a:p>
             <a:fld id="{3E4F7BE1-B4D8-464A-B5E4-E95C61BD2B05}" type="datetimeFigureOut">
               <a:rPr lang="fr-FR" smtClean="0"/>
-              <a:t>31/12/2018</a:t>
+              <a:t>12/01/2019</a:t>
             </a:fld>
             <a:endParaRPr lang="fr-FR"/>
           </a:p>
@@ -1404,7 +1405,7 @@
           <a:p>
             <a:fld id="{3E4F7BE1-B4D8-464A-B5E4-E95C61BD2B05}" type="datetimeFigureOut">
               <a:rPr lang="fr-FR" smtClean="0"/>
-              <a:t>31/12/2018</a:t>
+              <a:t>12/01/2019</a:t>
             </a:fld>
             <a:endParaRPr lang="fr-FR"/>
           </a:p>
@@ -1816,7 +1817,7 @@
           <a:p>
             <a:fld id="{3E4F7BE1-B4D8-464A-B5E4-E95C61BD2B05}" type="datetimeFigureOut">
               <a:rPr lang="fr-FR" smtClean="0"/>
-              <a:t>31/12/2018</a:t>
+              <a:t>12/01/2019</a:t>
             </a:fld>
             <a:endParaRPr lang="fr-FR"/>
           </a:p>
@@ -1957,7 +1958,7 @@
           <a:p>
             <a:fld id="{3E4F7BE1-B4D8-464A-B5E4-E95C61BD2B05}" type="datetimeFigureOut">
               <a:rPr lang="fr-FR" smtClean="0"/>
-              <a:t>31/12/2018</a:t>
+              <a:t>12/01/2019</a:t>
             </a:fld>
             <a:endParaRPr lang="fr-FR"/>
           </a:p>
@@ -2070,7 +2071,7 @@
           <a:p>
             <a:fld id="{3E4F7BE1-B4D8-464A-B5E4-E95C61BD2B05}" type="datetimeFigureOut">
               <a:rPr lang="fr-FR" smtClean="0"/>
-              <a:t>31/12/2018</a:t>
+              <a:t>12/01/2019</a:t>
             </a:fld>
             <a:endParaRPr lang="fr-FR"/>
           </a:p>
@@ -2381,7 +2382,7 @@
           <a:p>
             <a:fld id="{3E4F7BE1-B4D8-464A-B5E4-E95C61BD2B05}" type="datetimeFigureOut">
               <a:rPr lang="fr-FR" smtClean="0"/>
-              <a:t>31/12/2018</a:t>
+              <a:t>12/01/2019</a:t>
             </a:fld>
             <a:endParaRPr lang="fr-FR"/>
           </a:p>
@@ -2669,7 +2670,7 @@
           <a:p>
             <a:fld id="{3E4F7BE1-B4D8-464A-B5E4-E95C61BD2B05}" type="datetimeFigureOut">
               <a:rPr lang="fr-FR" smtClean="0"/>
-              <a:t>31/12/2018</a:t>
+              <a:t>12/01/2019</a:t>
             </a:fld>
             <a:endParaRPr lang="fr-FR"/>
           </a:p>
@@ -2910,7 +2911,7 @@
           <a:p>
             <a:fld id="{3E4F7BE1-B4D8-464A-B5E4-E95C61BD2B05}" type="datetimeFigureOut">
               <a:rPr lang="fr-FR" smtClean="0"/>
-              <a:t>31/12/2018</a:t>
+              <a:t>12/01/2019</a:t>
             </a:fld>
             <a:endParaRPr lang="fr-FR"/>
           </a:p>
@@ -8084,6 +8085,2458 @@
 </p:sld>
 </file>
 
+<file path=ppt/slides/slide3.xml><?xml version="1.0" encoding="utf-8"?>
+<p:sld xmlns:a="http://schemas.openxmlformats.org/drawingml/2006/main" xmlns:r="http://schemas.openxmlformats.org/officeDocument/2006/relationships" xmlns:p="http://schemas.openxmlformats.org/presentationml/2006/main">
+  <p:cSld>
+    <p:spTree>
+      <p:nvGrpSpPr>
+        <p:cNvPr id="1" name=""/>
+        <p:cNvGrpSpPr/>
+        <p:nvPr/>
+      </p:nvGrpSpPr>
+      <p:grpSpPr>
+        <a:xfrm>
+          <a:off x="0" y="0"/>
+          <a:ext cx="0" cy="0"/>
+          <a:chOff x="0" y="0"/>
+          <a:chExt cx="0" cy="0"/>
+        </a:xfrm>
+      </p:grpSpPr>
+      <p:sp>
+        <p:nvSpPr>
+          <p:cNvPr id="16" name="ZoneTexte 15">
+            <a:extLst>
+              <a:ext uri="{FF2B5EF4-FFF2-40B4-BE49-F238E27FC236}">
+                <a16:creationId xmlns:a16="http://schemas.microsoft.com/office/drawing/2014/main" id="{3ED6CB9D-4892-44BC-8A89-A0E2925B7877}"/>
+              </a:ext>
+            </a:extLst>
+          </p:cNvPr>
+          <p:cNvSpPr txBox="1"/>
+          <p:nvPr/>
+        </p:nvSpPr>
+        <p:spPr>
+          <a:xfrm>
+            <a:off x="335280" y="160020"/>
+            <a:ext cx="4145280" cy="523220"/>
+          </a:xfrm>
+          <a:prstGeom prst="rect">
+            <a:avLst/>
+          </a:prstGeom>
+          <a:noFill/>
+        </p:spPr>
+        <p:txBody>
+          <a:bodyPr wrap="square" rtlCol="0">
+            <a:spAutoFit/>
+          </a:bodyPr>
+          <a:lstStyle/>
+          <a:p>
+            <a:r>
+              <a:rPr lang="fr-FR" sz="2800" dirty="0" err="1"/>
+              <a:t>Worksite</a:t>
+            </a:r>
+            <a:r>
+              <a:rPr lang="fr-FR" sz="2800" dirty="0"/>
+              <a:t>-update</a:t>
+            </a:r>
+          </a:p>
+        </p:txBody>
+      </p:sp>
+      <p:sp>
+        <p:nvSpPr>
+          <p:cNvPr id="3" name="Rectangle 2">
+            <a:extLst>
+              <a:ext uri="{FF2B5EF4-FFF2-40B4-BE49-F238E27FC236}">
+                <a16:creationId xmlns:a16="http://schemas.microsoft.com/office/drawing/2014/main" id="{99B14C60-7F68-477B-940B-B97369745A82}"/>
+              </a:ext>
+            </a:extLst>
+          </p:cNvPr>
+          <p:cNvSpPr/>
+          <p:nvPr/>
+        </p:nvSpPr>
+        <p:spPr>
+          <a:xfrm>
+            <a:off x="556247" y="736600"/>
+            <a:ext cx="10855182" cy="5854114"/>
+          </a:xfrm>
+          <a:prstGeom prst="rect">
+            <a:avLst/>
+          </a:prstGeom>
+          <a:solidFill>
+            <a:schemeClr val="bg1">
+              <a:lumMod val="95000"/>
+            </a:schemeClr>
+          </a:solidFill>
+          <a:ln>
+            <a:solidFill>
+              <a:schemeClr val="bg1">
+                <a:lumMod val="85000"/>
+              </a:schemeClr>
+            </a:solidFill>
+          </a:ln>
+        </p:spPr>
+        <p:style>
+          <a:lnRef idx="2">
+            <a:schemeClr val="accent1">
+              <a:shade val="50000"/>
+            </a:schemeClr>
+          </a:lnRef>
+          <a:fillRef idx="1">
+            <a:schemeClr val="accent1"/>
+          </a:fillRef>
+          <a:effectRef idx="0">
+            <a:schemeClr val="accent1"/>
+          </a:effectRef>
+          <a:fontRef idx="minor">
+            <a:schemeClr val="lt1"/>
+          </a:fontRef>
+        </p:style>
+        <p:txBody>
+          <a:bodyPr rtlCol="0" anchor="ctr"/>
+          <a:lstStyle/>
+          <a:p>
+            <a:pPr algn="ctr"/>
+            <a:endParaRPr lang="fr-FR" dirty="0"/>
+          </a:p>
+        </p:txBody>
+      </p:sp>
+      <p:sp>
+        <p:nvSpPr>
+          <p:cNvPr id="4" name="ZoneTexte 3">
+            <a:extLst>
+              <a:ext uri="{FF2B5EF4-FFF2-40B4-BE49-F238E27FC236}">
+                <a16:creationId xmlns:a16="http://schemas.microsoft.com/office/drawing/2014/main" id="{2FA7C2E2-5246-4D34-A3A9-49B8C1714ED5}"/>
+              </a:ext>
+            </a:extLst>
+          </p:cNvPr>
+          <p:cNvSpPr txBox="1"/>
+          <p:nvPr/>
+        </p:nvSpPr>
+        <p:spPr>
+          <a:xfrm>
+            <a:off x="836842" y="837028"/>
+            <a:ext cx="2415918" cy="369332"/>
+          </a:xfrm>
+          <a:prstGeom prst="rect">
+            <a:avLst/>
+          </a:prstGeom>
+          <a:noFill/>
+        </p:spPr>
+        <p:txBody>
+          <a:bodyPr wrap="square" rtlCol="0">
+            <a:spAutoFit/>
+          </a:bodyPr>
+          <a:lstStyle/>
+          <a:p>
+            <a:r>
+              <a:rPr lang="fr-FR" dirty="0"/>
+              <a:t>PA-59677-001E (</a:t>
+            </a:r>
+            <a:r>
+              <a:rPr lang="fr-FR" dirty="0" err="1"/>
+              <a:t>ws.Ref</a:t>
+            </a:r>
+            <a:r>
+              <a:rPr lang="fr-FR" dirty="0"/>
+              <a:t>)</a:t>
+            </a:r>
+          </a:p>
+        </p:txBody>
+      </p:sp>
+      <p:sp>
+        <p:nvSpPr>
+          <p:cNvPr id="17" name="ZoneTexte 16">
+            <a:extLst>
+              <a:ext uri="{FF2B5EF4-FFF2-40B4-BE49-F238E27FC236}">
+                <a16:creationId xmlns:a16="http://schemas.microsoft.com/office/drawing/2014/main" id="{5134B3A0-4CB8-48D0-9C1C-431136313EC1}"/>
+              </a:ext>
+            </a:extLst>
+          </p:cNvPr>
+          <p:cNvSpPr txBox="1"/>
+          <p:nvPr/>
+        </p:nvSpPr>
+        <p:spPr>
+          <a:xfrm>
+            <a:off x="836842" y="1306788"/>
+            <a:ext cx="2539734" cy="338554"/>
+          </a:xfrm>
+          <a:prstGeom prst="rect">
+            <a:avLst/>
+          </a:prstGeom>
+          <a:noFill/>
+        </p:spPr>
+        <p:txBody>
+          <a:bodyPr wrap="square" rtlCol="0">
+            <a:spAutoFit/>
+          </a:bodyPr>
+          <a:lstStyle/>
+          <a:p>
+            <a:r>
+              <a:rPr lang="fr-FR" sz="1600" dirty="0"/>
+              <a:t>F1234501022006 (</a:t>
+            </a:r>
+            <a:r>
+              <a:rPr lang="fr-FR" sz="1600" dirty="0" err="1"/>
+              <a:t>ws.O.Ref</a:t>
+            </a:r>
+            <a:r>
+              <a:rPr lang="fr-FR" sz="1600" dirty="0"/>
+              <a:t>)</a:t>
+            </a:r>
+          </a:p>
+        </p:txBody>
+      </p:sp>
+      <p:sp>
+        <p:nvSpPr>
+          <p:cNvPr id="18" name="ZoneTexte 17">
+            <a:extLst>
+              <a:ext uri="{FF2B5EF4-FFF2-40B4-BE49-F238E27FC236}">
+                <a16:creationId xmlns:a16="http://schemas.microsoft.com/office/drawing/2014/main" id="{CCE92420-313D-4430-86F5-2112A48C29AA}"/>
+              </a:ext>
+            </a:extLst>
+          </p:cNvPr>
+          <p:cNvSpPr txBox="1"/>
+          <p:nvPr/>
+        </p:nvSpPr>
+        <p:spPr>
+          <a:xfrm>
+            <a:off x="1108817" y="1614192"/>
+            <a:ext cx="2167453" cy="338554"/>
+          </a:xfrm>
+          <a:prstGeom prst="rect">
+            <a:avLst/>
+          </a:prstGeom>
+          <a:noFill/>
+        </p:spPr>
+        <p:txBody>
+          <a:bodyPr wrap="square" rtlCol="0">
+            <a:spAutoFit/>
+          </a:bodyPr>
+          <a:lstStyle/>
+          <a:p>
+            <a:r>
+              <a:rPr lang="fr-FR" sz="1600" dirty="0"/>
+              <a:t>TR-18-0001 (</a:t>
+            </a:r>
+            <a:r>
+              <a:rPr lang="fr-FR" sz="1600" dirty="0" err="1"/>
+              <a:t>ws.O.T.Ref</a:t>
+            </a:r>
+            <a:r>
+              <a:rPr lang="fr-FR" sz="1600" dirty="0"/>
+              <a:t>)</a:t>
+            </a:r>
+          </a:p>
+        </p:txBody>
+      </p:sp>
+      <p:sp>
+        <p:nvSpPr>
+          <p:cNvPr id="19" name="Triangle isocèle 18">
+            <a:extLst>
+              <a:ext uri="{FF2B5EF4-FFF2-40B4-BE49-F238E27FC236}">
+                <a16:creationId xmlns:a16="http://schemas.microsoft.com/office/drawing/2014/main" id="{1598BBE3-827C-475A-836B-114CB47AA742}"/>
+              </a:ext>
+            </a:extLst>
+          </p:cNvPr>
+          <p:cNvSpPr/>
+          <p:nvPr/>
+        </p:nvSpPr>
+        <p:spPr>
+          <a:xfrm rot="10800000">
+            <a:off x="780571" y="1416277"/>
+            <a:ext cx="112542" cy="119576"/>
+          </a:xfrm>
+          <a:prstGeom prst="triangle">
+            <a:avLst/>
+          </a:prstGeom>
+        </p:spPr>
+        <p:style>
+          <a:lnRef idx="2">
+            <a:schemeClr val="accent1">
+              <a:shade val="50000"/>
+            </a:schemeClr>
+          </a:lnRef>
+          <a:fillRef idx="1">
+            <a:schemeClr val="accent1"/>
+          </a:fillRef>
+          <a:effectRef idx="0">
+            <a:schemeClr val="accent1"/>
+          </a:effectRef>
+          <a:fontRef idx="minor">
+            <a:schemeClr val="lt1"/>
+          </a:fontRef>
+        </p:style>
+        <p:txBody>
+          <a:bodyPr rtlCol="0" anchor="ctr"/>
+          <a:lstStyle/>
+          <a:p>
+            <a:pPr algn="ctr"/>
+            <a:endParaRPr lang="fr-FR"/>
+          </a:p>
+        </p:txBody>
+      </p:sp>
+      <p:sp>
+        <p:nvSpPr>
+          <p:cNvPr id="20" name="Triangle isocèle 19">
+            <a:extLst>
+              <a:ext uri="{FF2B5EF4-FFF2-40B4-BE49-F238E27FC236}">
+                <a16:creationId xmlns:a16="http://schemas.microsoft.com/office/drawing/2014/main" id="{3E6BC66A-48BA-4799-B2DD-CB80D2C1D96D}"/>
+              </a:ext>
+            </a:extLst>
+          </p:cNvPr>
+          <p:cNvSpPr/>
+          <p:nvPr/>
+        </p:nvSpPr>
+        <p:spPr>
+          <a:xfrm rot="10800000">
+            <a:off x="1026573" y="1723681"/>
+            <a:ext cx="112542" cy="119576"/>
+          </a:xfrm>
+          <a:prstGeom prst="triangle">
+            <a:avLst/>
+          </a:prstGeom>
+        </p:spPr>
+        <p:style>
+          <a:lnRef idx="2">
+            <a:schemeClr val="accent1">
+              <a:shade val="50000"/>
+            </a:schemeClr>
+          </a:lnRef>
+          <a:fillRef idx="1">
+            <a:schemeClr val="accent1"/>
+          </a:fillRef>
+          <a:effectRef idx="0">
+            <a:schemeClr val="accent1"/>
+          </a:effectRef>
+          <a:fontRef idx="minor">
+            <a:schemeClr val="lt1"/>
+          </a:fontRef>
+        </p:style>
+        <p:txBody>
+          <a:bodyPr rtlCol="0" anchor="ctr"/>
+          <a:lstStyle/>
+          <a:p>
+            <a:pPr algn="ctr"/>
+            <a:endParaRPr lang="fr-FR"/>
+          </a:p>
+        </p:txBody>
+      </p:sp>
+      <p:sp>
+        <p:nvSpPr>
+          <p:cNvPr id="21" name="Rectangle : coins arrondis 20">
+            <a:extLst>
+              <a:ext uri="{FF2B5EF4-FFF2-40B4-BE49-F238E27FC236}">
+                <a16:creationId xmlns:a16="http://schemas.microsoft.com/office/drawing/2014/main" id="{BA8EE268-BDD7-4747-B778-8AF5645D314C}"/>
+              </a:ext>
+            </a:extLst>
+          </p:cNvPr>
+          <p:cNvSpPr/>
+          <p:nvPr/>
+        </p:nvSpPr>
+        <p:spPr>
+          <a:xfrm>
+            <a:off x="8855613" y="894694"/>
+            <a:ext cx="1767251" cy="254000"/>
+          </a:xfrm>
+          <a:prstGeom prst="roundRect">
+            <a:avLst/>
+          </a:prstGeom>
+          <a:solidFill>
+            <a:schemeClr val="bg1">
+              <a:lumMod val="95000"/>
+            </a:schemeClr>
+          </a:solidFill>
+        </p:spPr>
+        <p:style>
+          <a:lnRef idx="2">
+            <a:schemeClr val="accent1">
+              <a:shade val="50000"/>
+            </a:schemeClr>
+          </a:lnRef>
+          <a:fillRef idx="1">
+            <a:schemeClr val="accent1"/>
+          </a:fillRef>
+          <a:effectRef idx="0">
+            <a:schemeClr val="accent1"/>
+          </a:effectRef>
+          <a:fontRef idx="minor">
+            <a:schemeClr val="lt1"/>
+          </a:fontRef>
+        </p:style>
+        <p:txBody>
+          <a:bodyPr lIns="36000" rIns="36000" rtlCol="0" anchor="ctr">
+            <a:normAutofit fontScale="62500" lnSpcReduction="20000"/>
+          </a:bodyPr>
+          <a:lstStyle/>
+          <a:p>
+            <a:pPr algn="ctr"/>
+            <a:r>
+              <a:rPr lang="fr-FR" dirty="0" err="1">
+                <a:solidFill>
+                  <a:schemeClr val="tx1"/>
+                </a:solidFill>
+              </a:rPr>
+              <a:t>Search</a:t>
+            </a:r>
+            <a:r>
+              <a:rPr lang="fr-FR" dirty="0">
+                <a:solidFill>
+                  <a:schemeClr val="tx1"/>
+                </a:solidFill>
+              </a:rPr>
+              <a:t>?</a:t>
+            </a:r>
+          </a:p>
+        </p:txBody>
+      </p:sp>
+      <p:sp>
+        <p:nvSpPr>
+          <p:cNvPr id="22" name="ZoneTexte 21">
+            <a:extLst>
+              <a:ext uri="{FF2B5EF4-FFF2-40B4-BE49-F238E27FC236}">
+                <a16:creationId xmlns:a16="http://schemas.microsoft.com/office/drawing/2014/main" id="{83AA44DF-13B9-4312-9857-AB0912E39520}"/>
+              </a:ext>
+            </a:extLst>
+          </p:cNvPr>
+          <p:cNvSpPr txBox="1"/>
+          <p:nvPr/>
+        </p:nvSpPr>
+        <p:spPr>
+          <a:xfrm>
+            <a:off x="4196801" y="1621577"/>
+            <a:ext cx="612668" cy="338554"/>
+          </a:xfrm>
+          <a:prstGeom prst="rect">
+            <a:avLst/>
+          </a:prstGeom>
+          <a:noFill/>
+        </p:spPr>
+        <p:txBody>
+          <a:bodyPr wrap="square" rtlCol="0">
+            <a:spAutoFit/>
+          </a:bodyPr>
+          <a:lstStyle/>
+          <a:p>
+            <a:r>
+              <a:rPr lang="fr-FR" sz="1600" dirty="0" err="1"/>
+              <a:t>NbEL</a:t>
+            </a:r>
+            <a:endParaRPr lang="fr-FR" sz="1600" dirty="0"/>
+          </a:p>
+        </p:txBody>
+      </p:sp>
+      <p:sp>
+        <p:nvSpPr>
+          <p:cNvPr id="23" name="Rectangle : coins arrondis 22">
+            <a:extLst>
+              <a:ext uri="{FF2B5EF4-FFF2-40B4-BE49-F238E27FC236}">
+                <a16:creationId xmlns:a16="http://schemas.microsoft.com/office/drawing/2014/main" id="{AEC1DD85-B86A-4DE5-81FC-3D086A16827A}"/>
+              </a:ext>
+            </a:extLst>
+          </p:cNvPr>
+          <p:cNvSpPr/>
+          <p:nvPr/>
+        </p:nvSpPr>
+        <p:spPr>
+          <a:xfrm>
+            <a:off x="3252225" y="1672044"/>
+            <a:ext cx="923288" cy="254000"/>
+          </a:xfrm>
+          <a:prstGeom prst="roundRect">
+            <a:avLst/>
+          </a:prstGeom>
+          <a:solidFill>
+            <a:schemeClr val="accent1">
+              <a:lumMod val="20000"/>
+              <a:lumOff val="80000"/>
+            </a:schemeClr>
+          </a:solidFill>
+        </p:spPr>
+        <p:style>
+          <a:lnRef idx="2">
+            <a:schemeClr val="accent1">
+              <a:shade val="50000"/>
+            </a:schemeClr>
+          </a:lnRef>
+          <a:fillRef idx="1">
+            <a:schemeClr val="accent1"/>
+          </a:fillRef>
+          <a:effectRef idx="0">
+            <a:schemeClr val="accent1"/>
+          </a:effectRef>
+          <a:fontRef idx="minor">
+            <a:schemeClr val="lt1"/>
+          </a:fontRef>
+        </p:style>
+        <p:txBody>
+          <a:bodyPr lIns="36000" rIns="36000" rtlCol="0" anchor="ctr">
+            <a:normAutofit fontScale="62500" lnSpcReduction="20000"/>
+          </a:bodyPr>
+          <a:lstStyle/>
+          <a:p>
+            <a:pPr algn="ctr"/>
+            <a:r>
+              <a:rPr lang="fr-FR" dirty="0">
+                <a:solidFill>
+                  <a:schemeClr val="tx1"/>
+                </a:solidFill>
+              </a:rPr>
+              <a:t>Etat Tronçon</a:t>
+            </a:r>
+          </a:p>
+        </p:txBody>
+      </p:sp>
+      <p:sp>
+        <p:nvSpPr>
+          <p:cNvPr id="24" name="Rectangle : coins arrondis 23">
+            <a:extLst>
+              <a:ext uri="{FF2B5EF4-FFF2-40B4-BE49-F238E27FC236}">
+                <a16:creationId xmlns:a16="http://schemas.microsoft.com/office/drawing/2014/main" id="{09F8C9E6-B312-4481-A9BB-ECC542B76233}"/>
+              </a:ext>
+            </a:extLst>
+          </p:cNvPr>
+          <p:cNvSpPr/>
+          <p:nvPr/>
+        </p:nvSpPr>
+        <p:spPr>
+          <a:xfrm>
+            <a:off x="1605424" y="2023944"/>
+            <a:ext cx="884444" cy="254000"/>
+          </a:xfrm>
+          <a:prstGeom prst="roundRect">
+            <a:avLst/>
+          </a:prstGeom>
+          <a:solidFill>
+            <a:schemeClr val="bg1">
+              <a:lumMod val="95000"/>
+            </a:schemeClr>
+          </a:solidFill>
+        </p:spPr>
+        <p:style>
+          <a:lnRef idx="2">
+            <a:schemeClr val="accent1">
+              <a:shade val="50000"/>
+            </a:schemeClr>
+          </a:lnRef>
+          <a:fillRef idx="1">
+            <a:schemeClr val="accent1"/>
+          </a:fillRef>
+          <a:effectRef idx="0">
+            <a:schemeClr val="accent1"/>
+          </a:effectRef>
+          <a:fontRef idx="minor">
+            <a:schemeClr val="lt1"/>
+          </a:fontRef>
+        </p:style>
+        <p:txBody>
+          <a:bodyPr lIns="36000" rIns="36000" rtlCol="0" anchor="ctr">
+            <a:normAutofit fontScale="62500" lnSpcReduction="20000"/>
+          </a:bodyPr>
+          <a:lstStyle/>
+          <a:p>
+            <a:pPr algn="ctr"/>
+            <a:r>
+              <a:rPr lang="fr-FR" dirty="0">
+                <a:solidFill>
+                  <a:schemeClr val="tx1"/>
+                </a:solidFill>
+              </a:rPr>
+              <a:t>Date </a:t>
+            </a:r>
+            <a:r>
+              <a:rPr lang="fr-FR" dirty="0" err="1">
+                <a:solidFill>
+                  <a:schemeClr val="tx1"/>
+                </a:solidFill>
+              </a:rPr>
+              <a:t>Instal</a:t>
+            </a:r>
+            <a:r>
+              <a:rPr lang="fr-FR" dirty="0">
+                <a:solidFill>
+                  <a:schemeClr val="tx1"/>
+                </a:solidFill>
+              </a:rPr>
+              <a:t>.</a:t>
+            </a:r>
+          </a:p>
+        </p:txBody>
+      </p:sp>
+      <p:sp>
+        <p:nvSpPr>
+          <p:cNvPr id="25" name="Rectangle : coins arrondis 24">
+            <a:extLst>
+              <a:ext uri="{FF2B5EF4-FFF2-40B4-BE49-F238E27FC236}">
+                <a16:creationId xmlns:a16="http://schemas.microsoft.com/office/drawing/2014/main" id="{0A167D88-421A-4B18-8C35-0F388A8B9093}"/>
+              </a:ext>
+            </a:extLst>
+          </p:cNvPr>
+          <p:cNvSpPr/>
+          <p:nvPr/>
+        </p:nvSpPr>
+        <p:spPr>
+          <a:xfrm>
+            <a:off x="3767463" y="2023944"/>
+            <a:ext cx="978266" cy="254000"/>
+          </a:xfrm>
+          <a:prstGeom prst="roundRect">
+            <a:avLst/>
+          </a:prstGeom>
+          <a:solidFill>
+            <a:schemeClr val="bg1">
+              <a:lumMod val="95000"/>
+            </a:schemeClr>
+          </a:solidFill>
+        </p:spPr>
+        <p:style>
+          <a:lnRef idx="2">
+            <a:schemeClr val="accent1">
+              <a:shade val="50000"/>
+            </a:schemeClr>
+          </a:lnRef>
+          <a:fillRef idx="1">
+            <a:schemeClr val="accent1"/>
+          </a:fillRef>
+          <a:effectRef idx="0">
+            <a:schemeClr val="accent1"/>
+          </a:effectRef>
+          <a:fontRef idx="minor">
+            <a:schemeClr val="lt1"/>
+          </a:fontRef>
+        </p:style>
+        <p:txBody>
+          <a:bodyPr lIns="36000" rIns="36000" rtlCol="0" anchor="ctr">
+            <a:normAutofit fontScale="62500" lnSpcReduction="20000"/>
+          </a:bodyPr>
+          <a:lstStyle/>
+          <a:p>
+            <a:pPr algn="ctr"/>
+            <a:r>
+              <a:rPr lang="fr-FR" dirty="0">
+                <a:solidFill>
+                  <a:schemeClr val="tx1"/>
+                </a:solidFill>
+              </a:rPr>
+              <a:t>Date Mesures</a:t>
+            </a:r>
+          </a:p>
+        </p:txBody>
+      </p:sp>
+      <p:sp>
+        <p:nvSpPr>
+          <p:cNvPr id="33" name="Rectangle : coins arrondis 32">
+            <a:extLst>
+              <a:ext uri="{FF2B5EF4-FFF2-40B4-BE49-F238E27FC236}">
+                <a16:creationId xmlns:a16="http://schemas.microsoft.com/office/drawing/2014/main" id="{66046D67-9FB7-41DE-97B5-AA5B4A747829}"/>
+              </a:ext>
+            </a:extLst>
+          </p:cNvPr>
+          <p:cNvSpPr/>
+          <p:nvPr/>
+        </p:nvSpPr>
+        <p:spPr>
+          <a:xfrm>
+            <a:off x="2543901" y="2023944"/>
+            <a:ext cx="1035387" cy="254000"/>
+          </a:xfrm>
+          <a:prstGeom prst="roundRect">
+            <a:avLst/>
+          </a:prstGeom>
+          <a:solidFill>
+            <a:schemeClr val="bg1">
+              <a:lumMod val="95000"/>
+            </a:schemeClr>
+          </a:solidFill>
+        </p:spPr>
+        <p:style>
+          <a:lnRef idx="2">
+            <a:schemeClr val="accent1">
+              <a:shade val="50000"/>
+            </a:schemeClr>
+          </a:lnRef>
+          <a:fillRef idx="1">
+            <a:schemeClr val="accent1"/>
+          </a:fillRef>
+          <a:effectRef idx="0">
+            <a:schemeClr val="accent1"/>
+          </a:effectRef>
+          <a:fontRef idx="minor">
+            <a:schemeClr val="lt1"/>
+          </a:fontRef>
+        </p:style>
+        <p:txBody>
+          <a:bodyPr lIns="36000" rIns="36000" rtlCol="0" anchor="ctr">
+            <a:normAutofit fontScale="62500" lnSpcReduction="20000"/>
+          </a:bodyPr>
+          <a:lstStyle/>
+          <a:p>
+            <a:pPr algn="ctr"/>
+            <a:r>
+              <a:rPr lang="fr-FR" dirty="0">
+                <a:solidFill>
+                  <a:schemeClr val="tx1"/>
+                </a:solidFill>
+              </a:rPr>
+              <a:t>&gt; Acteur Install.</a:t>
+            </a:r>
+          </a:p>
+        </p:txBody>
+      </p:sp>
+      <p:sp>
+        <p:nvSpPr>
+          <p:cNvPr id="34" name="Rectangle : coins arrondis 33">
+            <a:extLst>
+              <a:ext uri="{FF2B5EF4-FFF2-40B4-BE49-F238E27FC236}">
+                <a16:creationId xmlns:a16="http://schemas.microsoft.com/office/drawing/2014/main" id="{537C9748-DB27-47B0-B466-202C05896A24}"/>
+              </a:ext>
+            </a:extLst>
+          </p:cNvPr>
+          <p:cNvSpPr/>
+          <p:nvPr/>
+        </p:nvSpPr>
+        <p:spPr>
+          <a:xfrm>
+            <a:off x="4810126" y="2023944"/>
+            <a:ext cx="1035387" cy="254000"/>
+          </a:xfrm>
+          <a:prstGeom prst="roundRect">
+            <a:avLst/>
+          </a:prstGeom>
+          <a:solidFill>
+            <a:schemeClr val="bg1">
+              <a:lumMod val="95000"/>
+            </a:schemeClr>
+          </a:solidFill>
+        </p:spPr>
+        <p:style>
+          <a:lnRef idx="2">
+            <a:schemeClr val="accent1">
+              <a:shade val="50000"/>
+            </a:schemeClr>
+          </a:lnRef>
+          <a:fillRef idx="1">
+            <a:schemeClr val="accent1"/>
+          </a:fillRef>
+          <a:effectRef idx="0">
+            <a:schemeClr val="accent1"/>
+          </a:effectRef>
+          <a:fontRef idx="minor">
+            <a:schemeClr val="lt1"/>
+          </a:fontRef>
+        </p:style>
+        <p:txBody>
+          <a:bodyPr lIns="36000" rIns="36000" rtlCol="0" anchor="ctr">
+            <a:normAutofit fontScale="62500" lnSpcReduction="20000"/>
+          </a:bodyPr>
+          <a:lstStyle/>
+          <a:p>
+            <a:pPr algn="ctr"/>
+            <a:r>
+              <a:rPr lang="fr-FR" dirty="0">
+                <a:solidFill>
+                  <a:schemeClr val="tx1"/>
+                </a:solidFill>
+              </a:rPr>
+              <a:t>&gt; Acteur Mes.</a:t>
+            </a:r>
+          </a:p>
+        </p:txBody>
+      </p:sp>
+      <p:sp>
+        <p:nvSpPr>
+          <p:cNvPr id="35" name="Rectangle : coins arrondis 34">
+            <a:extLst>
+              <a:ext uri="{FF2B5EF4-FFF2-40B4-BE49-F238E27FC236}">
+                <a16:creationId xmlns:a16="http://schemas.microsoft.com/office/drawing/2014/main" id="{D50978E4-23A7-405E-8935-912EA2C4AACF}"/>
+              </a:ext>
+            </a:extLst>
+          </p:cNvPr>
+          <p:cNvSpPr/>
+          <p:nvPr/>
+        </p:nvSpPr>
+        <p:spPr>
+          <a:xfrm>
+            <a:off x="6186062" y="2023944"/>
+            <a:ext cx="1762184" cy="254000"/>
+          </a:xfrm>
+          <a:prstGeom prst="roundRect">
+            <a:avLst/>
+          </a:prstGeom>
+          <a:solidFill>
+            <a:schemeClr val="bg1">
+              <a:lumMod val="95000"/>
+            </a:schemeClr>
+          </a:solidFill>
+        </p:spPr>
+        <p:style>
+          <a:lnRef idx="2">
+            <a:schemeClr val="accent1">
+              <a:shade val="50000"/>
+            </a:schemeClr>
+          </a:lnRef>
+          <a:fillRef idx="1">
+            <a:schemeClr val="accent1"/>
+          </a:fillRef>
+          <a:effectRef idx="0">
+            <a:schemeClr val="accent1"/>
+          </a:effectRef>
+          <a:fontRef idx="minor">
+            <a:schemeClr val="lt1"/>
+          </a:fontRef>
+        </p:style>
+        <p:txBody>
+          <a:bodyPr lIns="36000" rIns="36000" rtlCol="0" anchor="ctr">
+            <a:normAutofit fontScale="62500" lnSpcReduction="20000"/>
+          </a:bodyPr>
+          <a:lstStyle/>
+          <a:p>
+            <a:r>
+              <a:rPr lang="fr-FR" dirty="0">
+                <a:solidFill>
+                  <a:schemeClr val="tx1"/>
+                </a:solidFill>
+              </a:rPr>
+              <a:t>&gt; Reprise</a:t>
+            </a:r>
+          </a:p>
+        </p:txBody>
+      </p:sp>
+      <p:sp>
+        <p:nvSpPr>
+          <p:cNvPr id="36" name="Rectangle : coins arrondis 35">
+            <a:extLst>
+              <a:ext uri="{FF2B5EF4-FFF2-40B4-BE49-F238E27FC236}">
+                <a16:creationId xmlns:a16="http://schemas.microsoft.com/office/drawing/2014/main" id="{42531995-D2AE-4D0F-AA7C-6984E5257847}"/>
+              </a:ext>
+            </a:extLst>
+          </p:cNvPr>
+          <p:cNvSpPr/>
+          <p:nvPr/>
+        </p:nvSpPr>
+        <p:spPr>
+          <a:xfrm>
+            <a:off x="8027629" y="2023944"/>
+            <a:ext cx="978266" cy="254000"/>
+          </a:xfrm>
+          <a:prstGeom prst="roundRect">
+            <a:avLst/>
+          </a:prstGeom>
+          <a:solidFill>
+            <a:schemeClr val="bg1">
+              <a:lumMod val="95000"/>
+            </a:schemeClr>
+          </a:solidFill>
+        </p:spPr>
+        <p:style>
+          <a:lnRef idx="2">
+            <a:schemeClr val="accent1">
+              <a:shade val="50000"/>
+            </a:schemeClr>
+          </a:lnRef>
+          <a:fillRef idx="1">
+            <a:schemeClr val="accent1"/>
+          </a:fillRef>
+          <a:effectRef idx="0">
+            <a:schemeClr val="accent1"/>
+          </a:effectRef>
+          <a:fontRef idx="minor">
+            <a:schemeClr val="lt1"/>
+          </a:fontRef>
+        </p:style>
+        <p:txBody>
+          <a:bodyPr lIns="36000" rIns="36000" rtlCol="0" anchor="ctr">
+            <a:normAutofit fontScale="62500" lnSpcReduction="20000"/>
+          </a:bodyPr>
+          <a:lstStyle/>
+          <a:p>
+            <a:pPr algn="ctr"/>
+            <a:r>
+              <a:rPr lang="fr-FR" dirty="0">
+                <a:solidFill>
+                  <a:schemeClr val="tx1"/>
+                </a:solidFill>
+              </a:rPr>
+              <a:t>Date Reprise</a:t>
+            </a:r>
+          </a:p>
+        </p:txBody>
+      </p:sp>
+      <p:sp>
+        <p:nvSpPr>
+          <p:cNvPr id="37" name="Rectangle : coins arrondis 36">
+            <a:extLst>
+              <a:ext uri="{FF2B5EF4-FFF2-40B4-BE49-F238E27FC236}">
+                <a16:creationId xmlns:a16="http://schemas.microsoft.com/office/drawing/2014/main" id="{4CF6B331-FE51-437C-A786-6028140AA34A}"/>
+              </a:ext>
+            </a:extLst>
+          </p:cNvPr>
+          <p:cNvSpPr/>
+          <p:nvPr/>
+        </p:nvSpPr>
+        <p:spPr>
+          <a:xfrm>
+            <a:off x="9066911" y="2023944"/>
+            <a:ext cx="978266" cy="254000"/>
+          </a:xfrm>
+          <a:prstGeom prst="roundRect">
+            <a:avLst/>
+          </a:prstGeom>
+          <a:solidFill>
+            <a:schemeClr val="bg1">
+              <a:lumMod val="95000"/>
+            </a:schemeClr>
+          </a:solidFill>
+        </p:spPr>
+        <p:style>
+          <a:lnRef idx="2">
+            <a:schemeClr val="accent1">
+              <a:shade val="50000"/>
+            </a:schemeClr>
+          </a:lnRef>
+          <a:fillRef idx="1">
+            <a:schemeClr val="accent1"/>
+          </a:fillRef>
+          <a:effectRef idx="0">
+            <a:schemeClr val="accent1"/>
+          </a:effectRef>
+          <a:fontRef idx="minor">
+            <a:schemeClr val="lt1"/>
+          </a:fontRef>
+        </p:style>
+        <p:txBody>
+          <a:bodyPr lIns="36000" rIns="36000" rtlCol="0" anchor="ctr">
+            <a:normAutofit fontScale="55000" lnSpcReduction="20000"/>
+          </a:bodyPr>
+          <a:lstStyle/>
+          <a:p>
+            <a:pPr algn="ctr"/>
+            <a:r>
+              <a:rPr lang="fr-FR" dirty="0">
+                <a:solidFill>
+                  <a:schemeClr val="tx1"/>
+                </a:solidFill>
+              </a:rPr>
+              <a:t>&gt; Acteur Reprise</a:t>
+            </a:r>
+          </a:p>
+        </p:txBody>
+      </p:sp>
+      <p:sp>
+        <p:nvSpPr>
+          <p:cNvPr id="38" name="ZoneTexte 37">
+            <a:extLst>
+              <a:ext uri="{FF2B5EF4-FFF2-40B4-BE49-F238E27FC236}">
+                <a16:creationId xmlns:a16="http://schemas.microsoft.com/office/drawing/2014/main" id="{7F650B26-68DA-42B2-B3E9-CBD1BFF8D50E}"/>
+              </a:ext>
+            </a:extLst>
+          </p:cNvPr>
+          <p:cNvSpPr txBox="1"/>
+          <p:nvPr/>
+        </p:nvSpPr>
+        <p:spPr>
+          <a:xfrm>
+            <a:off x="1108817" y="2375844"/>
+            <a:ext cx="2167453" cy="338554"/>
+          </a:xfrm>
+          <a:prstGeom prst="rect">
+            <a:avLst/>
+          </a:prstGeom>
+          <a:noFill/>
+        </p:spPr>
+        <p:txBody>
+          <a:bodyPr wrap="square" rtlCol="0">
+            <a:spAutoFit/>
+          </a:bodyPr>
+          <a:lstStyle/>
+          <a:p>
+            <a:r>
+              <a:rPr lang="fr-FR" sz="1600" dirty="0"/>
+              <a:t>TR-18-0002 (</a:t>
+            </a:r>
+            <a:r>
+              <a:rPr lang="fr-FR" sz="1600" dirty="0" err="1"/>
+              <a:t>ws.O.T.Ref</a:t>
+            </a:r>
+            <a:r>
+              <a:rPr lang="fr-FR" sz="1600" dirty="0"/>
+              <a:t>)</a:t>
+            </a:r>
+          </a:p>
+        </p:txBody>
+      </p:sp>
+      <p:sp>
+        <p:nvSpPr>
+          <p:cNvPr id="39" name="Triangle isocèle 38">
+            <a:extLst>
+              <a:ext uri="{FF2B5EF4-FFF2-40B4-BE49-F238E27FC236}">
+                <a16:creationId xmlns:a16="http://schemas.microsoft.com/office/drawing/2014/main" id="{68B48671-B167-4A55-AFE8-DBA926484418}"/>
+              </a:ext>
+            </a:extLst>
+          </p:cNvPr>
+          <p:cNvSpPr/>
+          <p:nvPr/>
+        </p:nvSpPr>
+        <p:spPr>
+          <a:xfrm rot="5400000">
+            <a:off x="1026573" y="2485333"/>
+            <a:ext cx="112542" cy="119576"/>
+          </a:xfrm>
+          <a:prstGeom prst="triangle">
+            <a:avLst/>
+          </a:prstGeom>
+        </p:spPr>
+        <p:style>
+          <a:lnRef idx="2">
+            <a:schemeClr val="accent1">
+              <a:shade val="50000"/>
+            </a:schemeClr>
+          </a:lnRef>
+          <a:fillRef idx="1">
+            <a:schemeClr val="accent1"/>
+          </a:fillRef>
+          <a:effectRef idx="0">
+            <a:schemeClr val="accent1"/>
+          </a:effectRef>
+          <a:fontRef idx="minor">
+            <a:schemeClr val="lt1"/>
+          </a:fontRef>
+        </p:style>
+        <p:txBody>
+          <a:bodyPr rtlCol="0" anchor="ctr"/>
+          <a:lstStyle/>
+          <a:p>
+            <a:pPr algn="ctr"/>
+            <a:endParaRPr lang="fr-FR"/>
+          </a:p>
+        </p:txBody>
+      </p:sp>
+      <p:sp>
+        <p:nvSpPr>
+          <p:cNvPr id="40" name="ZoneTexte 39">
+            <a:extLst>
+              <a:ext uri="{FF2B5EF4-FFF2-40B4-BE49-F238E27FC236}">
+                <a16:creationId xmlns:a16="http://schemas.microsoft.com/office/drawing/2014/main" id="{CBF359E1-1D58-4D43-8823-2A3FC153D120}"/>
+              </a:ext>
+            </a:extLst>
+          </p:cNvPr>
+          <p:cNvSpPr txBox="1"/>
+          <p:nvPr/>
+        </p:nvSpPr>
+        <p:spPr>
+          <a:xfrm>
+            <a:off x="4196801" y="2383229"/>
+            <a:ext cx="612668" cy="338554"/>
+          </a:xfrm>
+          <a:prstGeom prst="rect">
+            <a:avLst/>
+          </a:prstGeom>
+          <a:noFill/>
+        </p:spPr>
+        <p:txBody>
+          <a:bodyPr wrap="square" rtlCol="0">
+            <a:spAutoFit/>
+          </a:bodyPr>
+          <a:lstStyle/>
+          <a:p>
+            <a:r>
+              <a:rPr lang="fr-FR" sz="1600" dirty="0" err="1"/>
+              <a:t>NbEL</a:t>
+            </a:r>
+            <a:endParaRPr lang="fr-FR" sz="1600" dirty="0"/>
+          </a:p>
+        </p:txBody>
+      </p:sp>
+      <p:sp>
+        <p:nvSpPr>
+          <p:cNvPr id="41" name="Rectangle : coins arrondis 40">
+            <a:extLst>
+              <a:ext uri="{FF2B5EF4-FFF2-40B4-BE49-F238E27FC236}">
+                <a16:creationId xmlns:a16="http://schemas.microsoft.com/office/drawing/2014/main" id="{6F126430-6F94-4E2C-8CE8-2A4556E6868E}"/>
+              </a:ext>
+            </a:extLst>
+          </p:cNvPr>
+          <p:cNvSpPr/>
+          <p:nvPr/>
+        </p:nvSpPr>
+        <p:spPr>
+          <a:xfrm>
+            <a:off x="3252225" y="2433696"/>
+            <a:ext cx="923288" cy="254000"/>
+          </a:xfrm>
+          <a:prstGeom prst="roundRect">
+            <a:avLst/>
+          </a:prstGeom>
+          <a:solidFill>
+            <a:schemeClr val="accent1">
+              <a:lumMod val="20000"/>
+              <a:lumOff val="80000"/>
+            </a:schemeClr>
+          </a:solidFill>
+        </p:spPr>
+        <p:style>
+          <a:lnRef idx="2">
+            <a:schemeClr val="accent1">
+              <a:shade val="50000"/>
+            </a:schemeClr>
+          </a:lnRef>
+          <a:fillRef idx="1">
+            <a:schemeClr val="accent1"/>
+          </a:fillRef>
+          <a:effectRef idx="0">
+            <a:schemeClr val="accent1"/>
+          </a:effectRef>
+          <a:fontRef idx="minor">
+            <a:schemeClr val="lt1"/>
+          </a:fontRef>
+        </p:style>
+        <p:txBody>
+          <a:bodyPr lIns="36000" rIns="36000" rtlCol="0" anchor="ctr">
+            <a:normAutofit fontScale="62500" lnSpcReduction="20000"/>
+          </a:bodyPr>
+          <a:lstStyle/>
+          <a:p>
+            <a:pPr algn="ctr"/>
+            <a:r>
+              <a:rPr lang="fr-FR" dirty="0">
+                <a:solidFill>
+                  <a:schemeClr val="tx1"/>
+                </a:solidFill>
+              </a:rPr>
+              <a:t>Etat Tronçon</a:t>
+            </a:r>
+          </a:p>
+        </p:txBody>
+      </p:sp>
+      <p:sp>
+        <p:nvSpPr>
+          <p:cNvPr id="42" name="ZoneTexte 41">
+            <a:extLst>
+              <a:ext uri="{FF2B5EF4-FFF2-40B4-BE49-F238E27FC236}">
+                <a16:creationId xmlns:a16="http://schemas.microsoft.com/office/drawing/2014/main" id="{671AD371-4AAA-41DF-9248-B26D5B9C9A19}"/>
+              </a:ext>
+            </a:extLst>
+          </p:cNvPr>
+          <p:cNvSpPr txBox="1"/>
+          <p:nvPr/>
+        </p:nvSpPr>
+        <p:spPr>
+          <a:xfrm>
+            <a:off x="1108817" y="2738686"/>
+            <a:ext cx="2167453" cy="338554"/>
+          </a:xfrm>
+          <a:prstGeom prst="rect">
+            <a:avLst/>
+          </a:prstGeom>
+          <a:noFill/>
+        </p:spPr>
+        <p:txBody>
+          <a:bodyPr wrap="square" rtlCol="0">
+            <a:spAutoFit/>
+          </a:bodyPr>
+          <a:lstStyle/>
+          <a:p>
+            <a:r>
+              <a:rPr lang="fr-FR" sz="1600" dirty="0"/>
+              <a:t>TR-18-0003 (</a:t>
+            </a:r>
+            <a:r>
+              <a:rPr lang="fr-FR" sz="1600" dirty="0" err="1"/>
+              <a:t>ws.O.T.Ref</a:t>
+            </a:r>
+            <a:r>
+              <a:rPr lang="fr-FR" sz="1600" dirty="0"/>
+              <a:t>)</a:t>
+            </a:r>
+          </a:p>
+        </p:txBody>
+      </p:sp>
+      <p:sp>
+        <p:nvSpPr>
+          <p:cNvPr id="43" name="Triangle isocèle 42">
+            <a:extLst>
+              <a:ext uri="{FF2B5EF4-FFF2-40B4-BE49-F238E27FC236}">
+                <a16:creationId xmlns:a16="http://schemas.microsoft.com/office/drawing/2014/main" id="{48273E75-5654-4FA0-9A63-0D989D763BCA}"/>
+              </a:ext>
+            </a:extLst>
+          </p:cNvPr>
+          <p:cNvSpPr/>
+          <p:nvPr/>
+        </p:nvSpPr>
+        <p:spPr>
+          <a:xfrm rot="5400000">
+            <a:off x="1026573" y="2848175"/>
+            <a:ext cx="112542" cy="119576"/>
+          </a:xfrm>
+          <a:prstGeom prst="triangle">
+            <a:avLst/>
+          </a:prstGeom>
+        </p:spPr>
+        <p:style>
+          <a:lnRef idx="2">
+            <a:schemeClr val="accent1">
+              <a:shade val="50000"/>
+            </a:schemeClr>
+          </a:lnRef>
+          <a:fillRef idx="1">
+            <a:schemeClr val="accent1"/>
+          </a:fillRef>
+          <a:effectRef idx="0">
+            <a:schemeClr val="accent1"/>
+          </a:effectRef>
+          <a:fontRef idx="minor">
+            <a:schemeClr val="lt1"/>
+          </a:fontRef>
+        </p:style>
+        <p:txBody>
+          <a:bodyPr rtlCol="0" anchor="ctr"/>
+          <a:lstStyle/>
+          <a:p>
+            <a:pPr algn="ctr"/>
+            <a:endParaRPr lang="fr-FR"/>
+          </a:p>
+        </p:txBody>
+      </p:sp>
+      <p:sp>
+        <p:nvSpPr>
+          <p:cNvPr id="44" name="ZoneTexte 43">
+            <a:extLst>
+              <a:ext uri="{FF2B5EF4-FFF2-40B4-BE49-F238E27FC236}">
+                <a16:creationId xmlns:a16="http://schemas.microsoft.com/office/drawing/2014/main" id="{3840636A-C39C-406F-8840-D3331DEECC76}"/>
+              </a:ext>
+            </a:extLst>
+          </p:cNvPr>
+          <p:cNvSpPr txBox="1"/>
+          <p:nvPr/>
+        </p:nvSpPr>
+        <p:spPr>
+          <a:xfrm>
+            <a:off x="4196801" y="2746071"/>
+            <a:ext cx="612668" cy="338554"/>
+          </a:xfrm>
+          <a:prstGeom prst="rect">
+            <a:avLst/>
+          </a:prstGeom>
+          <a:noFill/>
+        </p:spPr>
+        <p:txBody>
+          <a:bodyPr wrap="square" rtlCol="0">
+            <a:spAutoFit/>
+          </a:bodyPr>
+          <a:lstStyle/>
+          <a:p>
+            <a:r>
+              <a:rPr lang="fr-FR" sz="1600" dirty="0" err="1"/>
+              <a:t>NbEL</a:t>
+            </a:r>
+            <a:endParaRPr lang="fr-FR" sz="1600" dirty="0"/>
+          </a:p>
+        </p:txBody>
+      </p:sp>
+      <p:sp>
+        <p:nvSpPr>
+          <p:cNvPr id="45" name="Rectangle : coins arrondis 44">
+            <a:extLst>
+              <a:ext uri="{FF2B5EF4-FFF2-40B4-BE49-F238E27FC236}">
+                <a16:creationId xmlns:a16="http://schemas.microsoft.com/office/drawing/2014/main" id="{23E8EBC6-75A5-4A5F-8A59-0D44FB74B861}"/>
+              </a:ext>
+            </a:extLst>
+          </p:cNvPr>
+          <p:cNvSpPr/>
+          <p:nvPr/>
+        </p:nvSpPr>
+        <p:spPr>
+          <a:xfrm>
+            <a:off x="3252225" y="2796538"/>
+            <a:ext cx="923288" cy="254000"/>
+          </a:xfrm>
+          <a:prstGeom prst="roundRect">
+            <a:avLst/>
+          </a:prstGeom>
+          <a:solidFill>
+            <a:schemeClr val="accent1">
+              <a:lumMod val="20000"/>
+              <a:lumOff val="80000"/>
+            </a:schemeClr>
+          </a:solidFill>
+        </p:spPr>
+        <p:style>
+          <a:lnRef idx="2">
+            <a:schemeClr val="accent1">
+              <a:shade val="50000"/>
+            </a:schemeClr>
+          </a:lnRef>
+          <a:fillRef idx="1">
+            <a:schemeClr val="accent1"/>
+          </a:fillRef>
+          <a:effectRef idx="0">
+            <a:schemeClr val="accent1"/>
+          </a:effectRef>
+          <a:fontRef idx="minor">
+            <a:schemeClr val="lt1"/>
+          </a:fontRef>
+        </p:style>
+        <p:txBody>
+          <a:bodyPr lIns="36000" rIns="36000" rtlCol="0" anchor="ctr">
+            <a:normAutofit fontScale="62500" lnSpcReduction="20000"/>
+          </a:bodyPr>
+          <a:lstStyle/>
+          <a:p>
+            <a:pPr algn="ctr"/>
+            <a:r>
+              <a:rPr lang="fr-FR" dirty="0">
+                <a:solidFill>
+                  <a:schemeClr val="tx1"/>
+                </a:solidFill>
+              </a:rPr>
+              <a:t>Etat Tronçon</a:t>
+            </a:r>
+          </a:p>
+        </p:txBody>
+      </p:sp>
+      <p:sp>
+        <p:nvSpPr>
+          <p:cNvPr id="46" name="Rectangle : coins arrondis 45">
+            <a:extLst>
+              <a:ext uri="{FF2B5EF4-FFF2-40B4-BE49-F238E27FC236}">
+                <a16:creationId xmlns:a16="http://schemas.microsoft.com/office/drawing/2014/main" id="{44B7BB58-583B-43C6-88D9-C838DF39BA0B}"/>
+              </a:ext>
+            </a:extLst>
+          </p:cNvPr>
+          <p:cNvSpPr/>
+          <p:nvPr/>
+        </p:nvSpPr>
+        <p:spPr>
+          <a:xfrm>
+            <a:off x="7164328" y="1349064"/>
+            <a:ext cx="722902" cy="254000"/>
+          </a:xfrm>
+          <a:prstGeom prst="roundRect">
+            <a:avLst/>
+          </a:prstGeom>
+          <a:solidFill>
+            <a:schemeClr val="bg1">
+              <a:lumMod val="95000"/>
+            </a:schemeClr>
+          </a:solidFill>
+        </p:spPr>
+        <p:style>
+          <a:lnRef idx="2">
+            <a:schemeClr val="accent1">
+              <a:shade val="50000"/>
+            </a:schemeClr>
+          </a:lnRef>
+          <a:fillRef idx="1">
+            <a:schemeClr val="accent1"/>
+          </a:fillRef>
+          <a:effectRef idx="0">
+            <a:schemeClr val="accent1"/>
+          </a:effectRef>
+          <a:fontRef idx="minor">
+            <a:schemeClr val="lt1"/>
+          </a:fontRef>
+        </p:style>
+        <p:txBody>
+          <a:bodyPr lIns="36000" rIns="36000" rtlCol="0" anchor="ctr">
+            <a:normAutofit fontScale="62500" lnSpcReduction="20000"/>
+          </a:bodyPr>
+          <a:lstStyle/>
+          <a:p>
+            <a:r>
+              <a:rPr lang="fr-FR" dirty="0">
+                <a:solidFill>
+                  <a:schemeClr val="tx1"/>
+                </a:solidFill>
+              </a:rPr>
+              <a:t>Date</a:t>
+            </a:r>
+          </a:p>
+        </p:txBody>
+      </p:sp>
+      <p:sp>
+        <p:nvSpPr>
+          <p:cNvPr id="47" name="ZoneTexte 46">
+            <a:extLst>
+              <a:ext uri="{FF2B5EF4-FFF2-40B4-BE49-F238E27FC236}">
+                <a16:creationId xmlns:a16="http://schemas.microsoft.com/office/drawing/2014/main" id="{4746BCCF-B216-4962-9E1B-EB66C5D2A299}"/>
+              </a:ext>
+            </a:extLst>
+          </p:cNvPr>
+          <p:cNvSpPr txBox="1"/>
+          <p:nvPr/>
+        </p:nvSpPr>
+        <p:spPr>
+          <a:xfrm>
+            <a:off x="6186062" y="1322176"/>
+            <a:ext cx="978266" cy="307777"/>
+          </a:xfrm>
+          <a:prstGeom prst="rect">
+            <a:avLst/>
+          </a:prstGeom>
+          <a:noFill/>
+        </p:spPr>
+        <p:txBody>
+          <a:bodyPr wrap="square" rtlCol="0">
+            <a:spAutoFit/>
+          </a:bodyPr>
+          <a:lstStyle/>
+          <a:p>
+            <a:r>
+              <a:rPr lang="fr-FR" sz="1400" dirty="0"/>
+              <a:t>Inspection</a:t>
+            </a:r>
+          </a:p>
+        </p:txBody>
+      </p:sp>
+      <p:graphicFrame>
+        <p:nvGraphicFramePr>
+          <p:cNvPr id="48" name="Tableau 47">
+            <a:extLst>
+              <a:ext uri="{FF2B5EF4-FFF2-40B4-BE49-F238E27FC236}">
+                <a16:creationId xmlns:a16="http://schemas.microsoft.com/office/drawing/2014/main" id="{B43553C4-364E-4440-A55B-79377030C037}"/>
+              </a:ext>
+            </a:extLst>
+          </p:cNvPr>
+          <p:cNvGraphicFramePr>
+            <a:graphicFrameLocks noGrp="1"/>
+          </p:cNvGraphicFramePr>
+          <p:nvPr>
+            <p:extLst>
+              <p:ext uri="{D42A27DB-BD31-4B8C-83A1-F6EECF244321}">
+                <p14:modId xmlns:p14="http://schemas.microsoft.com/office/powerpoint/2010/main" val="3006303823"/>
+              </p:ext>
+            </p:extLst>
+          </p:nvPr>
+        </p:nvGraphicFramePr>
+        <p:xfrm>
+          <a:off x="634447" y="3565288"/>
+          <a:ext cx="11161962" cy="1483360"/>
+        </p:xfrm>
+        <a:graphic>
+          <a:graphicData uri="http://schemas.openxmlformats.org/drawingml/2006/table">
+            <a:tbl>
+              <a:tblPr firstRow="1" bandRow="1">
+                <a:tableStyleId>{5C22544A-7EE6-4342-B048-85BDC9FD1C3A}</a:tableStyleId>
+              </a:tblPr>
+              <a:tblGrid>
+                <a:gridCol w="1012874">
+                  <a:extLst>
+                    <a:ext uri="{9D8B030D-6E8A-4147-A177-3AD203B41FA5}">
+                      <a16:colId xmlns:a16="http://schemas.microsoft.com/office/drawing/2014/main" val="2827733552"/>
+                    </a:ext>
+                  </a:extLst>
+                </a:gridCol>
+                <a:gridCol w="1195754">
+                  <a:extLst>
+                    <a:ext uri="{9D8B030D-6E8A-4147-A177-3AD203B41FA5}">
+                      <a16:colId xmlns:a16="http://schemas.microsoft.com/office/drawing/2014/main" val="408507389"/>
+                    </a:ext>
+                  </a:extLst>
+                </a:gridCol>
+                <a:gridCol w="1080414">
+                  <a:extLst>
+                    <a:ext uri="{9D8B030D-6E8A-4147-A177-3AD203B41FA5}">
+                      <a16:colId xmlns:a16="http://schemas.microsoft.com/office/drawing/2014/main" val="3451624636"/>
+                    </a:ext>
+                  </a:extLst>
+                </a:gridCol>
+                <a:gridCol w="557720">
+                  <a:extLst>
+                    <a:ext uri="{9D8B030D-6E8A-4147-A177-3AD203B41FA5}">
+                      <a16:colId xmlns:a16="http://schemas.microsoft.com/office/drawing/2014/main" val="605102451"/>
+                    </a:ext>
+                  </a:extLst>
+                </a:gridCol>
+                <a:gridCol w="2101174">
+                  <a:extLst>
+                    <a:ext uri="{9D8B030D-6E8A-4147-A177-3AD203B41FA5}">
+                      <a16:colId xmlns:a16="http://schemas.microsoft.com/office/drawing/2014/main" val="1767028796"/>
+                    </a:ext>
+                  </a:extLst>
+                </a:gridCol>
+                <a:gridCol w="2107660">
+                  <a:extLst>
+                    <a:ext uri="{9D8B030D-6E8A-4147-A177-3AD203B41FA5}">
+                      <a16:colId xmlns:a16="http://schemas.microsoft.com/office/drawing/2014/main" val="1879272796"/>
+                    </a:ext>
+                  </a:extLst>
+                </a:gridCol>
+                <a:gridCol w="3106366">
+                  <a:extLst>
+                    <a:ext uri="{9D8B030D-6E8A-4147-A177-3AD203B41FA5}">
+                      <a16:colId xmlns:a16="http://schemas.microsoft.com/office/drawing/2014/main" val="1549496342"/>
+                    </a:ext>
+                  </a:extLst>
+                </a:gridCol>
+              </a:tblGrid>
+              <a:tr h="370840">
+                <a:tc>
+                  <a:txBody>
+                    <a:bodyPr/>
+                    <a:lstStyle/>
+                    <a:p>
+                      <a:r>
+                        <a:rPr lang="fr-FR" sz="1400" dirty="0"/>
+                        <a:t>Tronçon</a:t>
+                      </a:r>
+                    </a:p>
+                  </a:txBody>
+                  <a:tcPr/>
+                </a:tc>
+                <a:tc>
+                  <a:txBody>
+                    <a:bodyPr/>
+                    <a:lstStyle/>
+                    <a:p>
+                      <a:r>
+                        <a:rPr lang="fr-FR" sz="1400" dirty="0"/>
+                        <a:t>Adresse</a:t>
+                      </a:r>
+                    </a:p>
+                  </a:txBody>
+                  <a:tcPr/>
+                </a:tc>
+                <a:tc>
+                  <a:txBody>
+                    <a:bodyPr/>
+                    <a:lstStyle/>
+                    <a:p>
+                      <a:r>
+                        <a:rPr lang="fr-FR" sz="1400" dirty="0"/>
+                        <a:t>Etat</a:t>
+                      </a:r>
+                    </a:p>
+                  </a:txBody>
+                  <a:tcPr/>
+                </a:tc>
+                <a:tc>
+                  <a:txBody>
+                    <a:bodyPr/>
+                    <a:lstStyle/>
+                    <a:p>
+                      <a:r>
+                        <a:rPr lang="fr-FR" sz="1400" dirty="0" err="1"/>
+                        <a:t>NbEL</a:t>
+                      </a:r>
+                      <a:endParaRPr lang="fr-FR" sz="1400" dirty="0"/>
+                    </a:p>
+                  </a:txBody>
+                  <a:tcPr/>
+                </a:tc>
+                <a:tc>
+                  <a:txBody>
+                    <a:bodyPr/>
+                    <a:lstStyle/>
+                    <a:p>
+                      <a:r>
+                        <a:rPr lang="fr-FR" sz="1400" dirty="0"/>
+                        <a:t>Installation</a:t>
+                      </a:r>
+                    </a:p>
+                  </a:txBody>
+                  <a:tcPr/>
+                </a:tc>
+                <a:tc>
+                  <a:txBody>
+                    <a:bodyPr/>
+                    <a:lstStyle/>
+                    <a:p>
+                      <a:r>
+                        <a:rPr lang="fr-FR" sz="1400" dirty="0"/>
+                        <a:t>Mesure</a:t>
+                      </a:r>
+                    </a:p>
+                  </a:txBody>
+                  <a:tcPr/>
+                </a:tc>
+                <a:tc>
+                  <a:txBody>
+                    <a:bodyPr/>
+                    <a:lstStyle/>
+                    <a:p>
+                      <a:r>
+                        <a:rPr lang="fr-FR" sz="1400" dirty="0"/>
+                        <a:t>Reprise</a:t>
+                      </a:r>
+                    </a:p>
+                  </a:txBody>
+                  <a:tcPr/>
+                </a:tc>
+                <a:extLst>
+                  <a:ext uri="{0D108BD9-81ED-4DB2-BD59-A6C34878D82A}">
+                    <a16:rowId xmlns:a16="http://schemas.microsoft.com/office/drawing/2014/main" val="1112082800"/>
+                  </a:ext>
+                </a:extLst>
+              </a:tr>
+              <a:tr h="370840">
+                <a:tc>
+                  <a:txBody>
+                    <a:bodyPr/>
+                    <a:lstStyle/>
+                    <a:p>
+                      <a:r>
+                        <a:rPr lang="fr-FR" sz="1200" dirty="0"/>
+                        <a:t>PB/PT</a:t>
+                      </a:r>
+                    </a:p>
+                  </a:txBody>
+                  <a:tcPr/>
+                </a:tc>
+                <a:tc>
+                  <a:txBody>
+                    <a:bodyPr/>
+                    <a:lstStyle/>
+                    <a:p>
+                      <a:r>
+                        <a:rPr lang="fr-FR" sz="1200" dirty="0"/>
+                        <a:t>1 rue de Verdun</a:t>
+                      </a:r>
+                    </a:p>
+                  </a:txBody>
+                  <a:tcPr/>
+                </a:tc>
+                <a:tc>
+                  <a:txBody>
+                    <a:bodyPr/>
+                    <a:lstStyle/>
+                    <a:p>
+                      <a:endParaRPr lang="fr-FR" sz="1200" dirty="0"/>
+                    </a:p>
+                  </a:txBody>
+                  <a:tcPr/>
+                </a:tc>
+                <a:tc>
+                  <a:txBody>
+                    <a:bodyPr/>
+                    <a:lstStyle/>
+                    <a:p>
+                      <a:r>
+                        <a:rPr lang="fr-FR" sz="1200" dirty="0"/>
+                        <a:t>4</a:t>
+                      </a:r>
+                    </a:p>
+                  </a:txBody>
+                  <a:tcPr/>
+                </a:tc>
+                <a:tc>
+                  <a:txBody>
+                    <a:bodyPr/>
+                    <a:lstStyle/>
+                    <a:p>
+                      <a:endParaRPr lang="fr-FR" sz="1200" dirty="0"/>
+                    </a:p>
+                  </a:txBody>
+                  <a:tcPr/>
+                </a:tc>
+                <a:tc>
+                  <a:txBody>
+                    <a:bodyPr/>
+                    <a:lstStyle/>
+                    <a:p>
+                      <a:endParaRPr lang="fr-FR" sz="1200" dirty="0"/>
+                    </a:p>
+                  </a:txBody>
+                  <a:tcPr/>
+                </a:tc>
+                <a:tc>
+                  <a:txBody>
+                    <a:bodyPr/>
+                    <a:lstStyle/>
+                    <a:p>
+                      <a:endParaRPr lang="fr-FR" sz="1200"/>
+                    </a:p>
+                  </a:txBody>
+                  <a:tcPr/>
+                </a:tc>
+                <a:extLst>
+                  <a:ext uri="{0D108BD9-81ED-4DB2-BD59-A6C34878D82A}">
+                    <a16:rowId xmlns:a16="http://schemas.microsoft.com/office/drawing/2014/main" val="1036210639"/>
+                  </a:ext>
+                </a:extLst>
+              </a:tr>
+              <a:tr h="370840">
+                <a:tc>
+                  <a:txBody>
+                    <a:bodyPr/>
+                    <a:lstStyle/>
+                    <a:p>
+                      <a:r>
+                        <a:rPr lang="fr-FR" sz="1200" dirty="0"/>
+                        <a:t>PB/PT</a:t>
+                      </a:r>
+                    </a:p>
+                  </a:txBody>
+                  <a:tcPr/>
+                </a:tc>
+                <a:tc>
+                  <a:txBody>
+                    <a:bodyPr/>
+                    <a:lstStyle/>
+                    <a:p>
+                      <a:endParaRPr lang="fr-FR" sz="1200" dirty="0"/>
+                    </a:p>
+                  </a:txBody>
+                  <a:tcPr/>
+                </a:tc>
+                <a:tc>
+                  <a:txBody>
+                    <a:bodyPr/>
+                    <a:lstStyle/>
+                    <a:p>
+                      <a:endParaRPr lang="fr-FR" sz="1200" dirty="0"/>
+                    </a:p>
+                  </a:txBody>
+                  <a:tcPr/>
+                </a:tc>
+                <a:tc>
+                  <a:txBody>
+                    <a:bodyPr/>
+                    <a:lstStyle/>
+                    <a:p>
+                      <a:r>
+                        <a:rPr lang="fr-FR" sz="1200" dirty="0"/>
+                        <a:t>6</a:t>
+                      </a:r>
+                    </a:p>
+                  </a:txBody>
+                  <a:tcPr/>
+                </a:tc>
+                <a:tc>
+                  <a:txBody>
+                    <a:bodyPr/>
+                    <a:lstStyle/>
+                    <a:p>
+                      <a:endParaRPr lang="fr-FR" sz="1200"/>
+                    </a:p>
+                  </a:txBody>
+                  <a:tcPr/>
+                </a:tc>
+                <a:tc>
+                  <a:txBody>
+                    <a:bodyPr/>
+                    <a:lstStyle/>
+                    <a:p>
+                      <a:endParaRPr lang="fr-FR" sz="1200"/>
+                    </a:p>
+                  </a:txBody>
+                  <a:tcPr/>
+                </a:tc>
+                <a:tc>
+                  <a:txBody>
+                    <a:bodyPr/>
+                    <a:lstStyle/>
+                    <a:p>
+                      <a:endParaRPr lang="fr-FR" sz="1200" dirty="0"/>
+                    </a:p>
+                  </a:txBody>
+                  <a:tcPr/>
+                </a:tc>
+                <a:extLst>
+                  <a:ext uri="{0D108BD9-81ED-4DB2-BD59-A6C34878D82A}">
+                    <a16:rowId xmlns:a16="http://schemas.microsoft.com/office/drawing/2014/main" val="4130490653"/>
+                  </a:ext>
+                </a:extLst>
+              </a:tr>
+              <a:tr h="370840">
+                <a:tc>
+                  <a:txBody>
+                    <a:bodyPr/>
+                    <a:lstStyle/>
+                    <a:p>
+                      <a:r>
+                        <a:rPr lang="fr-FR" sz="1200" dirty="0"/>
+                        <a:t>PB/PT</a:t>
+                      </a:r>
+                    </a:p>
+                  </a:txBody>
+                  <a:tcPr/>
+                </a:tc>
+                <a:tc>
+                  <a:txBody>
+                    <a:bodyPr/>
+                    <a:lstStyle/>
+                    <a:p>
+                      <a:endParaRPr lang="fr-FR" sz="1200" dirty="0"/>
+                    </a:p>
+                  </a:txBody>
+                  <a:tcPr/>
+                </a:tc>
+                <a:tc>
+                  <a:txBody>
+                    <a:bodyPr/>
+                    <a:lstStyle/>
+                    <a:p>
+                      <a:endParaRPr lang="fr-FR" sz="1200" dirty="0"/>
+                    </a:p>
+                  </a:txBody>
+                  <a:tcPr/>
+                </a:tc>
+                <a:tc>
+                  <a:txBody>
+                    <a:bodyPr/>
+                    <a:lstStyle/>
+                    <a:p>
+                      <a:r>
+                        <a:rPr lang="fr-FR" sz="1200" dirty="0"/>
+                        <a:t>10</a:t>
+                      </a:r>
+                    </a:p>
+                  </a:txBody>
+                  <a:tcPr/>
+                </a:tc>
+                <a:tc>
+                  <a:txBody>
+                    <a:bodyPr/>
+                    <a:lstStyle/>
+                    <a:p>
+                      <a:endParaRPr lang="fr-FR" sz="1200" dirty="0"/>
+                    </a:p>
+                  </a:txBody>
+                  <a:tcPr/>
+                </a:tc>
+                <a:tc>
+                  <a:txBody>
+                    <a:bodyPr/>
+                    <a:lstStyle/>
+                    <a:p>
+                      <a:endParaRPr lang="fr-FR" sz="1200" dirty="0"/>
+                    </a:p>
+                  </a:txBody>
+                  <a:tcPr/>
+                </a:tc>
+                <a:tc>
+                  <a:txBody>
+                    <a:bodyPr/>
+                    <a:lstStyle/>
+                    <a:p>
+                      <a:endParaRPr lang="fr-FR" sz="1200" dirty="0"/>
+                    </a:p>
+                  </a:txBody>
+                  <a:tcPr/>
+                </a:tc>
+                <a:extLst>
+                  <a:ext uri="{0D108BD9-81ED-4DB2-BD59-A6C34878D82A}">
+                    <a16:rowId xmlns:a16="http://schemas.microsoft.com/office/drawing/2014/main" val="2469129256"/>
+                  </a:ext>
+                </a:extLst>
+              </a:tr>
+            </a:tbl>
+          </a:graphicData>
+        </a:graphic>
+      </p:graphicFrame>
+      <p:sp>
+        <p:nvSpPr>
+          <p:cNvPr id="49" name="Rectangle : coins arrondis 48">
+            <a:extLst>
+              <a:ext uri="{FF2B5EF4-FFF2-40B4-BE49-F238E27FC236}">
+                <a16:creationId xmlns:a16="http://schemas.microsoft.com/office/drawing/2014/main" id="{7CF3310C-D380-41BF-AE3C-A63101A1DBB5}"/>
+              </a:ext>
+            </a:extLst>
+          </p:cNvPr>
+          <p:cNvSpPr/>
+          <p:nvPr/>
+        </p:nvSpPr>
+        <p:spPr>
+          <a:xfrm>
+            <a:off x="2934896" y="3975356"/>
+            <a:ext cx="911899" cy="254000"/>
+          </a:xfrm>
+          <a:prstGeom prst="roundRect">
+            <a:avLst/>
+          </a:prstGeom>
+          <a:solidFill>
+            <a:schemeClr val="accent1">
+              <a:lumMod val="20000"/>
+              <a:lumOff val="80000"/>
+            </a:schemeClr>
+          </a:solidFill>
+        </p:spPr>
+        <p:style>
+          <a:lnRef idx="2">
+            <a:schemeClr val="accent1">
+              <a:shade val="50000"/>
+            </a:schemeClr>
+          </a:lnRef>
+          <a:fillRef idx="1">
+            <a:schemeClr val="accent1"/>
+          </a:fillRef>
+          <a:effectRef idx="0">
+            <a:schemeClr val="accent1"/>
+          </a:effectRef>
+          <a:fontRef idx="minor">
+            <a:schemeClr val="lt1"/>
+          </a:fontRef>
+        </p:style>
+        <p:txBody>
+          <a:bodyPr lIns="36000" rIns="36000" rtlCol="0" anchor="ctr">
+            <a:normAutofit fontScale="62500" lnSpcReduction="20000"/>
+          </a:bodyPr>
+          <a:lstStyle/>
+          <a:p>
+            <a:pPr algn="ctr"/>
+            <a:r>
+              <a:rPr lang="fr-FR" dirty="0">
+                <a:solidFill>
+                  <a:schemeClr val="tx1"/>
+                </a:solidFill>
+              </a:rPr>
+              <a:t>Etat Tronçon</a:t>
+            </a:r>
+          </a:p>
+        </p:txBody>
+      </p:sp>
+      <p:sp>
+        <p:nvSpPr>
+          <p:cNvPr id="53" name="Rectangle : coins arrondis 52">
+            <a:extLst>
+              <a:ext uri="{FF2B5EF4-FFF2-40B4-BE49-F238E27FC236}">
+                <a16:creationId xmlns:a16="http://schemas.microsoft.com/office/drawing/2014/main" id="{BD342BA5-F294-4653-9F8D-0E9E0CF26C61}"/>
+              </a:ext>
+            </a:extLst>
+          </p:cNvPr>
+          <p:cNvSpPr/>
+          <p:nvPr/>
+        </p:nvSpPr>
+        <p:spPr>
+          <a:xfrm>
+            <a:off x="4552310" y="3996458"/>
+            <a:ext cx="884444" cy="254000"/>
+          </a:xfrm>
+          <a:prstGeom prst="roundRect">
+            <a:avLst/>
+          </a:prstGeom>
+          <a:solidFill>
+            <a:schemeClr val="bg1">
+              <a:lumMod val="95000"/>
+            </a:schemeClr>
+          </a:solidFill>
+        </p:spPr>
+        <p:style>
+          <a:lnRef idx="2">
+            <a:schemeClr val="accent1">
+              <a:shade val="50000"/>
+            </a:schemeClr>
+          </a:lnRef>
+          <a:fillRef idx="1">
+            <a:schemeClr val="accent1"/>
+          </a:fillRef>
+          <a:effectRef idx="0">
+            <a:schemeClr val="accent1"/>
+          </a:effectRef>
+          <a:fontRef idx="minor">
+            <a:schemeClr val="lt1"/>
+          </a:fontRef>
+        </p:style>
+        <p:txBody>
+          <a:bodyPr lIns="36000" rIns="36000" rtlCol="0" anchor="ctr">
+            <a:normAutofit fontScale="62500" lnSpcReduction="20000"/>
+          </a:bodyPr>
+          <a:lstStyle/>
+          <a:p>
+            <a:pPr algn="ctr"/>
+            <a:r>
+              <a:rPr lang="fr-FR" dirty="0">
+                <a:solidFill>
+                  <a:schemeClr val="tx1"/>
+                </a:solidFill>
+              </a:rPr>
+              <a:t>Date</a:t>
+            </a:r>
+          </a:p>
+        </p:txBody>
+      </p:sp>
+      <p:sp>
+        <p:nvSpPr>
+          <p:cNvPr id="54" name="Rectangle : coins arrondis 53">
+            <a:extLst>
+              <a:ext uri="{FF2B5EF4-FFF2-40B4-BE49-F238E27FC236}">
+                <a16:creationId xmlns:a16="http://schemas.microsoft.com/office/drawing/2014/main" id="{395AFAA4-ABD4-41E8-A9E8-C0FA358B3D65}"/>
+              </a:ext>
+            </a:extLst>
+          </p:cNvPr>
+          <p:cNvSpPr/>
+          <p:nvPr/>
+        </p:nvSpPr>
+        <p:spPr>
+          <a:xfrm>
+            <a:off x="5490787" y="3996458"/>
+            <a:ext cx="1035387" cy="254000"/>
+          </a:xfrm>
+          <a:prstGeom prst="roundRect">
+            <a:avLst/>
+          </a:prstGeom>
+          <a:solidFill>
+            <a:schemeClr val="bg1">
+              <a:lumMod val="95000"/>
+            </a:schemeClr>
+          </a:solidFill>
+        </p:spPr>
+        <p:style>
+          <a:lnRef idx="2">
+            <a:schemeClr val="accent1">
+              <a:shade val="50000"/>
+            </a:schemeClr>
+          </a:lnRef>
+          <a:fillRef idx="1">
+            <a:schemeClr val="accent1"/>
+          </a:fillRef>
+          <a:effectRef idx="0">
+            <a:schemeClr val="accent1"/>
+          </a:effectRef>
+          <a:fontRef idx="minor">
+            <a:schemeClr val="lt1"/>
+          </a:fontRef>
+        </p:style>
+        <p:txBody>
+          <a:bodyPr lIns="36000" rIns="36000" rtlCol="0" anchor="ctr">
+            <a:normAutofit fontScale="62500" lnSpcReduction="20000"/>
+          </a:bodyPr>
+          <a:lstStyle/>
+          <a:p>
+            <a:pPr algn="ctr"/>
+            <a:r>
+              <a:rPr lang="fr-FR" dirty="0">
+                <a:solidFill>
+                  <a:schemeClr val="tx1"/>
+                </a:solidFill>
+              </a:rPr>
+              <a:t>&gt; Acteur</a:t>
+            </a:r>
+          </a:p>
+        </p:txBody>
+      </p:sp>
+      <p:sp>
+        <p:nvSpPr>
+          <p:cNvPr id="55" name="Rectangle : coins arrondis 54">
+            <a:extLst>
+              <a:ext uri="{FF2B5EF4-FFF2-40B4-BE49-F238E27FC236}">
+                <a16:creationId xmlns:a16="http://schemas.microsoft.com/office/drawing/2014/main" id="{8A7624FE-6302-4CDB-B3FF-8C5FF0029FAF}"/>
+              </a:ext>
+            </a:extLst>
+          </p:cNvPr>
+          <p:cNvSpPr/>
+          <p:nvPr/>
+        </p:nvSpPr>
+        <p:spPr>
+          <a:xfrm>
+            <a:off x="6637472" y="3996458"/>
+            <a:ext cx="884444" cy="254000"/>
+          </a:xfrm>
+          <a:prstGeom prst="roundRect">
+            <a:avLst/>
+          </a:prstGeom>
+          <a:solidFill>
+            <a:schemeClr val="bg1">
+              <a:lumMod val="95000"/>
+            </a:schemeClr>
+          </a:solidFill>
+        </p:spPr>
+        <p:style>
+          <a:lnRef idx="2">
+            <a:schemeClr val="accent1">
+              <a:shade val="50000"/>
+            </a:schemeClr>
+          </a:lnRef>
+          <a:fillRef idx="1">
+            <a:schemeClr val="accent1"/>
+          </a:fillRef>
+          <a:effectRef idx="0">
+            <a:schemeClr val="accent1"/>
+          </a:effectRef>
+          <a:fontRef idx="minor">
+            <a:schemeClr val="lt1"/>
+          </a:fontRef>
+        </p:style>
+        <p:txBody>
+          <a:bodyPr lIns="36000" rIns="36000" rtlCol="0" anchor="ctr">
+            <a:normAutofit fontScale="62500" lnSpcReduction="20000"/>
+          </a:bodyPr>
+          <a:lstStyle/>
+          <a:p>
+            <a:pPr algn="ctr"/>
+            <a:r>
+              <a:rPr lang="fr-FR" dirty="0">
+                <a:solidFill>
+                  <a:schemeClr val="tx1"/>
+                </a:solidFill>
+              </a:rPr>
+              <a:t>Date</a:t>
+            </a:r>
+          </a:p>
+        </p:txBody>
+      </p:sp>
+      <p:sp>
+        <p:nvSpPr>
+          <p:cNvPr id="56" name="Rectangle : coins arrondis 55">
+            <a:extLst>
+              <a:ext uri="{FF2B5EF4-FFF2-40B4-BE49-F238E27FC236}">
+                <a16:creationId xmlns:a16="http://schemas.microsoft.com/office/drawing/2014/main" id="{B41D7BBF-1E2E-4F1F-9ECD-A7E9A514FE63}"/>
+              </a:ext>
+            </a:extLst>
+          </p:cNvPr>
+          <p:cNvSpPr/>
+          <p:nvPr/>
+        </p:nvSpPr>
+        <p:spPr>
+          <a:xfrm>
+            <a:off x="7590017" y="3996458"/>
+            <a:ext cx="1035387" cy="254000"/>
+          </a:xfrm>
+          <a:prstGeom prst="roundRect">
+            <a:avLst/>
+          </a:prstGeom>
+          <a:solidFill>
+            <a:schemeClr val="bg1">
+              <a:lumMod val="95000"/>
+            </a:schemeClr>
+          </a:solidFill>
+        </p:spPr>
+        <p:style>
+          <a:lnRef idx="2">
+            <a:schemeClr val="accent1">
+              <a:shade val="50000"/>
+            </a:schemeClr>
+          </a:lnRef>
+          <a:fillRef idx="1">
+            <a:schemeClr val="accent1"/>
+          </a:fillRef>
+          <a:effectRef idx="0">
+            <a:schemeClr val="accent1"/>
+          </a:effectRef>
+          <a:fontRef idx="minor">
+            <a:schemeClr val="lt1"/>
+          </a:fontRef>
+        </p:style>
+        <p:txBody>
+          <a:bodyPr lIns="36000" rIns="36000" rtlCol="0" anchor="ctr">
+            <a:normAutofit fontScale="62500" lnSpcReduction="20000"/>
+          </a:bodyPr>
+          <a:lstStyle/>
+          <a:p>
+            <a:pPr algn="ctr"/>
+            <a:r>
+              <a:rPr lang="fr-FR" dirty="0">
+                <a:solidFill>
+                  <a:schemeClr val="tx1"/>
+                </a:solidFill>
+              </a:rPr>
+              <a:t>&gt; Acteur</a:t>
+            </a:r>
+          </a:p>
+        </p:txBody>
+      </p:sp>
+      <p:sp>
+        <p:nvSpPr>
+          <p:cNvPr id="57" name="Rectangle : coins arrondis 56">
+            <a:extLst>
+              <a:ext uri="{FF2B5EF4-FFF2-40B4-BE49-F238E27FC236}">
+                <a16:creationId xmlns:a16="http://schemas.microsoft.com/office/drawing/2014/main" id="{44534475-A977-48EA-B58E-160DD49B8F4D}"/>
+              </a:ext>
+            </a:extLst>
+          </p:cNvPr>
+          <p:cNvSpPr/>
+          <p:nvPr/>
+        </p:nvSpPr>
+        <p:spPr>
+          <a:xfrm>
+            <a:off x="2934896" y="4368103"/>
+            <a:ext cx="911899" cy="254000"/>
+          </a:xfrm>
+          <a:prstGeom prst="roundRect">
+            <a:avLst/>
+          </a:prstGeom>
+          <a:solidFill>
+            <a:schemeClr val="accent1">
+              <a:lumMod val="20000"/>
+              <a:lumOff val="80000"/>
+            </a:schemeClr>
+          </a:solidFill>
+        </p:spPr>
+        <p:style>
+          <a:lnRef idx="2">
+            <a:schemeClr val="accent1">
+              <a:shade val="50000"/>
+            </a:schemeClr>
+          </a:lnRef>
+          <a:fillRef idx="1">
+            <a:schemeClr val="accent1"/>
+          </a:fillRef>
+          <a:effectRef idx="0">
+            <a:schemeClr val="accent1"/>
+          </a:effectRef>
+          <a:fontRef idx="minor">
+            <a:schemeClr val="lt1"/>
+          </a:fontRef>
+        </p:style>
+        <p:txBody>
+          <a:bodyPr lIns="36000" rIns="36000" rtlCol="0" anchor="ctr">
+            <a:normAutofit fontScale="62500" lnSpcReduction="20000"/>
+          </a:bodyPr>
+          <a:lstStyle/>
+          <a:p>
+            <a:pPr algn="ctr"/>
+            <a:r>
+              <a:rPr lang="fr-FR" dirty="0">
+                <a:solidFill>
+                  <a:schemeClr val="tx1"/>
+                </a:solidFill>
+              </a:rPr>
+              <a:t>Etat Tronçon</a:t>
+            </a:r>
+          </a:p>
+        </p:txBody>
+      </p:sp>
+      <p:sp>
+        <p:nvSpPr>
+          <p:cNvPr id="58" name="Rectangle : coins arrondis 57">
+            <a:extLst>
+              <a:ext uri="{FF2B5EF4-FFF2-40B4-BE49-F238E27FC236}">
+                <a16:creationId xmlns:a16="http://schemas.microsoft.com/office/drawing/2014/main" id="{3CBDEE49-3183-48E1-833E-4F0D7C1585C0}"/>
+              </a:ext>
+            </a:extLst>
+          </p:cNvPr>
+          <p:cNvSpPr/>
+          <p:nvPr/>
+        </p:nvSpPr>
+        <p:spPr>
+          <a:xfrm>
+            <a:off x="2935664" y="4746389"/>
+            <a:ext cx="911899" cy="254000"/>
+          </a:xfrm>
+          <a:prstGeom prst="roundRect">
+            <a:avLst/>
+          </a:prstGeom>
+          <a:solidFill>
+            <a:schemeClr val="accent1">
+              <a:lumMod val="20000"/>
+              <a:lumOff val="80000"/>
+            </a:schemeClr>
+          </a:solidFill>
+        </p:spPr>
+        <p:style>
+          <a:lnRef idx="2">
+            <a:schemeClr val="accent1">
+              <a:shade val="50000"/>
+            </a:schemeClr>
+          </a:lnRef>
+          <a:fillRef idx="1">
+            <a:schemeClr val="accent1"/>
+          </a:fillRef>
+          <a:effectRef idx="0">
+            <a:schemeClr val="accent1"/>
+          </a:effectRef>
+          <a:fontRef idx="minor">
+            <a:schemeClr val="lt1"/>
+          </a:fontRef>
+        </p:style>
+        <p:txBody>
+          <a:bodyPr lIns="36000" rIns="36000" rtlCol="0" anchor="ctr">
+            <a:normAutofit fontScale="62500" lnSpcReduction="20000"/>
+          </a:bodyPr>
+          <a:lstStyle/>
+          <a:p>
+            <a:pPr algn="ctr"/>
+            <a:r>
+              <a:rPr lang="fr-FR" dirty="0">
+                <a:solidFill>
+                  <a:schemeClr val="tx1"/>
+                </a:solidFill>
+              </a:rPr>
+              <a:t>Etat Tronçon</a:t>
+            </a:r>
+          </a:p>
+        </p:txBody>
+      </p:sp>
+      <p:sp>
+        <p:nvSpPr>
+          <p:cNvPr id="59" name="Rectangle : coins arrondis 58">
+            <a:extLst>
+              <a:ext uri="{FF2B5EF4-FFF2-40B4-BE49-F238E27FC236}">
+                <a16:creationId xmlns:a16="http://schemas.microsoft.com/office/drawing/2014/main" id="{8EE41660-0D08-4F7B-B8A8-F380B434B609}"/>
+              </a:ext>
+            </a:extLst>
+          </p:cNvPr>
+          <p:cNvSpPr/>
+          <p:nvPr/>
+        </p:nvSpPr>
+        <p:spPr>
+          <a:xfrm>
+            <a:off x="9747049" y="3996458"/>
+            <a:ext cx="884444" cy="254000"/>
+          </a:xfrm>
+          <a:prstGeom prst="roundRect">
+            <a:avLst/>
+          </a:prstGeom>
+          <a:solidFill>
+            <a:schemeClr val="bg1">
+              <a:lumMod val="95000"/>
+            </a:schemeClr>
+          </a:solidFill>
+        </p:spPr>
+        <p:style>
+          <a:lnRef idx="2">
+            <a:schemeClr val="accent1">
+              <a:shade val="50000"/>
+            </a:schemeClr>
+          </a:lnRef>
+          <a:fillRef idx="1">
+            <a:schemeClr val="accent1"/>
+          </a:fillRef>
+          <a:effectRef idx="0">
+            <a:schemeClr val="accent1"/>
+          </a:effectRef>
+          <a:fontRef idx="minor">
+            <a:schemeClr val="lt1"/>
+          </a:fontRef>
+        </p:style>
+        <p:txBody>
+          <a:bodyPr lIns="36000" rIns="36000" rtlCol="0" anchor="ctr">
+            <a:normAutofit fontScale="62500" lnSpcReduction="20000"/>
+          </a:bodyPr>
+          <a:lstStyle/>
+          <a:p>
+            <a:pPr algn="ctr"/>
+            <a:r>
+              <a:rPr lang="fr-FR" dirty="0">
+                <a:solidFill>
+                  <a:schemeClr val="tx1"/>
+                </a:solidFill>
+              </a:rPr>
+              <a:t>Date</a:t>
+            </a:r>
+          </a:p>
+        </p:txBody>
+      </p:sp>
+      <p:sp>
+        <p:nvSpPr>
+          <p:cNvPr id="60" name="Rectangle : coins arrondis 59">
+            <a:extLst>
+              <a:ext uri="{FF2B5EF4-FFF2-40B4-BE49-F238E27FC236}">
+                <a16:creationId xmlns:a16="http://schemas.microsoft.com/office/drawing/2014/main" id="{748A67EA-F528-4A57-860A-1E17D4F70FD6}"/>
+              </a:ext>
+            </a:extLst>
+          </p:cNvPr>
+          <p:cNvSpPr/>
+          <p:nvPr/>
+        </p:nvSpPr>
+        <p:spPr>
+          <a:xfrm>
+            <a:off x="10699594" y="3996458"/>
+            <a:ext cx="1035387" cy="254000"/>
+          </a:xfrm>
+          <a:prstGeom prst="roundRect">
+            <a:avLst/>
+          </a:prstGeom>
+          <a:solidFill>
+            <a:schemeClr val="bg1">
+              <a:lumMod val="95000"/>
+            </a:schemeClr>
+          </a:solidFill>
+        </p:spPr>
+        <p:style>
+          <a:lnRef idx="2">
+            <a:schemeClr val="accent1">
+              <a:shade val="50000"/>
+            </a:schemeClr>
+          </a:lnRef>
+          <a:fillRef idx="1">
+            <a:schemeClr val="accent1"/>
+          </a:fillRef>
+          <a:effectRef idx="0">
+            <a:schemeClr val="accent1"/>
+          </a:effectRef>
+          <a:fontRef idx="minor">
+            <a:schemeClr val="lt1"/>
+          </a:fontRef>
+        </p:style>
+        <p:txBody>
+          <a:bodyPr lIns="36000" rIns="36000" rtlCol="0" anchor="ctr">
+            <a:normAutofit fontScale="62500" lnSpcReduction="20000"/>
+          </a:bodyPr>
+          <a:lstStyle/>
+          <a:p>
+            <a:pPr algn="ctr"/>
+            <a:r>
+              <a:rPr lang="fr-FR" dirty="0">
+                <a:solidFill>
+                  <a:schemeClr val="tx1"/>
+                </a:solidFill>
+              </a:rPr>
+              <a:t>&gt; Acteur</a:t>
+            </a:r>
+          </a:p>
+        </p:txBody>
+      </p:sp>
+      <p:sp>
+        <p:nvSpPr>
+          <p:cNvPr id="61" name="Rectangle : coins arrondis 60">
+            <a:extLst>
+              <a:ext uri="{FF2B5EF4-FFF2-40B4-BE49-F238E27FC236}">
+                <a16:creationId xmlns:a16="http://schemas.microsoft.com/office/drawing/2014/main" id="{75F4EB18-B7D2-44B8-96D8-5FA9E49C4886}"/>
+              </a:ext>
+            </a:extLst>
+          </p:cNvPr>
+          <p:cNvSpPr/>
+          <p:nvPr/>
+        </p:nvSpPr>
+        <p:spPr>
+          <a:xfrm>
+            <a:off x="8760139" y="3993168"/>
+            <a:ext cx="918809" cy="254000"/>
+          </a:xfrm>
+          <a:prstGeom prst="roundRect">
+            <a:avLst/>
+          </a:prstGeom>
+          <a:solidFill>
+            <a:schemeClr val="bg1">
+              <a:lumMod val="95000"/>
+            </a:schemeClr>
+          </a:solidFill>
+        </p:spPr>
+        <p:style>
+          <a:lnRef idx="2">
+            <a:schemeClr val="accent1">
+              <a:shade val="50000"/>
+            </a:schemeClr>
+          </a:lnRef>
+          <a:fillRef idx="1">
+            <a:schemeClr val="accent1"/>
+          </a:fillRef>
+          <a:effectRef idx="0">
+            <a:schemeClr val="accent1"/>
+          </a:effectRef>
+          <a:fontRef idx="minor">
+            <a:schemeClr val="lt1"/>
+          </a:fontRef>
+        </p:style>
+        <p:txBody>
+          <a:bodyPr lIns="36000" rIns="36000" rtlCol="0" anchor="ctr">
+            <a:normAutofit fontScale="62500" lnSpcReduction="20000"/>
+          </a:bodyPr>
+          <a:lstStyle/>
+          <a:p>
+            <a:r>
+              <a:rPr lang="fr-FR" dirty="0">
+                <a:solidFill>
+                  <a:schemeClr val="tx1"/>
+                </a:solidFill>
+              </a:rPr>
+              <a:t>&gt; Reprise</a:t>
+            </a:r>
+          </a:p>
+        </p:txBody>
+      </p:sp>
+    </p:spTree>
+    <p:extLst>
+      <p:ext uri="{BB962C8B-B14F-4D97-AF65-F5344CB8AC3E}">
+        <p14:creationId xmlns:p14="http://schemas.microsoft.com/office/powerpoint/2010/main" val="204504270"/>
+      </p:ext>
+    </p:extLst>
+  </p:cSld>
+  <p:clrMapOvr>
+    <a:masterClrMapping/>
+  </p:clrMapOvr>
+</p:sld>
+</file>
+
 <file path=ppt/theme/theme1.xml><?xml version="1.0" encoding="utf-8"?>
 <a:theme xmlns:a="http://schemas.openxmlformats.org/drawingml/2006/main" name="Thème Office">
   <a:themeElements>

</xml_diff>

<commit_message>
FE : Fix Ergonomy on WorksiteEditModal
</commit_message>
<xml_diff>
--- a/Design.pptx
+++ b/Design.pptx
@@ -261,7 +261,7 @@
           <a:p>
             <a:fld id="{3E4F7BE1-B4D8-464A-B5E4-E95C61BD2B05}" type="datetimeFigureOut">
               <a:rPr lang="fr-FR" smtClean="0"/>
-              <a:t>12/01/2019</a:t>
+              <a:t>22/01/2019</a:t>
             </a:fld>
             <a:endParaRPr lang="fr-FR"/>
           </a:p>
@@ -459,7 +459,7 @@
           <a:p>
             <a:fld id="{3E4F7BE1-B4D8-464A-B5E4-E95C61BD2B05}" type="datetimeFigureOut">
               <a:rPr lang="fr-FR" smtClean="0"/>
-              <a:t>12/01/2019</a:t>
+              <a:t>22/01/2019</a:t>
             </a:fld>
             <a:endParaRPr lang="fr-FR"/>
           </a:p>
@@ -667,7 +667,7 @@
           <a:p>
             <a:fld id="{3E4F7BE1-B4D8-464A-B5E4-E95C61BD2B05}" type="datetimeFigureOut">
               <a:rPr lang="fr-FR" smtClean="0"/>
-              <a:t>12/01/2019</a:t>
+              <a:t>22/01/2019</a:t>
             </a:fld>
             <a:endParaRPr lang="fr-FR"/>
           </a:p>
@@ -865,7 +865,7 @@
           <a:p>
             <a:fld id="{3E4F7BE1-B4D8-464A-B5E4-E95C61BD2B05}" type="datetimeFigureOut">
               <a:rPr lang="fr-FR" smtClean="0"/>
-              <a:t>12/01/2019</a:t>
+              <a:t>22/01/2019</a:t>
             </a:fld>
             <a:endParaRPr lang="fr-FR"/>
           </a:p>
@@ -1140,7 +1140,7 @@
           <a:p>
             <a:fld id="{3E4F7BE1-B4D8-464A-B5E4-E95C61BD2B05}" type="datetimeFigureOut">
               <a:rPr lang="fr-FR" smtClean="0"/>
-              <a:t>12/01/2019</a:t>
+              <a:t>22/01/2019</a:t>
             </a:fld>
             <a:endParaRPr lang="fr-FR"/>
           </a:p>
@@ -1405,7 +1405,7 @@
           <a:p>
             <a:fld id="{3E4F7BE1-B4D8-464A-B5E4-E95C61BD2B05}" type="datetimeFigureOut">
               <a:rPr lang="fr-FR" smtClean="0"/>
-              <a:t>12/01/2019</a:t>
+              <a:t>22/01/2019</a:t>
             </a:fld>
             <a:endParaRPr lang="fr-FR"/>
           </a:p>
@@ -1817,7 +1817,7 @@
           <a:p>
             <a:fld id="{3E4F7BE1-B4D8-464A-B5E4-E95C61BD2B05}" type="datetimeFigureOut">
               <a:rPr lang="fr-FR" smtClean="0"/>
-              <a:t>12/01/2019</a:t>
+              <a:t>22/01/2019</a:t>
             </a:fld>
             <a:endParaRPr lang="fr-FR"/>
           </a:p>
@@ -1958,7 +1958,7 @@
           <a:p>
             <a:fld id="{3E4F7BE1-B4D8-464A-B5E4-E95C61BD2B05}" type="datetimeFigureOut">
               <a:rPr lang="fr-FR" smtClean="0"/>
-              <a:t>12/01/2019</a:t>
+              <a:t>22/01/2019</a:t>
             </a:fld>
             <a:endParaRPr lang="fr-FR"/>
           </a:p>
@@ -2071,7 +2071,7 @@
           <a:p>
             <a:fld id="{3E4F7BE1-B4D8-464A-B5E4-E95C61BD2B05}" type="datetimeFigureOut">
               <a:rPr lang="fr-FR" smtClean="0"/>
-              <a:t>12/01/2019</a:t>
+              <a:t>22/01/2019</a:t>
             </a:fld>
             <a:endParaRPr lang="fr-FR"/>
           </a:p>
@@ -2382,7 +2382,7 @@
           <a:p>
             <a:fld id="{3E4F7BE1-B4D8-464A-B5E4-E95C61BD2B05}" type="datetimeFigureOut">
               <a:rPr lang="fr-FR" smtClean="0"/>
-              <a:t>12/01/2019</a:t>
+              <a:t>22/01/2019</a:t>
             </a:fld>
             <a:endParaRPr lang="fr-FR"/>
           </a:p>
@@ -2670,7 +2670,7 @@
           <a:p>
             <a:fld id="{3E4F7BE1-B4D8-464A-B5E4-E95C61BD2B05}" type="datetimeFigureOut">
               <a:rPr lang="fr-FR" smtClean="0"/>
-              <a:t>12/01/2019</a:t>
+              <a:t>22/01/2019</a:t>
             </a:fld>
             <a:endParaRPr lang="fr-FR"/>
           </a:p>
@@ -2911,7 +2911,7 @@
           <a:p>
             <a:fld id="{3E4F7BE1-B4D8-464A-B5E4-E95C61BD2B05}" type="datetimeFigureOut">
               <a:rPr lang="fr-FR" smtClean="0"/>
-              <a:t>12/01/2019</a:t>
+              <a:t>22/01/2019</a:t>
             </a:fld>
             <a:endParaRPr lang="fr-FR"/>
           </a:p>
@@ -4978,12 +4978,48 @@
           <a:chExt cx="0" cy="0"/>
         </a:xfrm>
       </p:grpSpPr>
+      <p:sp>
+        <p:nvSpPr>
+          <p:cNvPr id="23" name="ZoneTexte 22">
+            <a:extLst>
+              <a:ext uri="{FF2B5EF4-FFF2-40B4-BE49-F238E27FC236}">
+                <a16:creationId xmlns:a16="http://schemas.microsoft.com/office/drawing/2014/main" id="{544DD4B1-706D-4644-AEAE-AE08AB72A82B}"/>
+              </a:ext>
+            </a:extLst>
+          </p:cNvPr>
+          <p:cNvSpPr txBox="1"/>
+          <p:nvPr/>
+        </p:nvSpPr>
+        <p:spPr>
+          <a:xfrm>
+            <a:off x="335280" y="160020"/>
+            <a:ext cx="4145280" cy="523220"/>
+          </a:xfrm>
+          <a:prstGeom prst="rect">
+            <a:avLst/>
+          </a:prstGeom>
+          <a:noFill/>
+        </p:spPr>
+        <p:txBody>
+          <a:bodyPr wrap="square" rtlCol="0">
+            <a:spAutoFit/>
+          </a:bodyPr>
+          <a:lstStyle/>
+          <a:p>
+            <a:r>
+              <a:rPr lang="fr-FR" sz="2800" dirty="0" err="1"/>
+              <a:t>troncon-edit</a:t>
+            </a:r>
+            <a:endParaRPr lang="fr-FR" sz="2800" dirty="0"/>
+          </a:p>
+        </p:txBody>
+      </p:sp>
       <p:graphicFrame>
         <p:nvGraphicFramePr>
-          <p:cNvPr id="3" name="Tableau 2">
-            <a:extLst>
-              <a:ext uri="{FF2B5EF4-FFF2-40B4-BE49-F238E27FC236}">
-                <a16:creationId xmlns:a16="http://schemas.microsoft.com/office/drawing/2014/main" id="{53F63AFF-25B2-4B56-B75B-C25B2C0E5A59}"/>
+          <p:cNvPr id="27" name="Tableau 26">
+            <a:extLst>
+              <a:ext uri="{FF2B5EF4-FFF2-40B4-BE49-F238E27FC236}">
+                <a16:creationId xmlns:a16="http://schemas.microsoft.com/office/drawing/2014/main" id="{F48E3728-F32C-4861-823E-8C5E62DC85E0}"/>
               </a:ext>
             </a:extLst>
           </p:cNvPr>
@@ -4993,13 +5029,13 @@
           <p:nvPr>
             <p:extLst>
               <p:ext uri="{D42A27DB-BD31-4B8C-83A1-F6EECF244321}">
-                <p14:modId xmlns:p14="http://schemas.microsoft.com/office/powerpoint/2010/main" val="1105032151"/>
+                <p14:modId xmlns:p14="http://schemas.microsoft.com/office/powerpoint/2010/main" val="3674981269"/>
               </p:ext>
             </p:extLst>
           </p:nvPr>
         </p:nvGraphicFramePr>
         <p:xfrm>
-          <a:off x="2032002" y="1321646"/>
+          <a:off x="2032002" y="759022"/>
           <a:ext cx="8127996" cy="1854200"/>
         </p:xfrm>
         <a:graphic>
@@ -5432,6 +5468,26 @@
                     <a:bodyPr/>
                     <a:lstStyle/>
                     <a:p>
+                      <a:endParaRPr lang="fr-FR" dirty="0"/>
+                    </a:p>
+                  </a:txBody>
+                  <a:tcPr/>
+                </a:tc>
+                <a:tc>
+                  <a:txBody>
+                    <a:bodyPr/>
+                    <a:lstStyle/>
+                    <a:p>
+                      <a:endParaRPr lang="fr-FR" dirty="0"/>
+                    </a:p>
+                  </a:txBody>
+                  <a:tcPr/>
+                </a:tc>
+                <a:tc>
+                  <a:txBody>
+                    <a:bodyPr/>
+                    <a:lstStyle/>
+                    <a:p>
                       <a:endParaRPr lang="fr-FR"/>
                     </a:p>
                   </a:txBody>
@@ -5442,6 +5498,16 @@
                     <a:bodyPr/>
                     <a:lstStyle/>
                     <a:p>
+                      <a:endParaRPr lang="fr-FR" dirty="0"/>
+                    </a:p>
+                  </a:txBody>
+                  <a:tcPr/>
+                </a:tc>
+                <a:tc>
+                  <a:txBody>
+                    <a:bodyPr/>
+                    <a:lstStyle/>
+                    <a:p>
                       <a:endParaRPr lang="fr-FR"/>
                     </a:p>
                   </a:txBody>
@@ -5462,37 +5528,7 @@
                     <a:bodyPr/>
                     <a:lstStyle/>
                     <a:p>
-                      <a:endParaRPr lang="fr-FR"/>
-                    </a:p>
-                  </a:txBody>
-                  <a:tcPr/>
-                </a:tc>
-                <a:tc>
-                  <a:txBody>
-                    <a:bodyPr/>
-                    <a:lstStyle/>
-                    <a:p>
-                      <a:endParaRPr lang="fr-FR"/>
-                    </a:p>
-                  </a:txBody>
-                  <a:tcPr/>
-                </a:tc>
-                <a:tc>
-                  <a:txBody>
-                    <a:bodyPr/>
-                    <a:lstStyle/>
-                    <a:p>
-                      <a:endParaRPr lang="fr-FR"/>
-                    </a:p>
-                  </a:txBody>
-                  <a:tcPr/>
-                </a:tc>
-                <a:tc>
-                  <a:txBody>
-                    <a:bodyPr/>
-                    <a:lstStyle/>
-                    <a:p>
-                      <a:endParaRPr lang="fr-FR"/>
+                      <a:endParaRPr lang="fr-FR" dirty="0"/>
                     </a:p>
                   </a:txBody>
                   <a:tcPr/>
@@ -5656,6 +5692,16 @@
                     <a:bodyPr/>
                     <a:lstStyle/>
                     <a:p>
+                      <a:endParaRPr lang="fr-FR" dirty="0"/>
+                    </a:p>
+                  </a:txBody>
+                  <a:tcPr/>
+                </a:tc>
+                <a:tc>
+                  <a:txBody>
+                    <a:bodyPr/>
+                    <a:lstStyle/>
+                    <a:p>
                       <a:endParaRPr lang="fr-FR"/>
                     </a:p>
                   </a:txBody>
@@ -5756,17 +5802,7 @@
                     <a:bodyPr/>
                     <a:lstStyle/>
                     <a:p>
-                      <a:endParaRPr lang="fr-FR"/>
-                    </a:p>
-                  </a:txBody>
-                  <a:tcPr/>
-                </a:tc>
-                <a:tc>
-                  <a:txBody>
-                    <a:bodyPr/>
-                    <a:lstStyle/>
-                    <a:p>
-                      <a:endParaRPr lang="fr-FR"/>
+                      <a:endParaRPr lang="fr-FR" dirty="0"/>
                     </a:p>
                   </a:txBody>
                   <a:tcPr/>
@@ -5783,10 +5819,10 @@
       </p:graphicFrame>
       <p:sp>
         <p:nvSpPr>
-          <p:cNvPr id="4" name="Rectangle : coins arrondis 3">
-            <a:extLst>
-              <a:ext uri="{FF2B5EF4-FFF2-40B4-BE49-F238E27FC236}">
-                <a16:creationId xmlns:a16="http://schemas.microsoft.com/office/drawing/2014/main" id="{8B52735B-1ACA-47C5-B4A9-E6BDB1BAF83C}"/>
+          <p:cNvPr id="28" name="Rectangle : coins arrondis 27">
+            <a:extLst>
+              <a:ext uri="{FF2B5EF4-FFF2-40B4-BE49-F238E27FC236}">
+                <a16:creationId xmlns:a16="http://schemas.microsoft.com/office/drawing/2014/main" id="{8B79720D-3538-414C-8342-C3A2F5DA5690}"/>
               </a:ext>
             </a:extLst>
           </p:cNvPr>
@@ -5795,8 +5831,8 @@
         </p:nvSpPr>
         <p:spPr>
           <a:xfrm>
-            <a:off x="2110742" y="1760220"/>
-            <a:ext cx="3916680" cy="254000"/>
+            <a:off x="3110987" y="1197412"/>
+            <a:ext cx="1899918" cy="254000"/>
           </a:xfrm>
           <a:prstGeom prst="roundRect">
             <a:avLst/>
@@ -5864,10 +5900,10 @@
       </p:sp>
       <p:sp>
         <p:nvSpPr>
-          <p:cNvPr id="17" name="Rectangle : coins arrondis 16">
-            <a:extLst>
-              <a:ext uri="{FF2B5EF4-FFF2-40B4-BE49-F238E27FC236}">
-                <a16:creationId xmlns:a16="http://schemas.microsoft.com/office/drawing/2014/main" id="{B903EBAD-5366-425E-9495-0A47E7F0547F}"/>
+          <p:cNvPr id="29" name="Rectangle : coins arrondis 28">
+            <a:extLst>
+              <a:ext uri="{FF2B5EF4-FFF2-40B4-BE49-F238E27FC236}">
+                <a16:creationId xmlns:a16="http://schemas.microsoft.com/office/drawing/2014/main" id="{85068A1D-72CE-4723-9B73-90CEE8DB6CAA}"/>
               </a:ext>
             </a:extLst>
           </p:cNvPr>
@@ -5876,8 +5912,8 @@
         </p:nvSpPr>
         <p:spPr>
           <a:xfrm>
-            <a:off x="2110742" y="2121746"/>
-            <a:ext cx="5257800" cy="254000"/>
+            <a:off x="5095875" y="1191666"/>
+            <a:ext cx="5001894" cy="254000"/>
           </a:xfrm>
           <a:prstGeom prst="roundRect">
             <a:avLst/>
@@ -5924,10 +5960,10 @@
       </p:sp>
       <p:sp>
         <p:nvSpPr>
-          <p:cNvPr id="18" name="Rectangle : coins arrondis 17">
-            <a:extLst>
-              <a:ext uri="{FF2B5EF4-FFF2-40B4-BE49-F238E27FC236}">
-                <a16:creationId xmlns:a16="http://schemas.microsoft.com/office/drawing/2014/main" id="{ABA0AA29-3C4C-47F2-BF38-B28369B374B5}"/>
+          <p:cNvPr id="30" name="Rectangle : coins arrondis 29">
+            <a:extLst>
+              <a:ext uri="{FF2B5EF4-FFF2-40B4-BE49-F238E27FC236}">
+                <a16:creationId xmlns:a16="http://schemas.microsoft.com/office/drawing/2014/main" id="{19520F62-186C-4A31-A229-AB236B518557}"/>
               </a:ext>
             </a:extLst>
           </p:cNvPr>
@@ -5936,8 +5972,8 @@
         </p:nvSpPr>
         <p:spPr>
           <a:xfrm>
-            <a:off x="7528562" y="2121746"/>
-            <a:ext cx="1219200" cy="254000"/>
+            <a:off x="5126356" y="1559122"/>
+            <a:ext cx="883920" cy="254000"/>
           </a:xfrm>
           <a:prstGeom prst="roundRect">
             <a:avLst/>
@@ -5984,10 +6020,10 @@
       </p:sp>
       <p:sp>
         <p:nvSpPr>
-          <p:cNvPr id="19" name="Rectangle : coins arrondis 18">
-            <a:extLst>
-              <a:ext uri="{FF2B5EF4-FFF2-40B4-BE49-F238E27FC236}">
-                <a16:creationId xmlns:a16="http://schemas.microsoft.com/office/drawing/2014/main" id="{EEBF7D02-5C36-4C96-BCE6-BB6F8FE8812D}"/>
+          <p:cNvPr id="31" name="Rectangle : coins arrondis 30">
+            <a:extLst>
+              <a:ext uri="{FF2B5EF4-FFF2-40B4-BE49-F238E27FC236}">
+                <a16:creationId xmlns:a16="http://schemas.microsoft.com/office/drawing/2014/main" id="{6BF087DC-5C91-43FF-B401-654B050E8ACD}"/>
               </a:ext>
             </a:extLst>
           </p:cNvPr>
@@ -5996,8 +6032,8 @@
         </p:nvSpPr>
         <p:spPr>
           <a:xfrm>
-            <a:off x="8862062" y="2121746"/>
-            <a:ext cx="1219200" cy="254000"/>
+            <a:off x="6149342" y="1559122"/>
+            <a:ext cx="883920" cy="254000"/>
           </a:xfrm>
           <a:prstGeom prst="roundRect">
             <a:avLst/>
@@ -6044,10 +6080,10 @@
       </p:sp>
       <p:sp>
         <p:nvSpPr>
-          <p:cNvPr id="20" name="Rectangle : coins arrondis 19">
-            <a:extLst>
-              <a:ext uri="{FF2B5EF4-FFF2-40B4-BE49-F238E27FC236}">
-                <a16:creationId xmlns:a16="http://schemas.microsoft.com/office/drawing/2014/main" id="{17CFC845-581E-47AA-8EC4-E12AB770C163}"/>
+          <p:cNvPr id="34" name="Rectangle : coins arrondis 33">
+            <a:extLst>
+              <a:ext uri="{FF2B5EF4-FFF2-40B4-BE49-F238E27FC236}">
+                <a16:creationId xmlns:a16="http://schemas.microsoft.com/office/drawing/2014/main" id="{69FF1D95-5165-4D90-8390-E3E40564F0A5}"/>
               </a:ext>
             </a:extLst>
           </p:cNvPr>
@@ -6056,8 +6092,8 @@
         </p:nvSpPr>
         <p:spPr>
           <a:xfrm>
-            <a:off x="7528562" y="2496818"/>
-            <a:ext cx="1219200" cy="254000"/>
+            <a:off x="2110742" y="1934194"/>
+            <a:ext cx="7970516" cy="254000"/>
           </a:xfrm>
           <a:prstGeom prst="roundRect">
             <a:avLst/>
@@ -6097,7 +6133,7 @@
                   <a:schemeClr val="tx1"/>
                 </a:solidFill>
               </a:rPr>
-              <a:t>Date </a:t>
+              <a:t>Commentaire </a:t>
             </a:r>
             <a:r>
               <a:rPr lang="fr-FR" dirty="0" err="1">
@@ -6105,25 +6141,22 @@
                   <a:schemeClr val="tx1"/>
                 </a:solidFill>
               </a:rPr>
-              <a:t>Instal</a:t>
-            </a:r>
-            <a:r>
-              <a:rPr lang="fr-FR" dirty="0">
-                <a:solidFill>
-                  <a:schemeClr val="tx1"/>
-                </a:solidFill>
-              </a:rPr>
-              <a:t>.</a:t>
-            </a:r>
-          </a:p>
-        </p:txBody>
-      </p:sp>
-      <p:sp>
-        <p:nvSpPr>
-          <p:cNvPr id="21" name="Rectangle : coins arrondis 20">
-            <a:extLst>
-              <a:ext uri="{FF2B5EF4-FFF2-40B4-BE49-F238E27FC236}">
-                <a16:creationId xmlns:a16="http://schemas.microsoft.com/office/drawing/2014/main" id="{37D34A93-337D-4D56-A225-088721107B5D}"/>
+              <a:t>Troncon</a:t>
+            </a:r>
+            <a:endParaRPr lang="fr-FR" dirty="0">
+              <a:solidFill>
+                <a:schemeClr val="tx1"/>
+              </a:solidFill>
+            </a:endParaRPr>
+          </a:p>
+        </p:txBody>
+      </p:sp>
+      <p:sp>
+        <p:nvSpPr>
+          <p:cNvPr id="35" name="Rectangle : coins arrondis 34">
+            <a:extLst>
+              <a:ext uri="{FF2B5EF4-FFF2-40B4-BE49-F238E27FC236}">
+                <a16:creationId xmlns:a16="http://schemas.microsoft.com/office/drawing/2014/main" id="{FED62D74-432E-45F4-BEC4-2FD64C1A127D}"/>
               </a:ext>
             </a:extLst>
           </p:cNvPr>
@@ -6132,8 +6165,8 @@
         </p:nvSpPr>
         <p:spPr>
           <a:xfrm>
-            <a:off x="8862062" y="2496818"/>
-            <a:ext cx="1219200" cy="254000"/>
+            <a:off x="2110742" y="1564197"/>
+            <a:ext cx="870583" cy="254000"/>
           </a:xfrm>
           <a:prstGeom prst="roundRect">
             <a:avLst/>
@@ -6168,22 +6201,30 @@
           <a:p>
             <a:pPr algn="ctr"/>
             <a:r>
+              <a:rPr lang="fr-FR" dirty="0" err="1">
+                <a:solidFill>
+                  <a:schemeClr val="tx1"/>
+                </a:solidFill>
+              </a:rPr>
+              <a:t>Bloquage</a:t>
+            </a:r>
+            <a:r>
               <a:rPr lang="fr-FR" dirty="0">
                 <a:solidFill>
                   <a:schemeClr val="tx1"/>
                 </a:solidFill>
               </a:rPr>
-              <a:t>Date Mesures</a:t>
-            </a:r>
-          </a:p>
-        </p:txBody>
-      </p:sp>
-      <p:sp>
-        <p:nvSpPr>
-          <p:cNvPr id="22" name="Rectangle : coins arrondis 21">
-            <a:extLst>
-              <a:ext uri="{FF2B5EF4-FFF2-40B4-BE49-F238E27FC236}">
-                <a16:creationId xmlns:a16="http://schemas.microsoft.com/office/drawing/2014/main" id="{7DBF3BD9-69DA-45D8-9147-8AA07B507A85}"/>
+              <a:t>?</a:t>
+            </a:r>
+          </a:p>
+        </p:txBody>
+      </p:sp>
+      <p:sp>
+        <p:nvSpPr>
+          <p:cNvPr id="36" name="Rectangle : coins arrondis 35">
+            <a:extLst>
+              <a:ext uri="{FF2B5EF4-FFF2-40B4-BE49-F238E27FC236}">
+                <a16:creationId xmlns:a16="http://schemas.microsoft.com/office/drawing/2014/main" id="{84E482BA-EFFD-45E8-A1C4-D22AB0E01093}"/>
               </a:ext>
             </a:extLst>
           </p:cNvPr>
@@ -6192,8 +6233,8 @@
         </p:nvSpPr>
         <p:spPr>
           <a:xfrm>
-            <a:off x="2110742" y="2496818"/>
-            <a:ext cx="5257800" cy="254000"/>
+            <a:off x="3075948" y="1565895"/>
+            <a:ext cx="934712" cy="254000"/>
           </a:xfrm>
           <a:prstGeom prst="roundRect">
             <a:avLst/>
@@ -6222,87 +6263,46 @@
         </p:style>
         <p:txBody>
           <a:bodyPr lIns="36000" rIns="36000" rtlCol="0" anchor="ctr">
-            <a:normAutofit fontScale="62500" lnSpcReduction="20000"/>
+            <a:normAutofit fontScale="47500" lnSpcReduction="20000"/>
           </a:bodyPr>
           <a:lstStyle/>
           <a:p>
             <a:pPr algn="ctr"/>
+            <a:r>
+              <a:rPr lang="fr-FR" dirty="0" err="1">
+                <a:solidFill>
+                  <a:schemeClr val="tx1"/>
+                </a:solidFill>
+              </a:rPr>
+              <a:t>Sign</a:t>
+            </a:r>
             <a:r>
               <a:rPr lang="fr-FR" dirty="0">
                 <a:solidFill>
                   <a:schemeClr val="tx1"/>
                 </a:solidFill>
               </a:rPr>
-              <a:t>Commentaire </a:t>
-            </a:r>
-            <a:r>
-              <a:rPr lang="fr-FR" dirty="0" err="1">
-                <a:solidFill>
-                  <a:schemeClr val="tx1"/>
-                </a:solidFill>
-              </a:rPr>
-              <a:t>Troncon</a:t>
-            </a:r>
-            <a:endParaRPr lang="fr-FR" dirty="0">
-              <a:solidFill>
-                <a:schemeClr val="tx1"/>
-              </a:solidFill>
-            </a:endParaRPr>
-          </a:p>
-        </p:txBody>
-      </p:sp>
-      <p:sp>
-        <p:nvSpPr>
-          <p:cNvPr id="23" name="ZoneTexte 22">
-            <a:extLst>
-              <a:ext uri="{FF2B5EF4-FFF2-40B4-BE49-F238E27FC236}">
-                <a16:creationId xmlns:a16="http://schemas.microsoft.com/office/drawing/2014/main" id="{544DD4B1-706D-4644-AEAE-AE08AB72A82B}"/>
-              </a:ext>
-            </a:extLst>
-          </p:cNvPr>
-          <p:cNvSpPr txBox="1"/>
+              <a:t>. Demandée?</a:t>
+            </a:r>
+          </a:p>
+        </p:txBody>
+      </p:sp>
+      <p:sp>
+        <p:nvSpPr>
+          <p:cNvPr id="37" name="Rectangle : coins arrondis 36">
+            <a:extLst>
+              <a:ext uri="{FF2B5EF4-FFF2-40B4-BE49-F238E27FC236}">
+                <a16:creationId xmlns:a16="http://schemas.microsoft.com/office/drawing/2014/main" id="{FBF0D8E9-74E2-48AC-9A51-4E02B558267A}"/>
+              </a:ext>
+            </a:extLst>
+          </p:cNvPr>
+          <p:cNvSpPr/>
           <p:nvPr/>
         </p:nvSpPr>
         <p:spPr>
           <a:xfrm>
-            <a:off x="335280" y="160020"/>
-            <a:ext cx="4145280" cy="523220"/>
-          </a:xfrm>
-          <a:prstGeom prst="rect">
-            <a:avLst/>
-          </a:prstGeom>
-          <a:noFill/>
-        </p:spPr>
-        <p:txBody>
-          <a:bodyPr wrap="square" rtlCol="0">
-            <a:spAutoFit/>
-          </a:bodyPr>
-          <a:lstStyle/>
-          <a:p>
-            <a:r>
-              <a:rPr lang="fr-FR" sz="2800" dirty="0" err="1"/>
-              <a:t>troncon-edit</a:t>
-            </a:r>
-            <a:endParaRPr lang="fr-FR" sz="2800" dirty="0"/>
-          </a:p>
-        </p:txBody>
-      </p:sp>
-      <p:sp>
-        <p:nvSpPr>
-          <p:cNvPr id="24" name="Rectangle : coins arrondis 23">
-            <a:extLst>
-              <a:ext uri="{FF2B5EF4-FFF2-40B4-BE49-F238E27FC236}">
-                <a16:creationId xmlns:a16="http://schemas.microsoft.com/office/drawing/2014/main" id="{A076EE58-8C65-456E-AD87-3D5A73CEEFDE}"/>
-              </a:ext>
-            </a:extLst>
-          </p:cNvPr>
-          <p:cNvSpPr/>
-          <p:nvPr/>
-        </p:nvSpPr>
-        <p:spPr>
-          <a:xfrm>
-            <a:off x="6149342" y="1746674"/>
-            <a:ext cx="1219200" cy="254000"/>
+            <a:off x="4105283" y="1559122"/>
+            <a:ext cx="928363" cy="254000"/>
           </a:xfrm>
           <a:prstGeom prst="roundRect">
             <a:avLst/>
@@ -6331,7 +6331,7 @@
         </p:style>
         <p:txBody>
           <a:bodyPr lIns="36000" rIns="36000" rtlCol="0" anchor="ctr">
-            <a:normAutofit fontScale="62500" lnSpcReduction="20000"/>
+            <a:normAutofit fontScale="55000" lnSpcReduction="20000"/>
           </a:bodyPr>
           <a:lstStyle/>
           <a:p>
@@ -6342,7 +6342,7 @@
                   <a:schemeClr val="tx1"/>
                 </a:solidFill>
               </a:rPr>
-              <a:t>Bloquage</a:t>
+              <a:t>Sign</a:t>
             </a:r>
             <a:r>
               <a:rPr lang="fr-FR" dirty="0">
@@ -6350,17 +6350,61 @@
                   <a:schemeClr val="tx1"/>
                 </a:solidFill>
               </a:rPr>
-              <a:t>?</a:t>
-            </a:r>
-          </a:p>
-        </p:txBody>
-      </p:sp>
-      <p:sp>
-        <p:nvSpPr>
-          <p:cNvPr id="25" name="Rectangle : coins arrondis 24">
-            <a:extLst>
-              <a:ext uri="{FF2B5EF4-FFF2-40B4-BE49-F238E27FC236}">
-                <a16:creationId xmlns:a16="http://schemas.microsoft.com/office/drawing/2014/main" id="{70CCE9CC-2636-4B56-A750-1ACB43EE0050}"/>
+              <a:t>. obtenue?</a:t>
+            </a:r>
+          </a:p>
+        </p:txBody>
+      </p:sp>
+      <p:cxnSp>
+        <p:nvCxnSpPr>
+          <p:cNvPr id="43" name="Connecteur : en angle 42">
+            <a:extLst>
+              <a:ext uri="{FF2B5EF4-FFF2-40B4-BE49-F238E27FC236}">
+                <a16:creationId xmlns:a16="http://schemas.microsoft.com/office/drawing/2014/main" id="{003AA5E5-6936-414C-A0F8-8720F54CCA1D}"/>
+              </a:ext>
+            </a:extLst>
+          </p:cNvPr>
+          <p:cNvCxnSpPr>
+            <a:endCxn id="34" idx="1"/>
+          </p:cNvCxnSpPr>
+          <p:nvPr/>
+        </p:nvCxnSpPr>
+        <p:spPr>
+          <a:xfrm rot="5400000">
+            <a:off x="1937071" y="1887522"/>
+            <a:ext cx="347343" cy="12700"/>
+          </a:xfrm>
+          <a:prstGeom prst="bentConnector4">
+            <a:avLst>
+              <a:gd name="adj1" fmla="val -3931"/>
+              <a:gd name="adj2" fmla="val 1749984"/>
+            </a:avLst>
+          </a:prstGeom>
+          <a:ln>
+            <a:tailEnd type="triangle"/>
+          </a:ln>
+        </p:spPr>
+        <p:style>
+          <a:lnRef idx="1">
+            <a:schemeClr val="accent1"/>
+          </a:lnRef>
+          <a:fillRef idx="0">
+            <a:schemeClr val="accent1"/>
+          </a:fillRef>
+          <a:effectRef idx="0">
+            <a:schemeClr val="accent1"/>
+          </a:effectRef>
+          <a:fontRef idx="minor">
+            <a:schemeClr val="tx1"/>
+          </a:fontRef>
+        </p:style>
+      </p:cxnSp>
+      <p:sp>
+        <p:nvSpPr>
+          <p:cNvPr id="46" name="Rectangle : coins arrondis 45">
+            <a:extLst>
+              <a:ext uri="{FF2B5EF4-FFF2-40B4-BE49-F238E27FC236}">
+                <a16:creationId xmlns:a16="http://schemas.microsoft.com/office/drawing/2014/main" id="{681707BD-FE61-407D-8EFD-4766C8B41E72}"/>
               </a:ext>
             </a:extLst>
           </p:cNvPr>
@@ -6369,8 +6413,8 @@
         </p:nvSpPr>
         <p:spPr>
           <a:xfrm>
-            <a:off x="7528562" y="1746674"/>
-            <a:ext cx="1219200" cy="254000"/>
+            <a:off x="2084389" y="1192441"/>
+            <a:ext cx="923288" cy="254000"/>
           </a:xfrm>
           <a:prstGeom prst="roundRect">
             <a:avLst/>
@@ -6405,98 +6449,22 @@
           <a:p>
             <a:pPr algn="ctr"/>
             <a:r>
-              <a:rPr lang="fr-FR" dirty="0" err="1">
-                <a:solidFill>
-                  <a:schemeClr val="tx1"/>
-                </a:solidFill>
-              </a:rPr>
-              <a:t>Sign</a:t>
-            </a:r>
-            <a:r>
               <a:rPr lang="fr-FR" dirty="0">
                 <a:solidFill>
                   <a:schemeClr val="tx1"/>
                 </a:solidFill>
               </a:rPr>
-              <a:t>. Demandée?</a:t>
-            </a:r>
-          </a:p>
-        </p:txBody>
-      </p:sp>
-      <p:sp>
-        <p:nvSpPr>
-          <p:cNvPr id="26" name="Rectangle : coins arrondis 25">
-            <a:extLst>
-              <a:ext uri="{FF2B5EF4-FFF2-40B4-BE49-F238E27FC236}">
-                <a16:creationId xmlns:a16="http://schemas.microsoft.com/office/drawing/2014/main" id="{EDAE632D-9816-4167-8B43-62F32791445E}"/>
-              </a:ext>
-            </a:extLst>
-          </p:cNvPr>
-          <p:cNvSpPr/>
-          <p:nvPr/>
-        </p:nvSpPr>
-        <p:spPr>
-          <a:xfrm>
-            <a:off x="8862058" y="1746674"/>
-            <a:ext cx="1219200" cy="254000"/>
-          </a:xfrm>
-          <a:prstGeom prst="roundRect">
-            <a:avLst/>
-          </a:prstGeom>
-          <a:solidFill>
-            <a:schemeClr val="bg1">
-              <a:lumMod val="95000"/>
-            </a:schemeClr>
-          </a:solidFill>
-        </p:spPr>
-        <p:style>
-          <a:lnRef idx="2">
-            <a:schemeClr val="accent1">
-              <a:shade val="50000"/>
-            </a:schemeClr>
-          </a:lnRef>
-          <a:fillRef idx="1">
-            <a:schemeClr val="accent1"/>
-          </a:fillRef>
-          <a:effectRef idx="0">
-            <a:schemeClr val="accent1"/>
-          </a:effectRef>
-          <a:fontRef idx="minor">
-            <a:schemeClr val="lt1"/>
-          </a:fontRef>
-        </p:style>
-        <p:txBody>
-          <a:bodyPr lIns="36000" rIns="36000" rtlCol="0" anchor="ctr">
-            <a:normAutofit fontScale="62500" lnSpcReduction="20000"/>
-          </a:bodyPr>
-          <a:lstStyle/>
-          <a:p>
-            <a:pPr algn="ctr"/>
-            <a:r>
-              <a:rPr lang="fr-FR" dirty="0" err="1">
-                <a:solidFill>
-                  <a:schemeClr val="tx1"/>
-                </a:solidFill>
-              </a:rPr>
-              <a:t>Sign</a:t>
-            </a:r>
-            <a:r>
-              <a:rPr lang="fr-FR" dirty="0">
-                <a:solidFill>
-                  <a:schemeClr val="tx1"/>
-                </a:solidFill>
-              </a:rPr>
-              <a:t>. obtenue?</a:t>
+              <a:t>Etat Tronçon</a:t>
             </a:r>
           </a:p>
         </p:txBody>
       </p:sp>
       <p:graphicFrame>
         <p:nvGraphicFramePr>
-          <p:cNvPr id="27" name="Tableau 26">
-            <a:extLst>
-              <a:ext uri="{FF2B5EF4-FFF2-40B4-BE49-F238E27FC236}">
-                <a16:creationId xmlns:a16="http://schemas.microsoft.com/office/drawing/2014/main" id="{F48E3728-F32C-4861-823E-8C5E62DC85E0}"/>
+          <p:cNvPr id="53" name="Tableau 52">
+            <a:extLst>
+              <a:ext uri="{FF2B5EF4-FFF2-40B4-BE49-F238E27FC236}">
+                <a16:creationId xmlns:a16="http://schemas.microsoft.com/office/drawing/2014/main" id="{55CD6404-0DF7-4146-9D90-3668F3289389}"/>
               </a:ext>
             </a:extLst>
           </p:cNvPr>
@@ -6506,13 +6474,13 @@
           <p:nvPr>
             <p:extLst>
               <p:ext uri="{D42A27DB-BD31-4B8C-83A1-F6EECF244321}">
-                <p14:modId xmlns:p14="http://schemas.microsoft.com/office/powerpoint/2010/main" val="972308909"/>
+                <p14:modId xmlns:p14="http://schemas.microsoft.com/office/powerpoint/2010/main" val="360830231"/>
               </p:ext>
             </p:extLst>
           </p:nvPr>
         </p:nvGraphicFramePr>
         <p:xfrm>
-          <a:off x="2032002" y="3493346"/>
+          <a:off x="2032002" y="3627989"/>
           <a:ext cx="8127996" cy="1854200"/>
         </p:xfrm>
         <a:graphic>
@@ -7296,10 +7264,10 @@
       </p:graphicFrame>
       <p:sp>
         <p:nvSpPr>
-          <p:cNvPr id="28" name="Rectangle : coins arrondis 27">
-            <a:extLst>
-              <a:ext uri="{FF2B5EF4-FFF2-40B4-BE49-F238E27FC236}">
-                <a16:creationId xmlns:a16="http://schemas.microsoft.com/office/drawing/2014/main" id="{8B79720D-3538-414C-8342-C3A2F5DA5690}"/>
+          <p:cNvPr id="54" name="Rectangle : coins arrondis 53">
+            <a:extLst>
+              <a:ext uri="{FF2B5EF4-FFF2-40B4-BE49-F238E27FC236}">
+                <a16:creationId xmlns:a16="http://schemas.microsoft.com/office/drawing/2014/main" id="{ABEDF9E5-86B8-41C3-BF80-CCD6EFECDA9D}"/>
               </a:ext>
             </a:extLst>
           </p:cNvPr>
@@ -7308,8 +7276,8 @@
         </p:nvSpPr>
         <p:spPr>
           <a:xfrm>
-            <a:off x="2110742" y="3931920"/>
-            <a:ext cx="1899918" cy="254000"/>
+            <a:off x="3110987" y="4066379"/>
+            <a:ext cx="4292990" cy="254000"/>
           </a:xfrm>
           <a:prstGeom prst="roundRect">
             <a:avLst/>
@@ -7377,10 +7345,10 @@
       </p:sp>
       <p:sp>
         <p:nvSpPr>
-          <p:cNvPr id="29" name="Rectangle : coins arrondis 28">
-            <a:extLst>
-              <a:ext uri="{FF2B5EF4-FFF2-40B4-BE49-F238E27FC236}">
-                <a16:creationId xmlns:a16="http://schemas.microsoft.com/office/drawing/2014/main" id="{85068A1D-72CE-4723-9B73-90CEE8DB6CAA}"/>
+          <p:cNvPr id="55" name="Rectangle : coins arrondis 54">
+            <a:extLst>
+              <a:ext uri="{FF2B5EF4-FFF2-40B4-BE49-F238E27FC236}">
+                <a16:creationId xmlns:a16="http://schemas.microsoft.com/office/drawing/2014/main" id="{BB12738F-D660-4854-A125-C51A23A7ECE5}"/>
               </a:ext>
             </a:extLst>
           </p:cNvPr>
@@ -7389,8 +7357,8 @@
         </p:nvSpPr>
         <p:spPr>
           <a:xfrm>
-            <a:off x="5095875" y="3925990"/>
-            <a:ext cx="5001894" cy="254000"/>
+            <a:off x="2117093" y="4428089"/>
+            <a:ext cx="5286884" cy="254000"/>
           </a:xfrm>
           <a:prstGeom prst="roundRect">
             <a:avLst/>
@@ -7437,10 +7405,10 @@
       </p:sp>
       <p:sp>
         <p:nvSpPr>
-          <p:cNvPr id="30" name="Rectangle : coins arrondis 29">
-            <a:extLst>
-              <a:ext uri="{FF2B5EF4-FFF2-40B4-BE49-F238E27FC236}">
-                <a16:creationId xmlns:a16="http://schemas.microsoft.com/office/drawing/2014/main" id="{19520F62-186C-4A31-A229-AB236B518557}"/>
+          <p:cNvPr id="56" name="Rectangle : coins arrondis 55">
+            <a:extLst>
+              <a:ext uri="{FF2B5EF4-FFF2-40B4-BE49-F238E27FC236}">
+                <a16:creationId xmlns:a16="http://schemas.microsoft.com/office/drawing/2014/main" id="{85338ADC-E3F4-4EBE-8A36-B0DBDFC6566E}"/>
               </a:ext>
             </a:extLst>
           </p:cNvPr>
@@ -7449,8 +7417,8 @@
         </p:nvSpPr>
         <p:spPr>
           <a:xfrm>
-            <a:off x="5126356" y="4293446"/>
-            <a:ext cx="883920" cy="254000"/>
+            <a:off x="8859985" y="4428089"/>
+            <a:ext cx="1214921" cy="254000"/>
           </a:xfrm>
           <a:prstGeom prst="roundRect">
             <a:avLst/>
@@ -7497,10 +7465,10 @@
       </p:sp>
       <p:sp>
         <p:nvSpPr>
-          <p:cNvPr id="31" name="Rectangle : coins arrondis 30">
-            <a:extLst>
-              <a:ext uri="{FF2B5EF4-FFF2-40B4-BE49-F238E27FC236}">
-                <a16:creationId xmlns:a16="http://schemas.microsoft.com/office/drawing/2014/main" id="{6BF087DC-5C91-43FF-B401-654B050E8ACD}"/>
+          <p:cNvPr id="57" name="Rectangle : coins arrondis 56">
+            <a:extLst>
+              <a:ext uri="{FF2B5EF4-FFF2-40B4-BE49-F238E27FC236}">
+                <a16:creationId xmlns:a16="http://schemas.microsoft.com/office/drawing/2014/main" id="{45F1531F-30DA-45C2-BFF9-E28505E312FD}"/>
               </a:ext>
             </a:extLst>
           </p:cNvPr>
@@ -7509,8 +7477,8 @@
         </p:nvSpPr>
         <p:spPr>
           <a:xfrm>
-            <a:off x="6149342" y="4293446"/>
-            <a:ext cx="883920" cy="254000"/>
+            <a:off x="8859984" y="4061408"/>
+            <a:ext cx="1214921" cy="254000"/>
           </a:xfrm>
           <a:prstGeom prst="roundRect">
             <a:avLst/>
@@ -7557,10 +7525,10 @@
       </p:sp>
       <p:sp>
         <p:nvSpPr>
-          <p:cNvPr id="34" name="Rectangle : coins arrondis 33">
-            <a:extLst>
-              <a:ext uri="{FF2B5EF4-FFF2-40B4-BE49-F238E27FC236}">
-                <a16:creationId xmlns:a16="http://schemas.microsoft.com/office/drawing/2014/main" id="{69FF1D95-5165-4D90-8390-E3E40564F0A5}"/>
+          <p:cNvPr id="58" name="Rectangle : coins arrondis 57">
+            <a:extLst>
+              <a:ext uri="{FF2B5EF4-FFF2-40B4-BE49-F238E27FC236}">
+                <a16:creationId xmlns:a16="http://schemas.microsoft.com/office/drawing/2014/main" id="{353059AD-8D50-4B7C-84A5-4CDEF7189CF9}"/>
               </a:ext>
             </a:extLst>
           </p:cNvPr>
@@ -7569,8 +7537,8 @@
         </p:nvSpPr>
         <p:spPr>
           <a:xfrm>
-            <a:off x="2110742" y="4668518"/>
-            <a:ext cx="7970516" cy="254000"/>
+            <a:off x="2117093" y="4789799"/>
+            <a:ext cx="7957812" cy="254000"/>
           </a:xfrm>
           <a:prstGeom prst="roundRect">
             <a:avLst/>
@@ -7630,10 +7598,10 @@
       </p:sp>
       <p:sp>
         <p:nvSpPr>
-          <p:cNvPr id="35" name="Rectangle : coins arrondis 34">
-            <a:extLst>
-              <a:ext uri="{FF2B5EF4-FFF2-40B4-BE49-F238E27FC236}">
-                <a16:creationId xmlns:a16="http://schemas.microsoft.com/office/drawing/2014/main" id="{FED62D74-432E-45F4-BEC4-2FD64C1A127D}"/>
+          <p:cNvPr id="59" name="Rectangle : coins arrondis 58">
+            <a:extLst>
+              <a:ext uri="{FF2B5EF4-FFF2-40B4-BE49-F238E27FC236}">
+                <a16:creationId xmlns:a16="http://schemas.microsoft.com/office/drawing/2014/main" id="{A5764E07-DE41-4A58-9AFB-9D9FF5936304}"/>
               </a:ext>
             </a:extLst>
           </p:cNvPr>
@@ -7642,8 +7610,8 @@
         </p:nvSpPr>
         <p:spPr>
           <a:xfrm>
-            <a:off x="2110742" y="4298521"/>
-            <a:ext cx="870583" cy="254000"/>
+            <a:off x="7507287" y="4061408"/>
+            <a:ext cx="1237218" cy="254000"/>
           </a:xfrm>
           <a:prstGeom prst="roundRect">
             <a:avLst/>
@@ -7698,10 +7666,10 @@
       </p:sp>
       <p:sp>
         <p:nvSpPr>
-          <p:cNvPr id="36" name="Rectangle : coins arrondis 35">
-            <a:extLst>
-              <a:ext uri="{FF2B5EF4-FFF2-40B4-BE49-F238E27FC236}">
-                <a16:creationId xmlns:a16="http://schemas.microsoft.com/office/drawing/2014/main" id="{84E482BA-EFFD-45E8-A1C4-D22AB0E01093}"/>
+          <p:cNvPr id="60" name="Rectangle : coins arrondis 59">
+            <a:extLst>
+              <a:ext uri="{FF2B5EF4-FFF2-40B4-BE49-F238E27FC236}">
+                <a16:creationId xmlns:a16="http://schemas.microsoft.com/office/drawing/2014/main" id="{7E5BFB81-C3CD-4AB5-9458-D38AF96016F9}"/>
               </a:ext>
             </a:extLst>
           </p:cNvPr>
@@ -7710,8 +7678,8 @@
         </p:nvSpPr>
         <p:spPr>
           <a:xfrm>
-            <a:off x="3075948" y="4300219"/>
-            <a:ext cx="934712" cy="254000"/>
+            <a:off x="7507287" y="4428089"/>
+            <a:ext cx="1237218" cy="254000"/>
           </a:xfrm>
           <a:prstGeom prst="roundRect">
             <a:avLst/>
@@ -7740,7 +7708,7 @@
         </p:style>
         <p:txBody>
           <a:bodyPr lIns="36000" rIns="36000" rtlCol="0" anchor="ctr">
-            <a:normAutofit fontScale="47500" lnSpcReduction="20000"/>
+            <a:normAutofit fontScale="62500" lnSpcReduction="20000"/>
           </a:bodyPr>
           <a:lstStyle/>
           <a:p>
@@ -7766,10 +7734,10 @@
       </p:sp>
       <p:sp>
         <p:nvSpPr>
-          <p:cNvPr id="37" name="Rectangle : coins arrondis 36">
-            <a:extLst>
-              <a:ext uri="{FF2B5EF4-FFF2-40B4-BE49-F238E27FC236}">
-                <a16:creationId xmlns:a16="http://schemas.microsoft.com/office/drawing/2014/main" id="{FBF0D8E9-74E2-48AC-9A51-4E02B558267A}"/>
+          <p:cNvPr id="63" name="Rectangle : coins arrondis 62">
+            <a:extLst>
+              <a:ext uri="{FF2B5EF4-FFF2-40B4-BE49-F238E27FC236}">
+                <a16:creationId xmlns:a16="http://schemas.microsoft.com/office/drawing/2014/main" id="{EED0E04C-457C-43D3-B15A-BCC6FB8416D6}"/>
               </a:ext>
             </a:extLst>
           </p:cNvPr>
@@ -7778,255 +7746,7 @@
         </p:nvSpPr>
         <p:spPr>
           <a:xfrm>
-            <a:off x="4105283" y="4293446"/>
-            <a:ext cx="928363" cy="254000"/>
-          </a:xfrm>
-          <a:prstGeom prst="roundRect">
-            <a:avLst/>
-          </a:prstGeom>
-          <a:solidFill>
-            <a:schemeClr val="bg1">
-              <a:lumMod val="95000"/>
-            </a:schemeClr>
-          </a:solidFill>
-        </p:spPr>
-        <p:style>
-          <a:lnRef idx="2">
-            <a:schemeClr val="accent1">
-              <a:shade val="50000"/>
-            </a:schemeClr>
-          </a:lnRef>
-          <a:fillRef idx="1">
-            <a:schemeClr val="accent1"/>
-          </a:fillRef>
-          <a:effectRef idx="0">
-            <a:schemeClr val="accent1"/>
-          </a:effectRef>
-          <a:fontRef idx="minor">
-            <a:schemeClr val="lt1"/>
-          </a:fontRef>
-        </p:style>
-        <p:txBody>
-          <a:bodyPr lIns="36000" rIns="36000" rtlCol="0" anchor="ctr">
-            <a:normAutofit fontScale="55000" lnSpcReduction="20000"/>
-          </a:bodyPr>
-          <a:lstStyle/>
-          <a:p>
-            <a:pPr algn="ctr"/>
-            <a:r>
-              <a:rPr lang="fr-FR" dirty="0" err="1">
-                <a:solidFill>
-                  <a:schemeClr val="tx1"/>
-                </a:solidFill>
-              </a:rPr>
-              <a:t>Sign</a:t>
-            </a:r>
-            <a:r>
-              <a:rPr lang="fr-FR" dirty="0">
-                <a:solidFill>
-                  <a:schemeClr val="tx1"/>
-                </a:solidFill>
-              </a:rPr>
-              <a:t>. obtenue?</a:t>
-            </a:r>
-          </a:p>
-        </p:txBody>
-      </p:sp>
-      <p:sp>
-        <p:nvSpPr>
-          <p:cNvPr id="38" name="Rectangle : coins arrondis 37">
-            <a:extLst>
-              <a:ext uri="{FF2B5EF4-FFF2-40B4-BE49-F238E27FC236}">
-                <a16:creationId xmlns:a16="http://schemas.microsoft.com/office/drawing/2014/main" id="{42B50EE1-6EE5-459D-B390-6397E4C73EDF}"/>
-              </a:ext>
-            </a:extLst>
-          </p:cNvPr>
-          <p:cNvSpPr/>
-          <p:nvPr/>
-        </p:nvSpPr>
-        <p:spPr>
-          <a:xfrm>
-            <a:off x="7528562" y="4300219"/>
-            <a:ext cx="1219200" cy="254000"/>
-          </a:xfrm>
-          <a:prstGeom prst="roundRect">
-            <a:avLst/>
-          </a:prstGeom>
-          <a:solidFill>
-            <a:schemeClr val="bg1">
-              <a:lumMod val="95000"/>
-            </a:schemeClr>
-          </a:solidFill>
-        </p:spPr>
-        <p:style>
-          <a:lnRef idx="2">
-            <a:schemeClr val="accent1">
-              <a:shade val="50000"/>
-            </a:schemeClr>
-          </a:lnRef>
-          <a:fillRef idx="1">
-            <a:schemeClr val="accent1"/>
-          </a:fillRef>
-          <a:effectRef idx="0">
-            <a:schemeClr val="accent1"/>
-          </a:effectRef>
-          <a:fontRef idx="minor">
-            <a:schemeClr val="lt1"/>
-          </a:fontRef>
-        </p:style>
-        <p:txBody>
-          <a:bodyPr lIns="36000" rIns="36000" rtlCol="0" anchor="ctr">
-            <a:normAutofit fontScale="62500" lnSpcReduction="20000"/>
-          </a:bodyPr>
-          <a:lstStyle/>
-          <a:p>
-            <a:pPr algn="ctr"/>
-            <a:r>
-              <a:rPr lang="fr-FR" dirty="0">
-                <a:solidFill>
-                  <a:schemeClr val="tx1"/>
-                </a:solidFill>
-              </a:rPr>
-              <a:t>Date </a:t>
-            </a:r>
-            <a:r>
-              <a:rPr lang="fr-FR" dirty="0" err="1">
-                <a:solidFill>
-                  <a:schemeClr val="tx1"/>
-                </a:solidFill>
-              </a:rPr>
-              <a:t>Instal</a:t>
-            </a:r>
-            <a:r>
-              <a:rPr lang="fr-FR" dirty="0">
-                <a:solidFill>
-                  <a:schemeClr val="tx1"/>
-                </a:solidFill>
-              </a:rPr>
-              <a:t>.</a:t>
-            </a:r>
-          </a:p>
-        </p:txBody>
-      </p:sp>
-      <p:sp>
-        <p:nvSpPr>
-          <p:cNvPr id="39" name="Rectangle : coins arrondis 38">
-            <a:extLst>
-              <a:ext uri="{FF2B5EF4-FFF2-40B4-BE49-F238E27FC236}">
-                <a16:creationId xmlns:a16="http://schemas.microsoft.com/office/drawing/2014/main" id="{1B6BC3EB-6C7A-42C4-9082-DC0100328EA7}"/>
-              </a:ext>
-            </a:extLst>
-          </p:cNvPr>
-          <p:cNvSpPr/>
-          <p:nvPr/>
-        </p:nvSpPr>
-        <p:spPr>
-          <a:xfrm>
-            <a:off x="8862062" y="4300219"/>
-            <a:ext cx="1219200" cy="254000"/>
-          </a:xfrm>
-          <a:prstGeom prst="roundRect">
-            <a:avLst/>
-          </a:prstGeom>
-          <a:solidFill>
-            <a:schemeClr val="bg1">
-              <a:lumMod val="95000"/>
-            </a:schemeClr>
-          </a:solidFill>
-        </p:spPr>
-        <p:style>
-          <a:lnRef idx="2">
-            <a:schemeClr val="accent1">
-              <a:shade val="50000"/>
-            </a:schemeClr>
-          </a:lnRef>
-          <a:fillRef idx="1">
-            <a:schemeClr val="accent1"/>
-          </a:fillRef>
-          <a:effectRef idx="0">
-            <a:schemeClr val="accent1"/>
-          </a:effectRef>
-          <a:fontRef idx="minor">
-            <a:schemeClr val="lt1"/>
-          </a:fontRef>
-        </p:style>
-        <p:txBody>
-          <a:bodyPr lIns="36000" rIns="36000" rtlCol="0" anchor="ctr">
-            <a:normAutofit fontScale="62500" lnSpcReduction="20000"/>
-          </a:bodyPr>
-          <a:lstStyle/>
-          <a:p>
-            <a:pPr algn="ctr"/>
-            <a:r>
-              <a:rPr lang="fr-FR" dirty="0">
-                <a:solidFill>
-                  <a:schemeClr val="tx1"/>
-                </a:solidFill>
-              </a:rPr>
-              <a:t>Date Mesures</a:t>
-            </a:r>
-          </a:p>
-        </p:txBody>
-      </p:sp>
-      <p:cxnSp>
-        <p:nvCxnSpPr>
-          <p:cNvPr id="43" name="Connecteur : en angle 42">
-            <a:extLst>
-              <a:ext uri="{FF2B5EF4-FFF2-40B4-BE49-F238E27FC236}">
-                <a16:creationId xmlns:a16="http://schemas.microsoft.com/office/drawing/2014/main" id="{003AA5E5-6936-414C-A0F8-8720F54CCA1D}"/>
-              </a:ext>
-            </a:extLst>
-          </p:cNvPr>
-          <p:cNvCxnSpPr>
-            <a:endCxn id="34" idx="1"/>
-          </p:cNvCxnSpPr>
-          <p:nvPr/>
-        </p:nvCxnSpPr>
-        <p:spPr>
-          <a:xfrm rot="5400000">
-            <a:off x="1937071" y="4621846"/>
-            <a:ext cx="347343" cy="12700"/>
-          </a:xfrm>
-          <a:prstGeom prst="bentConnector4">
-            <a:avLst>
-              <a:gd name="adj1" fmla="val -3931"/>
-              <a:gd name="adj2" fmla="val 1749984"/>
-            </a:avLst>
-          </a:prstGeom>
-          <a:ln>
-            <a:tailEnd type="triangle"/>
-          </a:ln>
-        </p:spPr>
-        <p:style>
-          <a:lnRef idx="1">
-            <a:schemeClr val="accent1"/>
-          </a:lnRef>
-          <a:fillRef idx="0">
-            <a:schemeClr val="accent1"/>
-          </a:fillRef>
-          <a:effectRef idx="0">
-            <a:schemeClr val="accent1"/>
-          </a:effectRef>
-          <a:fontRef idx="minor">
-            <a:schemeClr val="tx1"/>
-          </a:fontRef>
-        </p:style>
-      </p:cxnSp>
-      <p:sp>
-        <p:nvSpPr>
-          <p:cNvPr id="46" name="Rectangle : coins arrondis 45">
-            <a:extLst>
-              <a:ext uri="{FF2B5EF4-FFF2-40B4-BE49-F238E27FC236}">
-                <a16:creationId xmlns:a16="http://schemas.microsoft.com/office/drawing/2014/main" id="{681707BD-FE61-407D-8EFD-4766C8B41E72}"/>
-              </a:ext>
-            </a:extLst>
-          </p:cNvPr>
-          <p:cNvSpPr/>
-          <p:nvPr/>
-        </p:nvSpPr>
-        <p:spPr>
-          <a:xfrm>
-            <a:off x="4110358" y="3931920"/>
+            <a:off x="2084389" y="4061408"/>
             <a:ext cx="923288" cy="254000"/>
           </a:xfrm>
           <a:prstGeom prst="roundRect">
@@ -8072,6 +7792,50 @@
           </a:p>
         </p:txBody>
       </p:sp>
+      <p:cxnSp>
+        <p:nvCxnSpPr>
+          <p:cNvPr id="8" name="Connecteur : en angle 7">
+            <a:extLst>
+              <a:ext uri="{FF2B5EF4-FFF2-40B4-BE49-F238E27FC236}">
+                <a16:creationId xmlns:a16="http://schemas.microsoft.com/office/drawing/2014/main" id="{971FDB26-7960-4F3B-BE73-B0A2ABDDEA87}"/>
+              </a:ext>
+            </a:extLst>
+          </p:cNvPr>
+          <p:cNvCxnSpPr>
+            <a:stCxn id="55" idx="1"/>
+            <a:endCxn id="58" idx="1"/>
+          </p:cNvCxnSpPr>
+          <p:nvPr/>
+        </p:nvCxnSpPr>
+        <p:spPr>
+          <a:xfrm rot="10800000" flipV="1">
+            <a:off x="2117093" y="4555089"/>
+            <a:ext cx="12700" cy="361710"/>
+          </a:xfrm>
+          <a:prstGeom prst="bentConnector3">
+            <a:avLst>
+              <a:gd name="adj1" fmla="val 1800000"/>
+            </a:avLst>
+          </a:prstGeom>
+          <a:ln>
+            <a:tailEnd type="triangle"/>
+          </a:ln>
+        </p:spPr>
+        <p:style>
+          <a:lnRef idx="1">
+            <a:schemeClr val="accent1"/>
+          </a:lnRef>
+          <a:fillRef idx="0">
+            <a:schemeClr val="accent1"/>
+          </a:fillRef>
+          <a:effectRef idx="0">
+            <a:schemeClr val="accent1"/>
+          </a:effectRef>
+          <a:fontRef idx="minor">
+            <a:schemeClr val="tx1"/>
+          </a:fontRef>
+        </p:style>
+      </p:cxnSp>
     </p:spTree>
     <p:extLst>
       <p:ext uri="{BB962C8B-B14F-4D97-AF65-F5344CB8AC3E}">

</xml_diff>

<commit_message>
FE : ReworkUpdateModal WIP (Table / Soummission)
</commit_message>
<xml_diff>
--- a/Design.pptx
+++ b/Design.pptx
@@ -8,6 +8,7 @@
     <p:sldId id="256" r:id="rId2"/>
     <p:sldId id="257" r:id="rId3"/>
     <p:sldId id="258" r:id="rId4"/>
+    <p:sldId id="259" r:id="rId5"/>
   </p:sldIdLst>
   <p:sldSz cx="12192000" cy="6858000"/>
   <p:notesSz cx="6858000" cy="9144000"/>
@@ -10301,6 +10302,1588 @@
 </p:sld>
 </file>
 
+<file path=ppt/slides/slide4.xml><?xml version="1.0" encoding="utf-8"?>
+<p:sld xmlns:a="http://schemas.openxmlformats.org/drawingml/2006/main" xmlns:r="http://schemas.openxmlformats.org/officeDocument/2006/relationships" xmlns:p="http://schemas.openxmlformats.org/presentationml/2006/main">
+  <p:cSld>
+    <p:spTree>
+      <p:nvGrpSpPr>
+        <p:cNvPr id="1" name=""/>
+        <p:cNvGrpSpPr/>
+        <p:nvPr/>
+      </p:nvGrpSpPr>
+      <p:grpSpPr>
+        <a:xfrm>
+          <a:off x="0" y="0"/>
+          <a:ext cx="0" cy="0"/>
+          <a:chOff x="0" y="0"/>
+          <a:chExt cx="0" cy="0"/>
+        </a:xfrm>
+      </p:grpSpPr>
+      <p:sp>
+        <p:nvSpPr>
+          <p:cNvPr id="16" name="ZoneTexte 15">
+            <a:extLst>
+              <a:ext uri="{FF2B5EF4-FFF2-40B4-BE49-F238E27FC236}">
+                <a16:creationId xmlns:a16="http://schemas.microsoft.com/office/drawing/2014/main" id="{3ED6CB9D-4892-44BC-8A89-A0E2925B7877}"/>
+              </a:ext>
+            </a:extLst>
+          </p:cNvPr>
+          <p:cNvSpPr txBox="1"/>
+          <p:nvPr/>
+        </p:nvSpPr>
+        <p:spPr>
+          <a:xfrm>
+            <a:off x="335280" y="160020"/>
+            <a:ext cx="4145280" cy="523220"/>
+          </a:xfrm>
+          <a:prstGeom prst="rect">
+            <a:avLst/>
+          </a:prstGeom>
+          <a:noFill/>
+        </p:spPr>
+        <p:txBody>
+          <a:bodyPr wrap="square" rtlCol="0">
+            <a:spAutoFit/>
+          </a:bodyPr>
+          <a:lstStyle/>
+          <a:p>
+            <a:r>
+              <a:rPr lang="fr-FR" sz="2800" dirty="0"/>
+              <a:t>Rework-update</a:t>
+            </a:r>
+          </a:p>
+        </p:txBody>
+      </p:sp>
+      <p:graphicFrame>
+        <p:nvGraphicFramePr>
+          <p:cNvPr id="48" name="Tableau 47">
+            <a:extLst>
+              <a:ext uri="{FF2B5EF4-FFF2-40B4-BE49-F238E27FC236}">
+                <a16:creationId xmlns:a16="http://schemas.microsoft.com/office/drawing/2014/main" id="{B43553C4-364E-4440-A55B-79377030C037}"/>
+              </a:ext>
+            </a:extLst>
+          </p:cNvPr>
+          <p:cNvGraphicFramePr>
+            <a:graphicFrameLocks noGrp="1"/>
+          </p:cNvGraphicFramePr>
+          <p:nvPr>
+            <p:extLst>
+              <p:ext uri="{D42A27DB-BD31-4B8C-83A1-F6EECF244321}">
+                <p14:modId xmlns:p14="http://schemas.microsoft.com/office/powerpoint/2010/main" val="2485880462"/>
+              </p:ext>
+            </p:extLst>
+          </p:nvPr>
+        </p:nvGraphicFramePr>
+        <p:xfrm>
+          <a:off x="568358" y="3111500"/>
+          <a:ext cx="11161955" cy="1569720"/>
+        </p:xfrm>
+        <a:graphic>
+          <a:graphicData uri="http://schemas.openxmlformats.org/drawingml/2006/table">
+            <a:tbl>
+              <a:tblPr firstRow="1" bandRow="1">
+                <a:tableStyleId>{5C22544A-7EE6-4342-B048-85BDC9FD1C3A}</a:tableStyleId>
+              </a:tblPr>
+              <a:tblGrid>
+                <a:gridCol w="925162">
+                  <a:extLst>
+                    <a:ext uri="{9D8B030D-6E8A-4147-A177-3AD203B41FA5}">
+                      <a16:colId xmlns:a16="http://schemas.microsoft.com/office/drawing/2014/main" val="2827733552"/>
+                    </a:ext>
+                  </a:extLst>
+                </a:gridCol>
+                <a:gridCol w="1325880">
+                  <a:extLst>
+                    <a:ext uri="{9D8B030D-6E8A-4147-A177-3AD203B41FA5}">
+                      <a16:colId xmlns:a16="http://schemas.microsoft.com/office/drawing/2014/main" val="3451624636"/>
+                    </a:ext>
+                  </a:extLst>
+                </a:gridCol>
+                <a:gridCol w="1889760">
+                  <a:extLst>
+                    <a:ext uri="{9D8B030D-6E8A-4147-A177-3AD203B41FA5}">
+                      <a16:colId xmlns:a16="http://schemas.microsoft.com/office/drawing/2014/main" val="1767028796"/>
+                    </a:ext>
+                  </a:extLst>
+                </a:gridCol>
+                <a:gridCol w="1905000">
+                  <a:extLst>
+                    <a:ext uri="{9D8B030D-6E8A-4147-A177-3AD203B41FA5}">
+                      <a16:colId xmlns:a16="http://schemas.microsoft.com/office/drawing/2014/main" val="1879272796"/>
+                    </a:ext>
+                  </a:extLst>
+                </a:gridCol>
+                <a:gridCol w="5116153">
+                  <a:extLst>
+                    <a:ext uri="{9D8B030D-6E8A-4147-A177-3AD203B41FA5}">
+                      <a16:colId xmlns:a16="http://schemas.microsoft.com/office/drawing/2014/main" val="1549496342"/>
+                    </a:ext>
+                  </a:extLst>
+                </a:gridCol>
+              </a:tblGrid>
+              <a:tr h="370840">
+                <a:tc>
+                  <a:txBody>
+                    <a:bodyPr/>
+                    <a:lstStyle/>
+                    <a:p>
+                      <a:r>
+                        <a:rPr lang="fr-FR" sz="1400" dirty="0"/>
+                        <a:t>PT</a:t>
+                      </a:r>
+                    </a:p>
+                  </a:txBody>
+                  <a:tcPr/>
+                </a:tc>
+                <a:tc>
+                  <a:txBody>
+                    <a:bodyPr/>
+                    <a:lstStyle/>
+                    <a:p>
+                      <a:r>
+                        <a:rPr lang="fr-FR" sz="1400" dirty="0"/>
+                        <a:t>Nb Contrôle KO</a:t>
+                      </a:r>
+                    </a:p>
+                  </a:txBody>
+                  <a:tcPr/>
+                </a:tc>
+                <a:tc>
+                  <a:txBody>
+                    <a:bodyPr/>
+                    <a:lstStyle/>
+                    <a:p>
+                      <a:r>
+                        <a:rPr lang="fr-FR" sz="1400" dirty="0"/>
+                        <a:t>Installation</a:t>
+                      </a:r>
+                    </a:p>
+                  </a:txBody>
+                  <a:tcPr/>
+                </a:tc>
+                <a:tc>
+                  <a:txBody>
+                    <a:bodyPr/>
+                    <a:lstStyle/>
+                    <a:p>
+                      <a:r>
+                        <a:rPr lang="fr-FR" sz="1400" dirty="0"/>
+                        <a:t>Défaut à reprendre</a:t>
+                      </a:r>
+                    </a:p>
+                  </a:txBody>
+                  <a:tcPr/>
+                </a:tc>
+                <a:tc>
+                  <a:txBody>
+                    <a:bodyPr/>
+                    <a:lstStyle/>
+                    <a:p>
+                      <a:r>
+                        <a:rPr lang="fr-FR" sz="1400" dirty="0"/>
+                        <a:t>Reprise</a:t>
+                      </a:r>
+                    </a:p>
+                  </a:txBody>
+                  <a:tcPr/>
+                </a:tc>
+                <a:extLst>
+                  <a:ext uri="{0D108BD9-81ED-4DB2-BD59-A6C34878D82A}">
+                    <a16:rowId xmlns:a16="http://schemas.microsoft.com/office/drawing/2014/main" val="1112082800"/>
+                  </a:ext>
+                </a:extLst>
+              </a:tr>
+              <a:tr h="370840">
+                <a:tc>
+                  <a:txBody>
+                    <a:bodyPr/>
+                    <a:lstStyle/>
+                    <a:p>
+                      <a:r>
+                        <a:rPr lang="fr-FR" sz="1200" dirty="0"/>
+                        <a:t>PB/PT (TR)</a:t>
+                      </a:r>
+                    </a:p>
+                    <a:p>
+                      <a:r>
+                        <a:rPr lang="fr-FR" sz="1200" dirty="0"/>
+                        <a:t>Adresse</a:t>
+                      </a:r>
+                    </a:p>
+                  </a:txBody>
+                  <a:tcPr/>
+                </a:tc>
+                <a:tc>
+                  <a:txBody>
+                    <a:bodyPr/>
+                    <a:lstStyle/>
+                    <a:p>
+                      <a:r>
+                        <a:rPr lang="fr-FR" sz="1200" dirty="0"/>
+                        <a:t>1</a:t>
+                      </a:r>
+                    </a:p>
+                  </a:txBody>
+                  <a:tcPr/>
+                </a:tc>
+                <a:tc>
+                  <a:txBody>
+                    <a:bodyPr/>
+                    <a:lstStyle/>
+                    <a:p>
+                      <a:r>
+                        <a:rPr lang="fr-FR" sz="1200" dirty="0"/>
+                        <a:t>Date </a:t>
+                      </a:r>
+                      <a:r>
+                        <a:rPr lang="fr-FR" sz="1200" dirty="0" err="1"/>
+                        <a:t>install</a:t>
+                      </a:r>
+                      <a:r>
+                        <a:rPr lang="fr-FR" sz="1200" dirty="0"/>
+                        <a:t> : jj/mm/</a:t>
+                      </a:r>
+                      <a:r>
+                        <a:rPr lang="fr-FR" sz="1200" dirty="0" err="1"/>
+                        <a:t>aaaaa</a:t>
+                      </a:r>
+                      <a:endParaRPr lang="fr-FR" sz="1200" dirty="0"/>
+                    </a:p>
+                    <a:p>
+                      <a:r>
+                        <a:rPr lang="fr-FR" sz="1200" dirty="0"/>
+                        <a:t>Acteur : Nom installateur</a:t>
+                      </a:r>
+                    </a:p>
+                  </a:txBody>
+                  <a:tcPr/>
+                </a:tc>
+                <a:tc>
+                  <a:txBody>
+                    <a:bodyPr/>
+                    <a:lstStyle/>
+                    <a:p>
+                      <a:r>
+                        <a:rPr lang="fr-FR" sz="1200" dirty="0"/>
+                        <a:t>Description</a:t>
+                      </a:r>
+                    </a:p>
+                  </a:txBody>
+                  <a:tcPr/>
+                </a:tc>
+                <a:tc>
+                  <a:txBody>
+                    <a:bodyPr/>
+                    <a:lstStyle/>
+                    <a:p>
+                      <a:endParaRPr lang="fr-FR" sz="1200"/>
+                    </a:p>
+                  </a:txBody>
+                  <a:tcPr/>
+                </a:tc>
+                <a:extLst>
+                  <a:ext uri="{0D108BD9-81ED-4DB2-BD59-A6C34878D82A}">
+                    <a16:rowId xmlns:a16="http://schemas.microsoft.com/office/drawing/2014/main" val="1036210639"/>
+                  </a:ext>
+                </a:extLst>
+              </a:tr>
+              <a:tr h="370840">
+                <a:tc>
+                  <a:txBody>
+                    <a:bodyPr/>
+                    <a:lstStyle/>
+                    <a:p>
+                      <a:r>
+                        <a:rPr lang="fr-FR" sz="1200" dirty="0"/>
+                        <a:t>PB/PT</a:t>
+                      </a:r>
+                    </a:p>
+                  </a:txBody>
+                  <a:tcPr/>
+                </a:tc>
+                <a:tc>
+                  <a:txBody>
+                    <a:bodyPr/>
+                    <a:lstStyle/>
+                    <a:p>
+                      <a:r>
+                        <a:rPr lang="fr-FR" sz="1200" dirty="0"/>
+                        <a:t>2</a:t>
+                      </a:r>
+                    </a:p>
+                  </a:txBody>
+                  <a:tcPr/>
+                </a:tc>
+                <a:tc>
+                  <a:txBody>
+                    <a:bodyPr/>
+                    <a:lstStyle/>
+                    <a:p>
+                      <a:endParaRPr lang="fr-FR" sz="1200" dirty="0"/>
+                    </a:p>
+                  </a:txBody>
+                  <a:tcPr/>
+                </a:tc>
+                <a:tc>
+                  <a:txBody>
+                    <a:bodyPr/>
+                    <a:lstStyle/>
+                    <a:p>
+                      <a:endParaRPr lang="fr-FR" sz="1200"/>
+                    </a:p>
+                  </a:txBody>
+                  <a:tcPr/>
+                </a:tc>
+                <a:tc>
+                  <a:txBody>
+                    <a:bodyPr/>
+                    <a:lstStyle/>
+                    <a:p>
+                      <a:endParaRPr lang="fr-FR" sz="1200" dirty="0"/>
+                    </a:p>
+                  </a:txBody>
+                  <a:tcPr/>
+                </a:tc>
+                <a:extLst>
+                  <a:ext uri="{0D108BD9-81ED-4DB2-BD59-A6C34878D82A}">
+                    <a16:rowId xmlns:a16="http://schemas.microsoft.com/office/drawing/2014/main" val="4130490653"/>
+                  </a:ext>
+                </a:extLst>
+              </a:tr>
+              <a:tr h="370840">
+                <a:tc>
+                  <a:txBody>
+                    <a:bodyPr/>
+                    <a:lstStyle/>
+                    <a:p>
+                      <a:r>
+                        <a:rPr lang="fr-FR" sz="1200" dirty="0"/>
+                        <a:t>PB/PT</a:t>
+                      </a:r>
+                    </a:p>
+                  </a:txBody>
+                  <a:tcPr/>
+                </a:tc>
+                <a:tc>
+                  <a:txBody>
+                    <a:bodyPr/>
+                    <a:lstStyle/>
+                    <a:p>
+                      <a:r>
+                        <a:rPr lang="fr-FR" sz="1200" dirty="0"/>
+                        <a:t>1</a:t>
+                      </a:r>
+                    </a:p>
+                  </a:txBody>
+                  <a:tcPr/>
+                </a:tc>
+                <a:tc>
+                  <a:txBody>
+                    <a:bodyPr/>
+                    <a:lstStyle/>
+                    <a:p>
+                      <a:endParaRPr lang="fr-FR" sz="1200" dirty="0"/>
+                    </a:p>
+                  </a:txBody>
+                  <a:tcPr/>
+                </a:tc>
+                <a:tc>
+                  <a:txBody>
+                    <a:bodyPr/>
+                    <a:lstStyle/>
+                    <a:p>
+                      <a:endParaRPr lang="fr-FR" sz="1200" dirty="0"/>
+                    </a:p>
+                  </a:txBody>
+                  <a:tcPr/>
+                </a:tc>
+                <a:tc>
+                  <a:txBody>
+                    <a:bodyPr/>
+                    <a:lstStyle/>
+                    <a:p>
+                      <a:endParaRPr lang="fr-FR" sz="1200" dirty="0"/>
+                    </a:p>
+                  </a:txBody>
+                  <a:tcPr/>
+                </a:tc>
+                <a:extLst>
+                  <a:ext uri="{0D108BD9-81ED-4DB2-BD59-A6C34878D82A}">
+                    <a16:rowId xmlns:a16="http://schemas.microsoft.com/office/drawing/2014/main" val="2469129256"/>
+                  </a:ext>
+                </a:extLst>
+              </a:tr>
+            </a:tbl>
+          </a:graphicData>
+        </a:graphic>
+      </p:graphicFrame>
+      <p:sp>
+        <p:nvSpPr>
+          <p:cNvPr id="56" name="Rectangle : coins arrondis 55">
+            <a:extLst>
+              <a:ext uri="{FF2B5EF4-FFF2-40B4-BE49-F238E27FC236}">
+                <a16:creationId xmlns:a16="http://schemas.microsoft.com/office/drawing/2014/main" id="{B41D7BBF-1E2E-4F1F-9ECD-A7E9A514FE63}"/>
+              </a:ext>
+            </a:extLst>
+          </p:cNvPr>
+          <p:cNvSpPr/>
+          <p:nvPr/>
+        </p:nvSpPr>
+        <p:spPr>
+          <a:xfrm>
+            <a:off x="6715687" y="3566010"/>
+            <a:ext cx="1035387" cy="254000"/>
+          </a:xfrm>
+          <a:prstGeom prst="roundRect">
+            <a:avLst/>
+          </a:prstGeom>
+          <a:solidFill>
+            <a:schemeClr val="bg1">
+              <a:lumMod val="95000"/>
+            </a:schemeClr>
+          </a:solidFill>
+        </p:spPr>
+        <p:style>
+          <a:lnRef idx="2">
+            <a:schemeClr val="accent1">
+              <a:shade val="50000"/>
+            </a:schemeClr>
+          </a:lnRef>
+          <a:fillRef idx="1">
+            <a:schemeClr val="accent1"/>
+          </a:fillRef>
+          <a:effectRef idx="0">
+            <a:schemeClr val="accent1"/>
+          </a:effectRef>
+          <a:fontRef idx="minor">
+            <a:schemeClr val="lt1"/>
+          </a:fontRef>
+        </p:style>
+        <p:txBody>
+          <a:bodyPr lIns="36000" rIns="36000" rtlCol="0" anchor="ctr">
+            <a:normAutofit fontScale="62500" lnSpcReduction="20000"/>
+          </a:bodyPr>
+          <a:lstStyle/>
+          <a:p>
+            <a:pPr algn="ctr"/>
+            <a:r>
+              <a:rPr lang="fr-FR" dirty="0">
+                <a:solidFill>
+                  <a:schemeClr val="tx1"/>
+                </a:solidFill>
+              </a:rPr>
+              <a:t>&gt; Acteur</a:t>
+            </a:r>
+          </a:p>
+        </p:txBody>
+      </p:sp>
+      <p:sp>
+        <p:nvSpPr>
+          <p:cNvPr id="59" name="Rectangle : coins arrondis 58">
+            <a:extLst>
+              <a:ext uri="{FF2B5EF4-FFF2-40B4-BE49-F238E27FC236}">
+                <a16:creationId xmlns:a16="http://schemas.microsoft.com/office/drawing/2014/main" id="{8EE41660-0D08-4F7B-B8A8-F380B434B609}"/>
+              </a:ext>
+            </a:extLst>
+          </p:cNvPr>
+          <p:cNvSpPr/>
+          <p:nvPr/>
+        </p:nvSpPr>
+        <p:spPr>
+          <a:xfrm>
+            <a:off x="7859259" y="3566010"/>
+            <a:ext cx="884444" cy="254000"/>
+          </a:xfrm>
+          <a:prstGeom prst="roundRect">
+            <a:avLst/>
+          </a:prstGeom>
+          <a:solidFill>
+            <a:schemeClr val="bg1">
+              <a:lumMod val="95000"/>
+            </a:schemeClr>
+          </a:solidFill>
+        </p:spPr>
+        <p:style>
+          <a:lnRef idx="2">
+            <a:schemeClr val="accent1">
+              <a:shade val="50000"/>
+            </a:schemeClr>
+          </a:lnRef>
+          <a:fillRef idx="1">
+            <a:schemeClr val="accent1"/>
+          </a:fillRef>
+          <a:effectRef idx="0">
+            <a:schemeClr val="accent1"/>
+          </a:effectRef>
+          <a:fontRef idx="minor">
+            <a:schemeClr val="lt1"/>
+          </a:fontRef>
+        </p:style>
+        <p:txBody>
+          <a:bodyPr lIns="36000" rIns="36000" rtlCol="0" anchor="ctr">
+            <a:normAutofit fontScale="62500" lnSpcReduction="20000"/>
+          </a:bodyPr>
+          <a:lstStyle/>
+          <a:p>
+            <a:pPr algn="ctr"/>
+            <a:r>
+              <a:rPr lang="fr-FR" dirty="0">
+                <a:solidFill>
+                  <a:schemeClr val="tx1"/>
+                </a:solidFill>
+              </a:rPr>
+              <a:t>Date</a:t>
+            </a:r>
+          </a:p>
+        </p:txBody>
+      </p:sp>
+      <p:graphicFrame>
+        <p:nvGraphicFramePr>
+          <p:cNvPr id="50" name="Tableau 49">
+            <a:extLst>
+              <a:ext uri="{FF2B5EF4-FFF2-40B4-BE49-F238E27FC236}">
+                <a16:creationId xmlns:a16="http://schemas.microsoft.com/office/drawing/2014/main" id="{32ECA407-7F6A-4F27-8B88-B95504AC24EC}"/>
+              </a:ext>
+            </a:extLst>
+          </p:cNvPr>
+          <p:cNvGraphicFramePr>
+            <a:graphicFrameLocks noGrp="1"/>
+          </p:cNvGraphicFramePr>
+          <p:nvPr>
+            <p:extLst>
+              <p:ext uri="{D42A27DB-BD31-4B8C-83A1-F6EECF244321}">
+                <p14:modId xmlns:p14="http://schemas.microsoft.com/office/powerpoint/2010/main" val="626671215"/>
+              </p:ext>
+            </p:extLst>
+          </p:nvPr>
+        </p:nvGraphicFramePr>
+        <p:xfrm>
+          <a:off x="568358" y="759022"/>
+          <a:ext cx="11161956" cy="1854200"/>
+        </p:xfrm>
+        <a:graphic>
+          <a:graphicData uri="http://schemas.openxmlformats.org/drawingml/2006/table">
+            <a:tbl>
+              <a:tblPr firstRow="1" bandRow="1">
+                <a:tableStyleId>{5C22544A-7EE6-4342-B048-85BDC9FD1C3A}</a:tableStyleId>
+              </a:tblPr>
+              <a:tblGrid>
+                <a:gridCol w="930163">
+                  <a:extLst>
+                    <a:ext uri="{9D8B030D-6E8A-4147-A177-3AD203B41FA5}">
+                      <a16:colId xmlns:a16="http://schemas.microsoft.com/office/drawing/2014/main" val="4007388370"/>
+                    </a:ext>
+                  </a:extLst>
+                </a:gridCol>
+                <a:gridCol w="930163">
+                  <a:extLst>
+                    <a:ext uri="{9D8B030D-6E8A-4147-A177-3AD203B41FA5}">
+                      <a16:colId xmlns:a16="http://schemas.microsoft.com/office/drawing/2014/main" val="3853247849"/>
+                    </a:ext>
+                  </a:extLst>
+                </a:gridCol>
+                <a:gridCol w="930163">
+                  <a:extLst>
+                    <a:ext uri="{9D8B030D-6E8A-4147-A177-3AD203B41FA5}">
+                      <a16:colId xmlns:a16="http://schemas.microsoft.com/office/drawing/2014/main" val="3811464320"/>
+                    </a:ext>
+                  </a:extLst>
+                </a:gridCol>
+                <a:gridCol w="930163">
+                  <a:extLst>
+                    <a:ext uri="{9D8B030D-6E8A-4147-A177-3AD203B41FA5}">
+                      <a16:colId xmlns:a16="http://schemas.microsoft.com/office/drawing/2014/main" val="701571514"/>
+                    </a:ext>
+                  </a:extLst>
+                </a:gridCol>
+                <a:gridCol w="930163">
+                  <a:extLst>
+                    <a:ext uri="{9D8B030D-6E8A-4147-A177-3AD203B41FA5}">
+                      <a16:colId xmlns:a16="http://schemas.microsoft.com/office/drawing/2014/main" val="2090525235"/>
+                    </a:ext>
+                  </a:extLst>
+                </a:gridCol>
+                <a:gridCol w="930163">
+                  <a:extLst>
+                    <a:ext uri="{9D8B030D-6E8A-4147-A177-3AD203B41FA5}">
+                      <a16:colId xmlns:a16="http://schemas.microsoft.com/office/drawing/2014/main" val="3439850729"/>
+                    </a:ext>
+                  </a:extLst>
+                </a:gridCol>
+                <a:gridCol w="930163">
+                  <a:extLst>
+                    <a:ext uri="{9D8B030D-6E8A-4147-A177-3AD203B41FA5}">
+                      <a16:colId xmlns:a16="http://schemas.microsoft.com/office/drawing/2014/main" val="131470306"/>
+                    </a:ext>
+                  </a:extLst>
+                </a:gridCol>
+                <a:gridCol w="930163">
+                  <a:extLst>
+                    <a:ext uri="{9D8B030D-6E8A-4147-A177-3AD203B41FA5}">
+                      <a16:colId xmlns:a16="http://schemas.microsoft.com/office/drawing/2014/main" val="3361251054"/>
+                    </a:ext>
+                  </a:extLst>
+                </a:gridCol>
+                <a:gridCol w="930163">
+                  <a:extLst>
+                    <a:ext uri="{9D8B030D-6E8A-4147-A177-3AD203B41FA5}">
+                      <a16:colId xmlns:a16="http://schemas.microsoft.com/office/drawing/2014/main" val="1982278795"/>
+                    </a:ext>
+                  </a:extLst>
+                </a:gridCol>
+                <a:gridCol w="930163">
+                  <a:extLst>
+                    <a:ext uri="{9D8B030D-6E8A-4147-A177-3AD203B41FA5}">
+                      <a16:colId xmlns:a16="http://schemas.microsoft.com/office/drawing/2014/main" val="2525089062"/>
+                    </a:ext>
+                  </a:extLst>
+                </a:gridCol>
+                <a:gridCol w="930163">
+                  <a:extLst>
+                    <a:ext uri="{9D8B030D-6E8A-4147-A177-3AD203B41FA5}">
+                      <a16:colId xmlns:a16="http://schemas.microsoft.com/office/drawing/2014/main" val="3767385281"/>
+                    </a:ext>
+                  </a:extLst>
+                </a:gridCol>
+                <a:gridCol w="930163">
+                  <a:extLst>
+                    <a:ext uri="{9D8B030D-6E8A-4147-A177-3AD203B41FA5}">
+                      <a16:colId xmlns:a16="http://schemas.microsoft.com/office/drawing/2014/main" val="2328813377"/>
+                    </a:ext>
+                  </a:extLst>
+                </a:gridCol>
+              </a:tblGrid>
+              <a:tr h="370840">
+                <a:tc>
+                  <a:txBody>
+                    <a:bodyPr/>
+                    <a:lstStyle/>
+                    <a:p>
+                      <a:pPr algn="r"/>
+                      <a:r>
+                        <a:rPr lang="fr-FR" dirty="0"/>
+                        <a:t>2</a:t>
+                      </a:r>
+                    </a:p>
+                  </a:txBody>
+                  <a:tcPr/>
+                </a:tc>
+                <a:tc>
+                  <a:txBody>
+                    <a:bodyPr/>
+                    <a:lstStyle/>
+                    <a:p>
+                      <a:pPr algn="r"/>
+                      <a:r>
+                        <a:rPr lang="fr-FR" dirty="0"/>
+                        <a:t>4</a:t>
+                      </a:r>
+                    </a:p>
+                  </a:txBody>
+                  <a:tcPr/>
+                </a:tc>
+                <a:tc>
+                  <a:txBody>
+                    <a:bodyPr/>
+                    <a:lstStyle/>
+                    <a:p>
+                      <a:pPr algn="r"/>
+                      <a:r>
+                        <a:rPr lang="fr-FR" dirty="0"/>
+                        <a:t>6</a:t>
+                      </a:r>
+                    </a:p>
+                  </a:txBody>
+                  <a:tcPr/>
+                </a:tc>
+                <a:tc>
+                  <a:txBody>
+                    <a:bodyPr/>
+                    <a:lstStyle/>
+                    <a:p>
+                      <a:pPr algn="r"/>
+                      <a:r>
+                        <a:rPr lang="fr-FR" dirty="0"/>
+                        <a:t>8</a:t>
+                      </a:r>
+                    </a:p>
+                  </a:txBody>
+                  <a:tcPr/>
+                </a:tc>
+                <a:tc>
+                  <a:txBody>
+                    <a:bodyPr/>
+                    <a:lstStyle/>
+                    <a:p>
+                      <a:pPr algn="r"/>
+                      <a:r>
+                        <a:rPr lang="fr-FR" dirty="0"/>
+                        <a:t>10</a:t>
+                      </a:r>
+                    </a:p>
+                  </a:txBody>
+                  <a:tcPr/>
+                </a:tc>
+                <a:tc>
+                  <a:txBody>
+                    <a:bodyPr/>
+                    <a:lstStyle/>
+                    <a:p>
+                      <a:pPr algn="r"/>
+                      <a:r>
+                        <a:rPr lang="fr-FR" dirty="0"/>
+                        <a:t>12</a:t>
+                      </a:r>
+                    </a:p>
+                  </a:txBody>
+                  <a:tcPr/>
+                </a:tc>
+                <a:tc>
+                  <a:txBody>
+                    <a:bodyPr/>
+                    <a:lstStyle/>
+                    <a:p>
+                      <a:pPr algn="r"/>
+                      <a:r>
+                        <a:rPr lang="fr-FR" dirty="0"/>
+                        <a:t>14</a:t>
+                      </a:r>
+                    </a:p>
+                  </a:txBody>
+                  <a:tcPr/>
+                </a:tc>
+                <a:tc>
+                  <a:txBody>
+                    <a:bodyPr/>
+                    <a:lstStyle/>
+                    <a:p>
+                      <a:pPr algn="r"/>
+                      <a:r>
+                        <a:rPr lang="fr-FR" dirty="0"/>
+                        <a:t>16</a:t>
+                      </a:r>
+                    </a:p>
+                  </a:txBody>
+                  <a:tcPr/>
+                </a:tc>
+                <a:tc>
+                  <a:txBody>
+                    <a:bodyPr/>
+                    <a:lstStyle/>
+                    <a:p>
+                      <a:pPr algn="r"/>
+                      <a:r>
+                        <a:rPr lang="fr-FR" dirty="0"/>
+                        <a:t>18</a:t>
+                      </a:r>
+                    </a:p>
+                  </a:txBody>
+                  <a:tcPr/>
+                </a:tc>
+                <a:tc>
+                  <a:txBody>
+                    <a:bodyPr/>
+                    <a:lstStyle/>
+                    <a:p>
+                      <a:pPr algn="r"/>
+                      <a:r>
+                        <a:rPr lang="fr-FR" dirty="0"/>
+                        <a:t>20</a:t>
+                      </a:r>
+                    </a:p>
+                  </a:txBody>
+                  <a:tcPr/>
+                </a:tc>
+                <a:tc>
+                  <a:txBody>
+                    <a:bodyPr/>
+                    <a:lstStyle/>
+                    <a:p>
+                      <a:pPr algn="r"/>
+                      <a:r>
+                        <a:rPr lang="fr-FR" dirty="0"/>
+                        <a:t>22</a:t>
+                      </a:r>
+                    </a:p>
+                  </a:txBody>
+                  <a:tcPr/>
+                </a:tc>
+                <a:tc>
+                  <a:txBody>
+                    <a:bodyPr/>
+                    <a:lstStyle/>
+                    <a:p>
+                      <a:pPr algn="r"/>
+                      <a:r>
+                        <a:rPr lang="fr-FR" dirty="0"/>
+                        <a:t>24</a:t>
+                      </a:r>
+                    </a:p>
+                  </a:txBody>
+                  <a:tcPr/>
+                </a:tc>
+                <a:extLst>
+                  <a:ext uri="{0D108BD9-81ED-4DB2-BD59-A6C34878D82A}">
+                    <a16:rowId xmlns:a16="http://schemas.microsoft.com/office/drawing/2014/main" val="305590700"/>
+                  </a:ext>
+                </a:extLst>
+              </a:tr>
+              <a:tr h="370840">
+                <a:tc>
+                  <a:txBody>
+                    <a:bodyPr/>
+                    <a:lstStyle/>
+                    <a:p>
+                      <a:endParaRPr lang="fr-FR"/>
+                    </a:p>
+                  </a:txBody>
+                  <a:tcPr/>
+                </a:tc>
+                <a:tc>
+                  <a:txBody>
+                    <a:bodyPr/>
+                    <a:lstStyle/>
+                    <a:p>
+                      <a:endParaRPr lang="fr-FR"/>
+                    </a:p>
+                  </a:txBody>
+                  <a:tcPr/>
+                </a:tc>
+                <a:tc>
+                  <a:txBody>
+                    <a:bodyPr/>
+                    <a:lstStyle/>
+                    <a:p>
+                      <a:endParaRPr lang="fr-FR"/>
+                    </a:p>
+                  </a:txBody>
+                  <a:tcPr/>
+                </a:tc>
+                <a:tc>
+                  <a:txBody>
+                    <a:bodyPr/>
+                    <a:lstStyle/>
+                    <a:p>
+                      <a:endParaRPr lang="fr-FR"/>
+                    </a:p>
+                  </a:txBody>
+                  <a:tcPr/>
+                </a:tc>
+                <a:tc>
+                  <a:txBody>
+                    <a:bodyPr/>
+                    <a:lstStyle/>
+                    <a:p>
+                      <a:endParaRPr lang="fr-FR" dirty="0"/>
+                    </a:p>
+                  </a:txBody>
+                  <a:tcPr/>
+                </a:tc>
+                <a:tc>
+                  <a:txBody>
+                    <a:bodyPr/>
+                    <a:lstStyle/>
+                    <a:p>
+                      <a:endParaRPr lang="fr-FR" dirty="0"/>
+                    </a:p>
+                  </a:txBody>
+                  <a:tcPr/>
+                </a:tc>
+                <a:tc>
+                  <a:txBody>
+                    <a:bodyPr/>
+                    <a:lstStyle/>
+                    <a:p>
+                      <a:endParaRPr lang="fr-FR" dirty="0"/>
+                    </a:p>
+                  </a:txBody>
+                  <a:tcPr/>
+                </a:tc>
+                <a:tc>
+                  <a:txBody>
+                    <a:bodyPr/>
+                    <a:lstStyle/>
+                    <a:p>
+                      <a:endParaRPr lang="fr-FR" dirty="0"/>
+                    </a:p>
+                  </a:txBody>
+                  <a:tcPr/>
+                </a:tc>
+                <a:tc>
+                  <a:txBody>
+                    <a:bodyPr/>
+                    <a:lstStyle/>
+                    <a:p>
+                      <a:endParaRPr lang="fr-FR" dirty="0"/>
+                    </a:p>
+                  </a:txBody>
+                  <a:tcPr/>
+                </a:tc>
+                <a:tc>
+                  <a:txBody>
+                    <a:bodyPr/>
+                    <a:lstStyle/>
+                    <a:p>
+                      <a:endParaRPr lang="fr-FR" dirty="0"/>
+                    </a:p>
+                  </a:txBody>
+                  <a:tcPr/>
+                </a:tc>
+                <a:tc>
+                  <a:txBody>
+                    <a:bodyPr/>
+                    <a:lstStyle/>
+                    <a:p>
+                      <a:endParaRPr lang="fr-FR" dirty="0"/>
+                    </a:p>
+                  </a:txBody>
+                  <a:tcPr/>
+                </a:tc>
+                <a:tc>
+                  <a:txBody>
+                    <a:bodyPr/>
+                    <a:lstStyle/>
+                    <a:p>
+                      <a:endParaRPr lang="fr-FR" dirty="0"/>
+                    </a:p>
+                  </a:txBody>
+                  <a:tcPr/>
+                </a:tc>
+                <a:extLst>
+                  <a:ext uri="{0D108BD9-81ED-4DB2-BD59-A6C34878D82A}">
+                    <a16:rowId xmlns:a16="http://schemas.microsoft.com/office/drawing/2014/main" val="869477688"/>
+                  </a:ext>
+                </a:extLst>
+              </a:tr>
+              <a:tr h="370840">
+                <a:tc>
+                  <a:txBody>
+                    <a:bodyPr/>
+                    <a:lstStyle/>
+                    <a:p>
+                      <a:endParaRPr lang="fr-FR"/>
+                    </a:p>
+                  </a:txBody>
+                  <a:tcPr/>
+                </a:tc>
+                <a:tc>
+                  <a:txBody>
+                    <a:bodyPr/>
+                    <a:lstStyle/>
+                    <a:p>
+                      <a:endParaRPr lang="fr-FR"/>
+                    </a:p>
+                  </a:txBody>
+                  <a:tcPr/>
+                </a:tc>
+                <a:tc>
+                  <a:txBody>
+                    <a:bodyPr/>
+                    <a:lstStyle/>
+                    <a:p>
+                      <a:endParaRPr lang="fr-FR"/>
+                    </a:p>
+                  </a:txBody>
+                  <a:tcPr/>
+                </a:tc>
+                <a:tc>
+                  <a:txBody>
+                    <a:bodyPr/>
+                    <a:lstStyle/>
+                    <a:p>
+                      <a:endParaRPr lang="fr-FR" dirty="0"/>
+                    </a:p>
+                  </a:txBody>
+                  <a:tcPr/>
+                </a:tc>
+                <a:tc>
+                  <a:txBody>
+                    <a:bodyPr/>
+                    <a:lstStyle/>
+                    <a:p>
+                      <a:endParaRPr lang="fr-FR" dirty="0"/>
+                    </a:p>
+                  </a:txBody>
+                  <a:tcPr/>
+                </a:tc>
+                <a:tc>
+                  <a:txBody>
+                    <a:bodyPr/>
+                    <a:lstStyle/>
+                    <a:p>
+                      <a:endParaRPr lang="fr-FR"/>
+                    </a:p>
+                  </a:txBody>
+                  <a:tcPr/>
+                </a:tc>
+                <a:tc>
+                  <a:txBody>
+                    <a:bodyPr/>
+                    <a:lstStyle/>
+                    <a:p>
+                      <a:endParaRPr lang="fr-FR" dirty="0"/>
+                    </a:p>
+                  </a:txBody>
+                  <a:tcPr/>
+                </a:tc>
+                <a:tc>
+                  <a:txBody>
+                    <a:bodyPr/>
+                    <a:lstStyle/>
+                    <a:p>
+                      <a:endParaRPr lang="fr-FR"/>
+                    </a:p>
+                  </a:txBody>
+                  <a:tcPr/>
+                </a:tc>
+                <a:tc>
+                  <a:txBody>
+                    <a:bodyPr/>
+                    <a:lstStyle/>
+                    <a:p>
+                      <a:endParaRPr lang="fr-FR" dirty="0"/>
+                    </a:p>
+                  </a:txBody>
+                  <a:tcPr/>
+                </a:tc>
+                <a:tc>
+                  <a:txBody>
+                    <a:bodyPr/>
+                    <a:lstStyle/>
+                    <a:p>
+                      <a:endParaRPr lang="fr-FR" dirty="0"/>
+                    </a:p>
+                  </a:txBody>
+                  <a:tcPr/>
+                </a:tc>
+                <a:tc>
+                  <a:txBody>
+                    <a:bodyPr/>
+                    <a:lstStyle/>
+                    <a:p>
+                      <a:endParaRPr lang="fr-FR"/>
+                    </a:p>
+                  </a:txBody>
+                  <a:tcPr/>
+                </a:tc>
+                <a:tc>
+                  <a:txBody>
+                    <a:bodyPr/>
+                    <a:lstStyle/>
+                    <a:p>
+                      <a:endParaRPr lang="fr-FR"/>
+                    </a:p>
+                  </a:txBody>
+                  <a:tcPr/>
+                </a:tc>
+                <a:extLst>
+                  <a:ext uri="{0D108BD9-81ED-4DB2-BD59-A6C34878D82A}">
+                    <a16:rowId xmlns:a16="http://schemas.microsoft.com/office/drawing/2014/main" val="1351728357"/>
+                  </a:ext>
+                </a:extLst>
+              </a:tr>
+              <a:tr h="370840">
+                <a:tc>
+                  <a:txBody>
+                    <a:bodyPr/>
+                    <a:lstStyle/>
+                    <a:p>
+                      <a:endParaRPr lang="fr-FR"/>
+                    </a:p>
+                  </a:txBody>
+                  <a:tcPr/>
+                </a:tc>
+                <a:tc>
+                  <a:txBody>
+                    <a:bodyPr/>
+                    <a:lstStyle/>
+                    <a:p>
+                      <a:endParaRPr lang="fr-FR"/>
+                    </a:p>
+                  </a:txBody>
+                  <a:tcPr/>
+                </a:tc>
+                <a:tc>
+                  <a:txBody>
+                    <a:bodyPr/>
+                    <a:lstStyle/>
+                    <a:p>
+                      <a:endParaRPr lang="fr-FR"/>
+                    </a:p>
+                  </a:txBody>
+                  <a:tcPr/>
+                </a:tc>
+                <a:tc>
+                  <a:txBody>
+                    <a:bodyPr/>
+                    <a:lstStyle/>
+                    <a:p>
+                      <a:endParaRPr lang="fr-FR"/>
+                    </a:p>
+                  </a:txBody>
+                  <a:tcPr/>
+                </a:tc>
+                <a:tc>
+                  <a:txBody>
+                    <a:bodyPr/>
+                    <a:lstStyle/>
+                    <a:p>
+                      <a:endParaRPr lang="fr-FR"/>
+                    </a:p>
+                  </a:txBody>
+                  <a:tcPr/>
+                </a:tc>
+                <a:tc>
+                  <a:txBody>
+                    <a:bodyPr/>
+                    <a:lstStyle/>
+                    <a:p>
+                      <a:endParaRPr lang="fr-FR"/>
+                    </a:p>
+                  </a:txBody>
+                  <a:tcPr/>
+                </a:tc>
+                <a:tc>
+                  <a:txBody>
+                    <a:bodyPr/>
+                    <a:lstStyle/>
+                    <a:p>
+                      <a:endParaRPr lang="fr-FR"/>
+                    </a:p>
+                  </a:txBody>
+                  <a:tcPr/>
+                </a:tc>
+                <a:tc>
+                  <a:txBody>
+                    <a:bodyPr/>
+                    <a:lstStyle/>
+                    <a:p>
+                      <a:endParaRPr lang="fr-FR"/>
+                    </a:p>
+                  </a:txBody>
+                  <a:tcPr/>
+                </a:tc>
+                <a:tc>
+                  <a:txBody>
+                    <a:bodyPr/>
+                    <a:lstStyle/>
+                    <a:p>
+                      <a:endParaRPr lang="fr-FR"/>
+                    </a:p>
+                  </a:txBody>
+                  <a:tcPr/>
+                </a:tc>
+                <a:tc>
+                  <a:txBody>
+                    <a:bodyPr/>
+                    <a:lstStyle/>
+                    <a:p>
+                      <a:endParaRPr lang="fr-FR"/>
+                    </a:p>
+                  </a:txBody>
+                  <a:tcPr/>
+                </a:tc>
+                <a:tc>
+                  <a:txBody>
+                    <a:bodyPr/>
+                    <a:lstStyle/>
+                    <a:p>
+                      <a:endParaRPr lang="fr-FR"/>
+                    </a:p>
+                  </a:txBody>
+                  <a:tcPr/>
+                </a:tc>
+                <a:tc>
+                  <a:txBody>
+                    <a:bodyPr/>
+                    <a:lstStyle/>
+                    <a:p>
+                      <a:endParaRPr lang="fr-FR"/>
+                    </a:p>
+                  </a:txBody>
+                  <a:tcPr/>
+                </a:tc>
+                <a:extLst>
+                  <a:ext uri="{0D108BD9-81ED-4DB2-BD59-A6C34878D82A}">
+                    <a16:rowId xmlns:a16="http://schemas.microsoft.com/office/drawing/2014/main" val="2225049468"/>
+                  </a:ext>
+                </a:extLst>
+              </a:tr>
+              <a:tr h="370840">
+                <a:tc>
+                  <a:txBody>
+                    <a:bodyPr/>
+                    <a:lstStyle/>
+                    <a:p>
+                      <a:endParaRPr lang="fr-FR" dirty="0"/>
+                    </a:p>
+                  </a:txBody>
+                  <a:tcPr/>
+                </a:tc>
+                <a:tc>
+                  <a:txBody>
+                    <a:bodyPr/>
+                    <a:lstStyle/>
+                    <a:p>
+                      <a:endParaRPr lang="fr-FR"/>
+                    </a:p>
+                  </a:txBody>
+                  <a:tcPr/>
+                </a:tc>
+                <a:tc>
+                  <a:txBody>
+                    <a:bodyPr/>
+                    <a:lstStyle/>
+                    <a:p>
+                      <a:endParaRPr lang="fr-FR"/>
+                    </a:p>
+                  </a:txBody>
+                  <a:tcPr/>
+                </a:tc>
+                <a:tc>
+                  <a:txBody>
+                    <a:bodyPr/>
+                    <a:lstStyle/>
+                    <a:p>
+                      <a:endParaRPr lang="fr-FR"/>
+                    </a:p>
+                  </a:txBody>
+                  <a:tcPr/>
+                </a:tc>
+                <a:tc>
+                  <a:txBody>
+                    <a:bodyPr/>
+                    <a:lstStyle/>
+                    <a:p>
+                      <a:endParaRPr lang="fr-FR"/>
+                    </a:p>
+                  </a:txBody>
+                  <a:tcPr/>
+                </a:tc>
+                <a:tc>
+                  <a:txBody>
+                    <a:bodyPr/>
+                    <a:lstStyle/>
+                    <a:p>
+                      <a:endParaRPr lang="fr-FR"/>
+                    </a:p>
+                  </a:txBody>
+                  <a:tcPr/>
+                </a:tc>
+                <a:tc>
+                  <a:txBody>
+                    <a:bodyPr/>
+                    <a:lstStyle/>
+                    <a:p>
+                      <a:endParaRPr lang="fr-FR"/>
+                    </a:p>
+                  </a:txBody>
+                  <a:tcPr/>
+                </a:tc>
+                <a:tc>
+                  <a:txBody>
+                    <a:bodyPr/>
+                    <a:lstStyle/>
+                    <a:p>
+                      <a:endParaRPr lang="fr-FR"/>
+                    </a:p>
+                  </a:txBody>
+                  <a:tcPr/>
+                </a:tc>
+                <a:tc>
+                  <a:txBody>
+                    <a:bodyPr/>
+                    <a:lstStyle/>
+                    <a:p>
+                      <a:endParaRPr lang="fr-FR"/>
+                    </a:p>
+                  </a:txBody>
+                  <a:tcPr/>
+                </a:tc>
+                <a:tc>
+                  <a:txBody>
+                    <a:bodyPr/>
+                    <a:lstStyle/>
+                    <a:p>
+                      <a:endParaRPr lang="fr-FR"/>
+                    </a:p>
+                  </a:txBody>
+                  <a:tcPr/>
+                </a:tc>
+                <a:tc>
+                  <a:txBody>
+                    <a:bodyPr/>
+                    <a:lstStyle/>
+                    <a:p>
+                      <a:endParaRPr lang="fr-FR"/>
+                    </a:p>
+                  </a:txBody>
+                  <a:tcPr/>
+                </a:tc>
+                <a:tc>
+                  <a:txBody>
+                    <a:bodyPr/>
+                    <a:lstStyle/>
+                    <a:p>
+                      <a:endParaRPr lang="fr-FR" dirty="0"/>
+                    </a:p>
+                  </a:txBody>
+                  <a:tcPr/>
+                </a:tc>
+                <a:extLst>
+                  <a:ext uri="{0D108BD9-81ED-4DB2-BD59-A6C34878D82A}">
+                    <a16:rowId xmlns:a16="http://schemas.microsoft.com/office/drawing/2014/main" val="2471833283"/>
+                  </a:ext>
+                </a:extLst>
+              </a:tr>
+            </a:tbl>
+          </a:graphicData>
+        </a:graphic>
+      </p:graphicFrame>
+      <p:sp>
+        <p:nvSpPr>
+          <p:cNvPr id="51" name="Rectangle : coins arrondis 50">
+            <a:extLst>
+              <a:ext uri="{FF2B5EF4-FFF2-40B4-BE49-F238E27FC236}">
+                <a16:creationId xmlns:a16="http://schemas.microsoft.com/office/drawing/2014/main" id="{5DA7F077-64F6-4482-AB7A-5BCD8C9EC77E}"/>
+              </a:ext>
+            </a:extLst>
+          </p:cNvPr>
+          <p:cNvSpPr/>
+          <p:nvPr/>
+        </p:nvSpPr>
+        <p:spPr>
+          <a:xfrm>
+            <a:off x="630502" y="1181518"/>
+            <a:ext cx="3606218" cy="254000"/>
+          </a:xfrm>
+          <a:prstGeom prst="roundRect">
+            <a:avLst/>
+          </a:prstGeom>
+          <a:solidFill>
+            <a:schemeClr val="bg1">
+              <a:lumMod val="95000"/>
+            </a:schemeClr>
+          </a:solidFill>
+        </p:spPr>
+        <p:style>
+          <a:lnRef idx="2">
+            <a:schemeClr val="accent1">
+              <a:shade val="50000"/>
+            </a:schemeClr>
+          </a:lnRef>
+          <a:fillRef idx="1">
+            <a:schemeClr val="accent1"/>
+          </a:fillRef>
+          <a:effectRef idx="0">
+            <a:schemeClr val="accent1"/>
+          </a:effectRef>
+          <a:fontRef idx="minor">
+            <a:schemeClr val="lt1"/>
+          </a:fontRef>
+        </p:style>
+        <p:txBody>
+          <a:bodyPr lIns="36000" rIns="36000" rtlCol="0" anchor="ctr">
+            <a:normAutofit fontScale="62500" lnSpcReduction="20000"/>
+          </a:bodyPr>
+          <a:lstStyle/>
+          <a:p>
+            <a:pPr algn="ctr"/>
+            <a:r>
+              <a:rPr lang="fr-FR" dirty="0">
+                <a:solidFill>
+                  <a:schemeClr val="tx1"/>
+                </a:solidFill>
+              </a:rPr>
+              <a:t>Date Contrôle : jj/mm/</a:t>
+            </a:r>
+            <a:r>
+              <a:rPr lang="fr-FR" dirty="0" err="1">
+                <a:solidFill>
+                  <a:schemeClr val="tx1"/>
+                </a:solidFill>
+              </a:rPr>
+              <a:t>aaaa</a:t>
+            </a:r>
+            <a:endParaRPr lang="fr-FR" dirty="0">
+              <a:solidFill>
+                <a:schemeClr val="tx1"/>
+              </a:solidFill>
+            </a:endParaRPr>
+          </a:p>
+        </p:txBody>
+      </p:sp>
+      <p:sp>
+        <p:nvSpPr>
+          <p:cNvPr id="52" name="Rectangle : coins arrondis 51">
+            <a:extLst>
+              <a:ext uri="{FF2B5EF4-FFF2-40B4-BE49-F238E27FC236}">
+                <a16:creationId xmlns:a16="http://schemas.microsoft.com/office/drawing/2014/main" id="{14620C84-5456-4BFA-86E9-7E7CF7E1E130}"/>
+              </a:ext>
+            </a:extLst>
+          </p:cNvPr>
+          <p:cNvSpPr/>
+          <p:nvPr/>
+        </p:nvSpPr>
+        <p:spPr>
+          <a:xfrm>
+            <a:off x="4349064" y="1176856"/>
+            <a:ext cx="3606218" cy="254000"/>
+          </a:xfrm>
+          <a:prstGeom prst="roundRect">
+            <a:avLst/>
+          </a:prstGeom>
+          <a:solidFill>
+            <a:schemeClr val="bg1">
+              <a:lumMod val="95000"/>
+            </a:schemeClr>
+          </a:solidFill>
+        </p:spPr>
+        <p:style>
+          <a:lnRef idx="2">
+            <a:schemeClr val="accent1">
+              <a:shade val="50000"/>
+            </a:schemeClr>
+          </a:lnRef>
+          <a:fillRef idx="1">
+            <a:schemeClr val="accent1"/>
+          </a:fillRef>
+          <a:effectRef idx="0">
+            <a:schemeClr val="accent1"/>
+          </a:effectRef>
+          <a:fontRef idx="minor">
+            <a:schemeClr val="lt1"/>
+          </a:fontRef>
+        </p:style>
+        <p:txBody>
+          <a:bodyPr lIns="36000" rIns="36000" rtlCol="0" anchor="ctr">
+            <a:normAutofit fontScale="62500" lnSpcReduction="20000"/>
+          </a:bodyPr>
+          <a:lstStyle/>
+          <a:p>
+            <a:pPr algn="ctr"/>
+            <a:r>
+              <a:rPr lang="fr-FR" dirty="0">
+                <a:solidFill>
+                  <a:schemeClr val="tx1"/>
+                </a:solidFill>
+              </a:rPr>
+              <a:t>Date Soumission : jj/mm/</a:t>
+            </a:r>
+            <a:r>
+              <a:rPr lang="fr-FR" dirty="0" err="1">
+                <a:solidFill>
+                  <a:schemeClr val="tx1"/>
+                </a:solidFill>
+              </a:rPr>
+              <a:t>aaaa</a:t>
+            </a:r>
+            <a:endParaRPr lang="fr-FR" dirty="0">
+              <a:solidFill>
+                <a:schemeClr val="tx1"/>
+              </a:solidFill>
+            </a:endParaRPr>
+          </a:p>
+        </p:txBody>
+      </p:sp>
+      <p:sp>
+        <p:nvSpPr>
+          <p:cNvPr id="62" name="Rectangle : coins arrondis 61">
+            <a:extLst>
+              <a:ext uri="{FF2B5EF4-FFF2-40B4-BE49-F238E27FC236}">
+                <a16:creationId xmlns:a16="http://schemas.microsoft.com/office/drawing/2014/main" id="{E99CAA7B-D344-47FE-80E8-A66C06C25676}"/>
+              </a:ext>
+            </a:extLst>
+          </p:cNvPr>
+          <p:cNvSpPr/>
+          <p:nvPr/>
+        </p:nvSpPr>
+        <p:spPr>
+          <a:xfrm>
+            <a:off x="8991599" y="1176856"/>
+            <a:ext cx="2677293" cy="254000"/>
+          </a:xfrm>
+          <a:prstGeom prst="roundRect">
+            <a:avLst/>
+          </a:prstGeom>
+          <a:solidFill>
+            <a:schemeClr val="accent2">
+              <a:lumMod val="20000"/>
+              <a:lumOff val="80000"/>
+            </a:schemeClr>
+          </a:solidFill>
+        </p:spPr>
+        <p:style>
+          <a:lnRef idx="2">
+            <a:schemeClr val="accent1">
+              <a:shade val="50000"/>
+            </a:schemeClr>
+          </a:lnRef>
+          <a:fillRef idx="1">
+            <a:schemeClr val="accent1"/>
+          </a:fillRef>
+          <a:effectRef idx="0">
+            <a:schemeClr val="accent1"/>
+          </a:effectRef>
+          <a:fontRef idx="minor">
+            <a:schemeClr val="lt1"/>
+          </a:fontRef>
+        </p:style>
+        <p:txBody>
+          <a:bodyPr lIns="36000" rIns="36000" rtlCol="0" anchor="ctr">
+            <a:normAutofit fontScale="62500" lnSpcReduction="20000"/>
+          </a:bodyPr>
+          <a:lstStyle/>
+          <a:p>
+            <a:pPr algn="ctr"/>
+            <a:r>
+              <a:rPr lang="fr-FR" dirty="0" err="1">
+                <a:solidFill>
+                  <a:schemeClr val="tx1"/>
+                </a:solidFill>
+              </a:rPr>
+              <a:t>Worksite</a:t>
+            </a:r>
+            <a:r>
+              <a:rPr lang="fr-FR" dirty="0">
+                <a:solidFill>
+                  <a:schemeClr val="tx1"/>
+                </a:solidFill>
+              </a:rPr>
+              <a:t>-</a:t>
+            </a:r>
+            <a:r>
+              <a:rPr lang="fr-FR" dirty="0" err="1">
+                <a:solidFill>
+                  <a:schemeClr val="tx1"/>
+                </a:solidFill>
+              </a:rPr>
+              <a:t>Status</a:t>
+            </a:r>
+            <a:r>
+              <a:rPr lang="fr-FR" dirty="0">
+                <a:solidFill>
+                  <a:schemeClr val="tx1"/>
+                </a:solidFill>
+              </a:rPr>
+              <a:t>-Tag</a:t>
+            </a:r>
+          </a:p>
+        </p:txBody>
+      </p:sp>
+    </p:spTree>
+    <p:extLst>
+      <p:ext uri="{BB962C8B-B14F-4D97-AF65-F5344CB8AC3E}">
+        <p14:creationId xmlns:p14="http://schemas.microsoft.com/office/powerpoint/2010/main" val="3856376112"/>
+      </p:ext>
+    </p:extLst>
+  </p:cSld>
+  <p:clrMapOvr>
+    <a:masterClrMapping/>
+  </p:clrMapOvr>
+</p:sld>
+</file>
+
 <file path=ppt/theme/theme1.xml><?xml version="1.0" encoding="utf-8"?>
 <a:theme xmlns:a="http://schemas.openxmlformats.org/drawingml/2006/main" name="Thème Office">
   <a:themeElements>

</xml_diff>

<commit_message>
BE Actors : Fix Actors visibility rules based on groups
</commit_message>
<xml_diff>
--- a/Design.pptx
+++ b/Design.pptx
@@ -9,6 +9,7 @@
     <p:sldId id="257" r:id="rId3"/>
     <p:sldId id="258" r:id="rId4"/>
     <p:sldId id="259" r:id="rId5"/>
+    <p:sldId id="260" r:id="rId6"/>
   </p:sldIdLst>
   <p:sldSz cx="12192000" cy="6858000"/>
   <p:notesSz cx="6858000" cy="9144000"/>
@@ -262,7 +263,7 @@
           <a:p>
             <a:fld id="{3E4F7BE1-B4D8-464A-B5E4-E95C61BD2B05}" type="datetimeFigureOut">
               <a:rPr lang="fr-FR" smtClean="0"/>
-              <a:t>22/01/2019</a:t>
+              <a:t>02/03/2021</a:t>
             </a:fld>
             <a:endParaRPr lang="fr-FR"/>
           </a:p>
@@ -460,7 +461,7 @@
           <a:p>
             <a:fld id="{3E4F7BE1-B4D8-464A-B5E4-E95C61BD2B05}" type="datetimeFigureOut">
               <a:rPr lang="fr-FR" smtClean="0"/>
-              <a:t>22/01/2019</a:t>
+              <a:t>02/03/2021</a:t>
             </a:fld>
             <a:endParaRPr lang="fr-FR"/>
           </a:p>
@@ -668,7 +669,7 @@
           <a:p>
             <a:fld id="{3E4F7BE1-B4D8-464A-B5E4-E95C61BD2B05}" type="datetimeFigureOut">
               <a:rPr lang="fr-FR" smtClean="0"/>
-              <a:t>22/01/2019</a:t>
+              <a:t>02/03/2021</a:t>
             </a:fld>
             <a:endParaRPr lang="fr-FR"/>
           </a:p>
@@ -866,7 +867,7 @@
           <a:p>
             <a:fld id="{3E4F7BE1-B4D8-464A-B5E4-E95C61BD2B05}" type="datetimeFigureOut">
               <a:rPr lang="fr-FR" smtClean="0"/>
-              <a:t>22/01/2019</a:t>
+              <a:t>02/03/2021</a:t>
             </a:fld>
             <a:endParaRPr lang="fr-FR"/>
           </a:p>
@@ -1141,7 +1142,7 @@
           <a:p>
             <a:fld id="{3E4F7BE1-B4D8-464A-B5E4-E95C61BD2B05}" type="datetimeFigureOut">
               <a:rPr lang="fr-FR" smtClean="0"/>
-              <a:t>22/01/2019</a:t>
+              <a:t>02/03/2021</a:t>
             </a:fld>
             <a:endParaRPr lang="fr-FR"/>
           </a:p>
@@ -1406,7 +1407,7 @@
           <a:p>
             <a:fld id="{3E4F7BE1-B4D8-464A-B5E4-E95C61BD2B05}" type="datetimeFigureOut">
               <a:rPr lang="fr-FR" smtClean="0"/>
-              <a:t>22/01/2019</a:t>
+              <a:t>02/03/2021</a:t>
             </a:fld>
             <a:endParaRPr lang="fr-FR"/>
           </a:p>
@@ -1818,7 +1819,7 @@
           <a:p>
             <a:fld id="{3E4F7BE1-B4D8-464A-B5E4-E95C61BD2B05}" type="datetimeFigureOut">
               <a:rPr lang="fr-FR" smtClean="0"/>
-              <a:t>22/01/2019</a:t>
+              <a:t>02/03/2021</a:t>
             </a:fld>
             <a:endParaRPr lang="fr-FR"/>
           </a:p>
@@ -1959,7 +1960,7 @@
           <a:p>
             <a:fld id="{3E4F7BE1-B4D8-464A-B5E4-E95C61BD2B05}" type="datetimeFigureOut">
               <a:rPr lang="fr-FR" smtClean="0"/>
-              <a:t>22/01/2019</a:t>
+              <a:t>02/03/2021</a:t>
             </a:fld>
             <a:endParaRPr lang="fr-FR"/>
           </a:p>
@@ -2072,7 +2073,7 @@
           <a:p>
             <a:fld id="{3E4F7BE1-B4D8-464A-B5E4-E95C61BD2B05}" type="datetimeFigureOut">
               <a:rPr lang="fr-FR" smtClean="0"/>
-              <a:t>22/01/2019</a:t>
+              <a:t>02/03/2021</a:t>
             </a:fld>
             <a:endParaRPr lang="fr-FR"/>
           </a:p>
@@ -2383,7 +2384,7 @@
           <a:p>
             <a:fld id="{3E4F7BE1-B4D8-464A-B5E4-E95C61BD2B05}" type="datetimeFigureOut">
               <a:rPr lang="fr-FR" smtClean="0"/>
-              <a:t>22/01/2019</a:t>
+              <a:t>02/03/2021</a:t>
             </a:fld>
             <a:endParaRPr lang="fr-FR"/>
           </a:p>
@@ -2671,7 +2672,7 @@
           <a:p>
             <a:fld id="{3E4F7BE1-B4D8-464A-B5E4-E95C61BD2B05}" type="datetimeFigureOut">
               <a:rPr lang="fr-FR" smtClean="0"/>
-              <a:t>22/01/2019</a:t>
+              <a:t>02/03/2021</a:t>
             </a:fld>
             <a:endParaRPr lang="fr-FR"/>
           </a:p>
@@ -2912,7 +2913,7 @@
           <a:p>
             <a:fld id="{3E4F7BE1-B4D8-464A-B5E4-E95C61BD2B05}" type="datetimeFigureOut">
               <a:rPr lang="fr-FR" smtClean="0"/>
-              <a:t>22/01/2019</a:t>
+              <a:t>02/03/2021</a:t>
             </a:fld>
             <a:endParaRPr lang="fr-FR"/>
           </a:p>
@@ -11884,6 +11885,872 @@
 </p:sld>
 </file>
 
+<file path=ppt/slides/slide5.xml><?xml version="1.0" encoding="utf-8"?>
+<p:sld xmlns:a="http://schemas.openxmlformats.org/drawingml/2006/main" xmlns:r="http://schemas.openxmlformats.org/officeDocument/2006/relationships" xmlns:p="http://schemas.openxmlformats.org/presentationml/2006/main">
+  <p:cSld>
+    <p:spTree>
+      <p:nvGrpSpPr>
+        <p:cNvPr id="1" name=""/>
+        <p:cNvGrpSpPr/>
+        <p:nvPr/>
+      </p:nvGrpSpPr>
+      <p:grpSpPr>
+        <a:xfrm>
+          <a:off x="0" y="0"/>
+          <a:ext cx="0" cy="0"/>
+          <a:chOff x="0" y="0"/>
+          <a:chExt cx="0" cy="0"/>
+        </a:xfrm>
+      </p:grpSpPr>
+      <p:sp>
+        <p:nvSpPr>
+          <p:cNvPr id="2" name="Titre 1">
+            <a:extLst>
+              <a:ext uri="{FF2B5EF4-FFF2-40B4-BE49-F238E27FC236}">
+                <a16:creationId xmlns:a16="http://schemas.microsoft.com/office/drawing/2014/main" id="{79BD5096-67C0-4526-9CA2-4814D37F0FB7}"/>
+              </a:ext>
+            </a:extLst>
+          </p:cNvPr>
+          <p:cNvSpPr>
+            <a:spLocks noGrp="1"/>
+          </p:cNvSpPr>
+          <p:nvPr>
+            <p:ph type="title"/>
+          </p:nvPr>
+        </p:nvSpPr>
+        <p:spPr>
+          <a:xfrm>
+            <a:off x="838200" y="365126"/>
+            <a:ext cx="10515600" cy="315911"/>
+          </a:xfrm>
+        </p:spPr>
+        <p:txBody>
+          <a:bodyPr>
+            <a:normAutofit fontScale="90000"/>
+          </a:bodyPr>
+          <a:lstStyle/>
+          <a:p>
+            <a:r>
+              <a:rPr lang="fr-FR" sz="3100" dirty="0"/>
+              <a:t>Model</a:t>
+            </a:r>
+            <a:endParaRPr lang="fr-FR" dirty="0"/>
+          </a:p>
+        </p:txBody>
+      </p:sp>
+      <p:grpSp>
+        <p:nvGrpSpPr>
+          <p:cNvPr id="6" name="Groupe 5">
+            <a:extLst>
+              <a:ext uri="{FF2B5EF4-FFF2-40B4-BE49-F238E27FC236}">
+                <a16:creationId xmlns:a16="http://schemas.microsoft.com/office/drawing/2014/main" id="{388CBC4D-30C1-409B-88C2-2BE91B5DA345}"/>
+              </a:ext>
+            </a:extLst>
+          </p:cNvPr>
+          <p:cNvGrpSpPr/>
+          <p:nvPr/>
+        </p:nvGrpSpPr>
+        <p:grpSpPr>
+          <a:xfrm>
+            <a:off x="8370869" y="1400410"/>
+            <a:ext cx="1580148" cy="753980"/>
+            <a:chOff x="7764379" y="1652337"/>
+            <a:chExt cx="1580148" cy="753980"/>
+          </a:xfrm>
+        </p:grpSpPr>
+        <p:sp>
+          <p:nvSpPr>
+            <p:cNvPr id="4" name="Rectangle : avec coins arrondis en diagonale 3">
+              <a:extLst>
+                <a:ext uri="{FF2B5EF4-FFF2-40B4-BE49-F238E27FC236}">
+                  <a16:creationId xmlns:a16="http://schemas.microsoft.com/office/drawing/2014/main" id="{FF8CC8B3-CFB2-4E20-A908-F67CE66375C5}"/>
+                </a:ext>
+              </a:extLst>
+            </p:cNvPr>
+            <p:cNvSpPr/>
+            <p:nvPr/>
+          </p:nvSpPr>
+          <p:spPr>
+            <a:xfrm>
+              <a:off x="7764379" y="1652337"/>
+              <a:ext cx="1580148" cy="376990"/>
+            </a:xfrm>
+            <a:prstGeom prst="round2DiagRect">
+              <a:avLst>
+                <a:gd name="adj1" fmla="val 19299"/>
+                <a:gd name="adj2" fmla="val 0"/>
+              </a:avLst>
+            </a:prstGeom>
+            <a:noFill/>
+          </p:spPr>
+          <p:style>
+            <a:lnRef idx="2">
+              <a:schemeClr val="accent1">
+                <a:shade val="50000"/>
+              </a:schemeClr>
+            </a:lnRef>
+            <a:fillRef idx="1">
+              <a:schemeClr val="accent1"/>
+            </a:fillRef>
+            <a:effectRef idx="0">
+              <a:schemeClr val="accent1"/>
+            </a:effectRef>
+            <a:fontRef idx="minor">
+              <a:schemeClr val="lt1"/>
+            </a:fontRef>
+          </p:style>
+          <p:txBody>
+            <a:bodyPr rtlCol="0" anchor="ctr"/>
+            <a:lstStyle/>
+            <a:p>
+              <a:pPr algn="ctr"/>
+              <a:r>
+                <a:rPr lang="fr-FR" dirty="0">
+                  <a:solidFill>
+                    <a:schemeClr val="accent1">
+                      <a:lumMod val="75000"/>
+                    </a:schemeClr>
+                  </a:solidFill>
+                </a:rPr>
+                <a:t>Client</a:t>
+              </a:r>
+            </a:p>
+          </p:txBody>
+        </p:sp>
+        <p:sp>
+          <p:nvSpPr>
+            <p:cNvPr id="5" name="Rectangle 4">
+              <a:extLst>
+                <a:ext uri="{FF2B5EF4-FFF2-40B4-BE49-F238E27FC236}">
+                  <a16:creationId xmlns:a16="http://schemas.microsoft.com/office/drawing/2014/main" id="{5F71F404-89E0-469A-A78E-14B809A3CE67}"/>
+                </a:ext>
+              </a:extLst>
+            </p:cNvPr>
+            <p:cNvSpPr/>
+            <p:nvPr/>
+          </p:nvSpPr>
+          <p:spPr>
+            <a:xfrm>
+              <a:off x="7944853" y="2029327"/>
+              <a:ext cx="1219200" cy="376990"/>
+            </a:xfrm>
+            <a:prstGeom prst="rect">
+              <a:avLst/>
+            </a:prstGeom>
+            <a:solidFill>
+              <a:schemeClr val="accent1">
+                <a:lumMod val="20000"/>
+                <a:lumOff val="80000"/>
+              </a:schemeClr>
+            </a:solidFill>
+          </p:spPr>
+          <p:style>
+            <a:lnRef idx="2">
+              <a:schemeClr val="accent1">
+                <a:shade val="50000"/>
+              </a:schemeClr>
+            </a:lnRef>
+            <a:fillRef idx="1">
+              <a:schemeClr val="accent1"/>
+            </a:fillRef>
+            <a:effectRef idx="0">
+              <a:schemeClr val="accent1"/>
+            </a:effectRef>
+            <a:fontRef idx="minor">
+              <a:schemeClr val="lt1"/>
+            </a:fontRef>
+          </p:style>
+          <p:txBody>
+            <a:bodyPr rtlCol="0" anchor="t" anchorCtr="0"/>
+            <a:lstStyle/>
+            <a:p>
+              <a:pPr marL="171450" indent="-171450">
+                <a:buFont typeface="Arial" panose="020B0604020202020204" pitchFamily="34" charset="0"/>
+                <a:buChar char="•"/>
+              </a:pPr>
+              <a:r>
+                <a:rPr lang="fr-FR" sz="1000" dirty="0">
+                  <a:solidFill>
+                    <a:schemeClr val="accent1">
+                      <a:lumMod val="75000"/>
+                    </a:schemeClr>
+                  </a:solidFill>
+                </a:rPr>
+                <a:t>BPU</a:t>
+              </a:r>
+            </a:p>
+          </p:txBody>
+        </p:sp>
+      </p:grpSp>
+      <p:grpSp>
+        <p:nvGrpSpPr>
+          <p:cNvPr id="7" name="Groupe 6">
+            <a:extLst>
+              <a:ext uri="{FF2B5EF4-FFF2-40B4-BE49-F238E27FC236}">
+                <a16:creationId xmlns:a16="http://schemas.microsoft.com/office/drawing/2014/main" id="{9A54EEAA-C3A1-4F91-A489-4A533243E7B8}"/>
+              </a:ext>
+            </a:extLst>
+          </p:cNvPr>
+          <p:cNvGrpSpPr/>
+          <p:nvPr/>
+        </p:nvGrpSpPr>
+        <p:grpSpPr>
+          <a:xfrm>
+            <a:off x="7829693" y="2918598"/>
+            <a:ext cx="1580148" cy="753980"/>
+            <a:chOff x="7764379" y="1652337"/>
+            <a:chExt cx="1580148" cy="753980"/>
+          </a:xfrm>
+        </p:grpSpPr>
+        <p:sp>
+          <p:nvSpPr>
+            <p:cNvPr id="8" name="Rectangle : avec coins arrondis en diagonale 7">
+              <a:extLst>
+                <a:ext uri="{FF2B5EF4-FFF2-40B4-BE49-F238E27FC236}">
+                  <a16:creationId xmlns:a16="http://schemas.microsoft.com/office/drawing/2014/main" id="{653DF3C9-50A4-4B38-A9AB-CD0C1082493E}"/>
+                </a:ext>
+              </a:extLst>
+            </p:cNvPr>
+            <p:cNvSpPr/>
+            <p:nvPr/>
+          </p:nvSpPr>
+          <p:spPr>
+            <a:xfrm>
+              <a:off x="7764379" y="1652337"/>
+              <a:ext cx="1580148" cy="376990"/>
+            </a:xfrm>
+            <a:prstGeom prst="round2DiagRect">
+              <a:avLst>
+                <a:gd name="adj1" fmla="val 19299"/>
+                <a:gd name="adj2" fmla="val 0"/>
+              </a:avLst>
+            </a:prstGeom>
+            <a:noFill/>
+          </p:spPr>
+          <p:style>
+            <a:lnRef idx="2">
+              <a:schemeClr val="accent1">
+                <a:shade val="50000"/>
+              </a:schemeClr>
+            </a:lnRef>
+            <a:fillRef idx="1">
+              <a:schemeClr val="accent1"/>
+            </a:fillRef>
+            <a:effectRef idx="0">
+              <a:schemeClr val="accent1"/>
+            </a:effectRef>
+            <a:fontRef idx="minor">
+              <a:schemeClr val="lt1"/>
+            </a:fontRef>
+          </p:style>
+          <p:txBody>
+            <a:bodyPr rtlCol="0" anchor="ctr"/>
+            <a:lstStyle/>
+            <a:p>
+              <a:pPr algn="ctr"/>
+              <a:r>
+                <a:rPr lang="fr-FR" dirty="0">
+                  <a:solidFill>
+                    <a:schemeClr val="accent1">
+                      <a:lumMod val="75000"/>
+                    </a:schemeClr>
+                  </a:solidFill>
+                </a:rPr>
+                <a:t>Actor</a:t>
+              </a:r>
+            </a:p>
+          </p:txBody>
+        </p:sp>
+        <p:sp>
+          <p:nvSpPr>
+            <p:cNvPr id="9" name="Rectangle 8">
+              <a:extLst>
+                <a:ext uri="{FF2B5EF4-FFF2-40B4-BE49-F238E27FC236}">
+                  <a16:creationId xmlns:a16="http://schemas.microsoft.com/office/drawing/2014/main" id="{9117C452-4B39-48E2-AC2B-9F09872C2428}"/>
+                </a:ext>
+              </a:extLst>
+            </p:cNvPr>
+            <p:cNvSpPr/>
+            <p:nvPr/>
+          </p:nvSpPr>
+          <p:spPr>
+            <a:xfrm>
+              <a:off x="7944853" y="2029327"/>
+              <a:ext cx="1219200" cy="376990"/>
+            </a:xfrm>
+            <a:prstGeom prst="rect">
+              <a:avLst/>
+            </a:prstGeom>
+            <a:solidFill>
+              <a:schemeClr val="accent1">
+                <a:lumMod val="20000"/>
+                <a:lumOff val="80000"/>
+              </a:schemeClr>
+            </a:solidFill>
+          </p:spPr>
+          <p:style>
+            <a:lnRef idx="2">
+              <a:schemeClr val="accent1">
+                <a:shade val="50000"/>
+              </a:schemeClr>
+            </a:lnRef>
+            <a:fillRef idx="1">
+              <a:schemeClr val="accent1"/>
+            </a:fillRef>
+            <a:effectRef idx="0">
+              <a:schemeClr val="accent1"/>
+            </a:effectRef>
+            <a:fontRef idx="minor">
+              <a:schemeClr val="lt1"/>
+            </a:fontRef>
+          </p:style>
+          <p:txBody>
+            <a:bodyPr rtlCol="0" anchor="t" anchorCtr="0"/>
+            <a:lstStyle/>
+            <a:p>
+              <a:pPr marL="171450" indent="-171450">
+                <a:buFont typeface="Arial" panose="020B0604020202020204" pitchFamily="34" charset="0"/>
+                <a:buChar char="•"/>
+              </a:pPr>
+              <a:endParaRPr lang="fr-FR" sz="1000" dirty="0">
+                <a:solidFill>
+                  <a:schemeClr val="accent1">
+                    <a:lumMod val="75000"/>
+                  </a:schemeClr>
+                </a:solidFill>
+              </a:endParaRPr>
+            </a:p>
+          </p:txBody>
+        </p:sp>
+      </p:grpSp>
+      <p:grpSp>
+        <p:nvGrpSpPr>
+          <p:cNvPr id="10" name="Groupe 9">
+            <a:extLst>
+              <a:ext uri="{FF2B5EF4-FFF2-40B4-BE49-F238E27FC236}">
+                <a16:creationId xmlns:a16="http://schemas.microsoft.com/office/drawing/2014/main" id="{302753EC-3462-4C81-A7E0-C9A15E55C702}"/>
+              </a:ext>
+            </a:extLst>
+          </p:cNvPr>
+          <p:cNvGrpSpPr/>
+          <p:nvPr/>
+        </p:nvGrpSpPr>
+        <p:grpSpPr>
+          <a:xfrm>
+            <a:off x="4388171" y="2918598"/>
+            <a:ext cx="1580148" cy="753980"/>
+            <a:chOff x="7764379" y="1652337"/>
+            <a:chExt cx="1580148" cy="753980"/>
+          </a:xfrm>
+        </p:grpSpPr>
+        <p:sp>
+          <p:nvSpPr>
+            <p:cNvPr id="11" name="Rectangle : avec coins arrondis en diagonale 10">
+              <a:extLst>
+                <a:ext uri="{FF2B5EF4-FFF2-40B4-BE49-F238E27FC236}">
+                  <a16:creationId xmlns:a16="http://schemas.microsoft.com/office/drawing/2014/main" id="{488807B9-86C9-43C7-B59E-B6FF2810952A}"/>
+                </a:ext>
+              </a:extLst>
+            </p:cNvPr>
+            <p:cNvSpPr/>
+            <p:nvPr/>
+          </p:nvSpPr>
+          <p:spPr>
+            <a:xfrm>
+              <a:off x="7764379" y="1652337"/>
+              <a:ext cx="1580148" cy="376990"/>
+            </a:xfrm>
+            <a:prstGeom prst="round2DiagRect">
+              <a:avLst>
+                <a:gd name="adj1" fmla="val 19299"/>
+                <a:gd name="adj2" fmla="val 0"/>
+              </a:avLst>
+            </a:prstGeom>
+            <a:noFill/>
+          </p:spPr>
+          <p:style>
+            <a:lnRef idx="2">
+              <a:schemeClr val="accent1">
+                <a:shade val="50000"/>
+              </a:schemeClr>
+            </a:lnRef>
+            <a:fillRef idx="1">
+              <a:schemeClr val="accent1"/>
+            </a:fillRef>
+            <a:effectRef idx="0">
+              <a:schemeClr val="accent1"/>
+            </a:effectRef>
+            <a:fontRef idx="minor">
+              <a:schemeClr val="lt1"/>
+            </a:fontRef>
+          </p:style>
+          <p:txBody>
+            <a:bodyPr rtlCol="0" anchor="ctr"/>
+            <a:lstStyle/>
+            <a:p>
+              <a:pPr algn="ctr"/>
+              <a:r>
+                <a:rPr lang="fr-FR" dirty="0">
+                  <a:solidFill>
+                    <a:schemeClr val="accent1">
+                      <a:lumMod val="75000"/>
+                    </a:schemeClr>
+                  </a:solidFill>
+                </a:rPr>
+                <a:t>Group</a:t>
+              </a:r>
+            </a:p>
+          </p:txBody>
+        </p:sp>
+        <p:sp>
+          <p:nvSpPr>
+            <p:cNvPr id="12" name="Rectangle 11">
+              <a:extLst>
+                <a:ext uri="{FF2B5EF4-FFF2-40B4-BE49-F238E27FC236}">
+                  <a16:creationId xmlns:a16="http://schemas.microsoft.com/office/drawing/2014/main" id="{DB4DB8D4-661E-4983-980C-ED61A15129D9}"/>
+                </a:ext>
+              </a:extLst>
+            </p:cNvPr>
+            <p:cNvSpPr/>
+            <p:nvPr/>
+          </p:nvSpPr>
+          <p:spPr>
+            <a:xfrm>
+              <a:off x="7944853" y="2029327"/>
+              <a:ext cx="1219200" cy="376990"/>
+            </a:xfrm>
+            <a:prstGeom prst="rect">
+              <a:avLst/>
+            </a:prstGeom>
+            <a:solidFill>
+              <a:schemeClr val="accent1">
+                <a:lumMod val="20000"/>
+                <a:lumOff val="80000"/>
+              </a:schemeClr>
+            </a:solidFill>
+          </p:spPr>
+          <p:style>
+            <a:lnRef idx="2">
+              <a:schemeClr val="accent1">
+                <a:shade val="50000"/>
+              </a:schemeClr>
+            </a:lnRef>
+            <a:fillRef idx="1">
+              <a:schemeClr val="accent1"/>
+            </a:fillRef>
+            <a:effectRef idx="0">
+              <a:schemeClr val="accent1"/>
+            </a:effectRef>
+            <a:fontRef idx="minor">
+              <a:schemeClr val="lt1"/>
+            </a:fontRef>
+          </p:style>
+          <p:txBody>
+            <a:bodyPr rtlCol="0" anchor="t" anchorCtr="0"/>
+            <a:lstStyle/>
+            <a:p>
+              <a:pPr marL="171450" indent="-171450">
+                <a:buFont typeface="Arial" panose="020B0604020202020204" pitchFamily="34" charset="0"/>
+                <a:buChar char="•"/>
+              </a:pPr>
+              <a:endParaRPr lang="fr-FR" sz="1000" dirty="0">
+                <a:solidFill>
+                  <a:schemeClr val="accent1">
+                    <a:lumMod val="75000"/>
+                  </a:schemeClr>
+                </a:solidFill>
+              </a:endParaRPr>
+            </a:p>
+          </p:txBody>
+        </p:sp>
+      </p:grpSp>
+      <p:grpSp>
+        <p:nvGrpSpPr>
+          <p:cNvPr id="13" name="Groupe 12">
+            <a:extLst>
+              <a:ext uri="{FF2B5EF4-FFF2-40B4-BE49-F238E27FC236}">
+                <a16:creationId xmlns:a16="http://schemas.microsoft.com/office/drawing/2014/main" id="{A4BA92EC-C6DE-4F67-98B0-A351B180DBF2}"/>
+              </a:ext>
+            </a:extLst>
+          </p:cNvPr>
+          <p:cNvGrpSpPr/>
+          <p:nvPr/>
+        </p:nvGrpSpPr>
+        <p:grpSpPr>
+          <a:xfrm>
+            <a:off x="873640" y="1400410"/>
+            <a:ext cx="1580148" cy="753980"/>
+            <a:chOff x="7764379" y="1652337"/>
+            <a:chExt cx="1580148" cy="753980"/>
+          </a:xfrm>
+        </p:grpSpPr>
+        <p:sp>
+          <p:nvSpPr>
+            <p:cNvPr id="14" name="Rectangle : avec coins arrondis en diagonale 13">
+              <a:extLst>
+                <a:ext uri="{FF2B5EF4-FFF2-40B4-BE49-F238E27FC236}">
+                  <a16:creationId xmlns:a16="http://schemas.microsoft.com/office/drawing/2014/main" id="{BB5479FF-E713-4357-9A48-3D79CE0EE41B}"/>
+                </a:ext>
+              </a:extLst>
+            </p:cNvPr>
+            <p:cNvSpPr/>
+            <p:nvPr/>
+          </p:nvSpPr>
+          <p:spPr>
+            <a:xfrm>
+              <a:off x="7764379" y="1652337"/>
+              <a:ext cx="1580148" cy="376990"/>
+            </a:xfrm>
+            <a:prstGeom prst="round2DiagRect">
+              <a:avLst>
+                <a:gd name="adj1" fmla="val 19299"/>
+                <a:gd name="adj2" fmla="val 0"/>
+              </a:avLst>
+            </a:prstGeom>
+            <a:noFill/>
+          </p:spPr>
+          <p:style>
+            <a:lnRef idx="2">
+              <a:schemeClr val="accent1">
+                <a:shade val="50000"/>
+              </a:schemeClr>
+            </a:lnRef>
+            <a:fillRef idx="1">
+              <a:schemeClr val="accent1"/>
+            </a:fillRef>
+            <a:effectRef idx="0">
+              <a:schemeClr val="accent1"/>
+            </a:effectRef>
+            <a:fontRef idx="minor">
+              <a:schemeClr val="lt1"/>
+            </a:fontRef>
+          </p:style>
+          <p:txBody>
+            <a:bodyPr rtlCol="0" anchor="ctr"/>
+            <a:lstStyle/>
+            <a:p>
+              <a:pPr algn="ctr"/>
+              <a:r>
+                <a:rPr lang="fr-FR" dirty="0">
+                  <a:solidFill>
+                    <a:schemeClr val="accent1">
+                      <a:lumMod val="75000"/>
+                    </a:schemeClr>
+                  </a:solidFill>
+                </a:rPr>
+                <a:t>User</a:t>
+              </a:r>
+            </a:p>
+          </p:txBody>
+        </p:sp>
+        <p:sp>
+          <p:nvSpPr>
+            <p:cNvPr id="15" name="Rectangle 14">
+              <a:extLst>
+                <a:ext uri="{FF2B5EF4-FFF2-40B4-BE49-F238E27FC236}">
+                  <a16:creationId xmlns:a16="http://schemas.microsoft.com/office/drawing/2014/main" id="{2A77B3C8-9FE9-45A7-8778-307B9CFE8A12}"/>
+                </a:ext>
+              </a:extLst>
+            </p:cNvPr>
+            <p:cNvSpPr/>
+            <p:nvPr/>
+          </p:nvSpPr>
+          <p:spPr>
+            <a:xfrm>
+              <a:off x="7944853" y="2029327"/>
+              <a:ext cx="1219200" cy="376990"/>
+            </a:xfrm>
+            <a:prstGeom prst="rect">
+              <a:avLst/>
+            </a:prstGeom>
+            <a:solidFill>
+              <a:schemeClr val="accent1">
+                <a:lumMod val="20000"/>
+                <a:lumOff val="80000"/>
+              </a:schemeClr>
+            </a:solidFill>
+          </p:spPr>
+          <p:style>
+            <a:lnRef idx="2">
+              <a:schemeClr val="accent1">
+                <a:shade val="50000"/>
+              </a:schemeClr>
+            </a:lnRef>
+            <a:fillRef idx="1">
+              <a:schemeClr val="accent1"/>
+            </a:fillRef>
+            <a:effectRef idx="0">
+              <a:schemeClr val="accent1"/>
+            </a:effectRef>
+            <a:fontRef idx="minor">
+              <a:schemeClr val="lt1"/>
+            </a:fontRef>
+          </p:style>
+          <p:txBody>
+            <a:bodyPr rtlCol="0" anchor="t" anchorCtr="0"/>
+            <a:lstStyle/>
+            <a:p>
+              <a:pPr marL="171450" indent="-171450">
+                <a:buFont typeface="Arial" panose="020B0604020202020204" pitchFamily="34" charset="0"/>
+                <a:buChar char="•"/>
+              </a:pPr>
+              <a:endParaRPr lang="fr-FR" sz="1000" dirty="0">
+                <a:solidFill>
+                  <a:schemeClr val="accent1">
+                    <a:lumMod val="75000"/>
+                  </a:schemeClr>
+                </a:solidFill>
+              </a:endParaRPr>
+            </a:p>
+          </p:txBody>
+        </p:sp>
+      </p:grpSp>
+      <p:cxnSp>
+        <p:nvCxnSpPr>
+          <p:cNvPr id="17" name="Connecteur droit avec flèche 16">
+            <a:extLst>
+              <a:ext uri="{FF2B5EF4-FFF2-40B4-BE49-F238E27FC236}">
+                <a16:creationId xmlns:a16="http://schemas.microsoft.com/office/drawing/2014/main" id="{EA6F08E9-E97F-4762-9467-E94673D0D75F}"/>
+              </a:ext>
+            </a:extLst>
+          </p:cNvPr>
+          <p:cNvCxnSpPr>
+            <a:stCxn id="8" idx="2"/>
+            <a:endCxn id="11" idx="0"/>
+          </p:cNvCxnSpPr>
+          <p:nvPr/>
+        </p:nvCxnSpPr>
+        <p:spPr>
+          <a:xfrm flipH="1">
+            <a:off x="5968319" y="3107093"/>
+            <a:ext cx="1861374" cy="0"/>
+          </a:xfrm>
+          <a:prstGeom prst="straightConnector1">
+            <a:avLst/>
+          </a:prstGeom>
+          <a:ln w="25400">
+            <a:tailEnd type="triangle" w="lg" len="lg"/>
+          </a:ln>
+        </p:spPr>
+        <p:style>
+          <a:lnRef idx="1">
+            <a:schemeClr val="accent1"/>
+          </a:lnRef>
+          <a:fillRef idx="0">
+            <a:schemeClr val="accent1"/>
+          </a:fillRef>
+          <a:effectRef idx="0">
+            <a:schemeClr val="accent1"/>
+          </a:effectRef>
+          <a:fontRef idx="minor">
+            <a:schemeClr val="tx1"/>
+          </a:fontRef>
+        </p:style>
+      </p:cxnSp>
+      <p:sp>
+        <p:nvSpPr>
+          <p:cNvPr id="18" name="ZoneTexte 17">
+            <a:extLst>
+              <a:ext uri="{FF2B5EF4-FFF2-40B4-BE49-F238E27FC236}">
+                <a16:creationId xmlns:a16="http://schemas.microsoft.com/office/drawing/2014/main" id="{608002B9-38B5-47C7-85D1-238A15715CA8}"/>
+              </a:ext>
+            </a:extLst>
+          </p:cNvPr>
+          <p:cNvSpPr txBox="1"/>
+          <p:nvPr/>
+        </p:nvSpPr>
+        <p:spPr>
+          <a:xfrm>
+            <a:off x="6670002" y="2830094"/>
+            <a:ext cx="999184" cy="276999"/>
+          </a:xfrm>
+          <a:prstGeom prst="rect">
+            <a:avLst/>
+          </a:prstGeom>
+          <a:noFill/>
+        </p:spPr>
+        <p:txBody>
+          <a:bodyPr wrap="none" rtlCol="0">
+            <a:spAutoFit/>
+          </a:bodyPr>
+          <a:lstStyle/>
+          <a:p>
+            <a:r>
+              <a:rPr lang="fr-FR" sz="1200" dirty="0"/>
+              <a:t>Appartient à </a:t>
+            </a:r>
+          </a:p>
+        </p:txBody>
+      </p:sp>
+      <p:cxnSp>
+        <p:nvCxnSpPr>
+          <p:cNvPr id="19" name="Connecteur droit avec flèche 18">
+            <a:extLst>
+              <a:ext uri="{FF2B5EF4-FFF2-40B4-BE49-F238E27FC236}">
+                <a16:creationId xmlns:a16="http://schemas.microsoft.com/office/drawing/2014/main" id="{588075CB-76A6-4E2F-9ED7-05F9BFDE526A}"/>
+              </a:ext>
+            </a:extLst>
+          </p:cNvPr>
+          <p:cNvCxnSpPr>
+            <a:cxnSpLocks/>
+            <a:stCxn id="14" idx="0"/>
+            <a:endCxn id="11" idx="2"/>
+          </p:cNvCxnSpPr>
+          <p:nvPr/>
+        </p:nvCxnSpPr>
+        <p:spPr>
+          <a:xfrm>
+            <a:off x="2453788" y="1588905"/>
+            <a:ext cx="1934383" cy="1518188"/>
+          </a:xfrm>
+          <a:prstGeom prst="straightConnector1">
+            <a:avLst/>
+          </a:prstGeom>
+          <a:ln w="25400">
+            <a:tailEnd type="triangle" w="lg" len="lg"/>
+          </a:ln>
+        </p:spPr>
+        <p:style>
+          <a:lnRef idx="1">
+            <a:schemeClr val="accent1"/>
+          </a:lnRef>
+          <a:fillRef idx="0">
+            <a:schemeClr val="accent1"/>
+          </a:fillRef>
+          <a:effectRef idx="0">
+            <a:schemeClr val="accent1"/>
+          </a:effectRef>
+          <a:fontRef idx="minor">
+            <a:schemeClr val="tx1"/>
+          </a:fontRef>
+        </p:style>
+      </p:cxnSp>
+      <p:sp>
+        <p:nvSpPr>
+          <p:cNvPr id="22" name="ZoneTexte 21">
+            <a:extLst>
+              <a:ext uri="{FF2B5EF4-FFF2-40B4-BE49-F238E27FC236}">
+                <a16:creationId xmlns:a16="http://schemas.microsoft.com/office/drawing/2014/main" id="{554564F5-BE2D-4BA7-8A40-CEF56D94A695}"/>
+              </a:ext>
+            </a:extLst>
+          </p:cNvPr>
+          <p:cNvSpPr txBox="1"/>
+          <p:nvPr/>
+        </p:nvSpPr>
+        <p:spPr>
+          <a:xfrm>
+            <a:off x="3194179" y="1965895"/>
+            <a:ext cx="784189" cy="276999"/>
+          </a:xfrm>
+          <a:prstGeom prst="rect">
+            <a:avLst/>
+          </a:prstGeom>
+          <a:noFill/>
+        </p:spPr>
+        <p:txBody>
+          <a:bodyPr wrap="none" rtlCol="0">
+            <a:spAutoFit/>
+          </a:bodyPr>
+          <a:lstStyle/>
+          <a:p>
+            <a:r>
+              <a:rPr lang="fr-FR" sz="1200" dirty="0"/>
+              <a:t>Accède à </a:t>
+            </a:r>
+          </a:p>
+        </p:txBody>
+      </p:sp>
+      <p:cxnSp>
+        <p:nvCxnSpPr>
+          <p:cNvPr id="23" name="Connecteur droit avec flèche 22">
+            <a:extLst>
+              <a:ext uri="{FF2B5EF4-FFF2-40B4-BE49-F238E27FC236}">
+                <a16:creationId xmlns:a16="http://schemas.microsoft.com/office/drawing/2014/main" id="{484BE842-239A-4BAC-BC61-2249EB166E93}"/>
+              </a:ext>
+            </a:extLst>
+          </p:cNvPr>
+          <p:cNvCxnSpPr>
+            <a:cxnSpLocks/>
+            <a:stCxn id="11" idx="0"/>
+            <a:endCxn id="4" idx="2"/>
+          </p:cNvCxnSpPr>
+          <p:nvPr/>
+        </p:nvCxnSpPr>
+        <p:spPr>
+          <a:xfrm flipV="1">
+            <a:off x="5968319" y="1588905"/>
+            <a:ext cx="2402550" cy="1518188"/>
+          </a:xfrm>
+          <a:prstGeom prst="straightConnector1">
+            <a:avLst/>
+          </a:prstGeom>
+          <a:ln w="25400">
+            <a:tailEnd type="triangle" w="lg" len="lg"/>
+          </a:ln>
+        </p:spPr>
+        <p:style>
+          <a:lnRef idx="1">
+            <a:schemeClr val="accent1"/>
+          </a:lnRef>
+          <a:fillRef idx="0">
+            <a:schemeClr val="accent1"/>
+          </a:fillRef>
+          <a:effectRef idx="0">
+            <a:schemeClr val="accent1"/>
+          </a:effectRef>
+          <a:fontRef idx="minor">
+            <a:schemeClr val="tx1"/>
+          </a:fontRef>
+        </p:style>
+      </p:cxnSp>
+      <p:sp>
+        <p:nvSpPr>
+          <p:cNvPr id="27" name="ZoneTexte 26">
+            <a:extLst>
+              <a:ext uri="{FF2B5EF4-FFF2-40B4-BE49-F238E27FC236}">
+                <a16:creationId xmlns:a16="http://schemas.microsoft.com/office/drawing/2014/main" id="{11F951D9-C23F-42A6-8852-FECB402FBFCF}"/>
+              </a:ext>
+            </a:extLst>
+          </p:cNvPr>
+          <p:cNvSpPr txBox="1"/>
+          <p:nvPr/>
+        </p:nvSpPr>
+        <p:spPr>
+          <a:xfrm>
+            <a:off x="6648256" y="2015890"/>
+            <a:ext cx="784189" cy="276999"/>
+          </a:xfrm>
+          <a:prstGeom prst="rect">
+            <a:avLst/>
+          </a:prstGeom>
+          <a:noFill/>
+        </p:spPr>
+        <p:txBody>
+          <a:bodyPr wrap="none" rtlCol="0">
+            <a:spAutoFit/>
+          </a:bodyPr>
+          <a:lstStyle/>
+          <a:p>
+            <a:r>
+              <a:rPr lang="fr-FR" sz="1200" dirty="0"/>
+              <a:t>Accède à </a:t>
+            </a:r>
+          </a:p>
+        </p:txBody>
+      </p:sp>
+    </p:spTree>
+    <p:extLst>
+      <p:ext uri="{BB962C8B-B14F-4D97-AF65-F5344CB8AC3E}">
+        <p14:creationId xmlns:p14="http://schemas.microsoft.com/office/powerpoint/2010/main" val="2721855194"/>
+      </p:ext>
+    </p:extLst>
+  </p:cSld>
+  <p:clrMapOvr>
+    <a:masterClrMapping/>
+  </p:clrMapOvr>
+</p:sld>
+</file>
+
 <file path=ppt/theme/theme1.xml><?xml version="1.0" encoding="utf-8"?>
 <a:theme xmlns:a="http://schemas.openxmlformats.org/drawingml/2006/main" name="Thème Office">
   <a:themeElements>

</xml_diff>

<commit_message>
FE Vehicules : VehiculeTable & VehiculeUpdateModal Vehicule Inventory (WiP)
</commit_message>
<xml_diff>
--- a/Design.pptx
+++ b/Design.pptx
@@ -12640,7 +12640,7 @@
         <p:spPr>
           <a:xfrm>
             <a:off x="3194179" y="1965895"/>
-            <a:ext cx="784189" cy="276999"/>
+            <a:ext cx="1035861" cy="276999"/>
           </a:xfrm>
           <a:prstGeom prst="rect">
             <a:avLst/>
@@ -12655,7 +12655,7 @@
           <a:p>
             <a:r>
               <a:rPr lang="fr-FR" sz="1200" dirty="0"/>
-              <a:t>Accède à </a:t>
+              <a:t>Accède à (P1)</a:t>
             </a:r>
           </a:p>
         </p:txBody>
@@ -12734,6 +12734,84 @@
             <a:r>
               <a:rPr lang="fr-FR" sz="1200" dirty="0"/>
               <a:t>Accède à </a:t>
+            </a:r>
+          </a:p>
+        </p:txBody>
+      </p:sp>
+      <p:cxnSp>
+        <p:nvCxnSpPr>
+          <p:cNvPr id="28" name="Connecteur droit avec flèche 27">
+            <a:extLst>
+              <a:ext uri="{FF2B5EF4-FFF2-40B4-BE49-F238E27FC236}">
+                <a16:creationId xmlns:a16="http://schemas.microsoft.com/office/drawing/2014/main" id="{3121E529-AF40-4649-BB8E-571FCE74ABC4}"/>
+              </a:ext>
+            </a:extLst>
+          </p:cNvPr>
+          <p:cNvCxnSpPr>
+            <a:cxnSpLocks/>
+            <a:stCxn id="14" idx="0"/>
+            <a:endCxn id="4" idx="2"/>
+          </p:cNvCxnSpPr>
+          <p:nvPr/>
+        </p:nvCxnSpPr>
+        <p:spPr>
+          <a:xfrm>
+            <a:off x="2453788" y="1588905"/>
+            <a:ext cx="5917081" cy="0"/>
+          </a:xfrm>
+          <a:prstGeom prst="straightConnector1">
+            <a:avLst/>
+          </a:prstGeom>
+          <a:ln w="25400">
+            <a:tailEnd type="triangle" w="lg" len="lg"/>
+          </a:ln>
+        </p:spPr>
+        <p:style>
+          <a:lnRef idx="1">
+            <a:schemeClr val="accent1"/>
+          </a:lnRef>
+          <a:fillRef idx="0">
+            <a:schemeClr val="accent1"/>
+          </a:fillRef>
+          <a:effectRef idx="0">
+            <a:schemeClr val="accent1"/>
+          </a:effectRef>
+          <a:fontRef idx="minor">
+            <a:schemeClr val="tx1"/>
+          </a:fontRef>
+        </p:style>
+      </p:cxnSp>
+      <p:sp>
+        <p:nvSpPr>
+          <p:cNvPr id="31" name="ZoneTexte 30">
+            <a:extLst>
+              <a:ext uri="{FF2B5EF4-FFF2-40B4-BE49-F238E27FC236}">
+                <a16:creationId xmlns:a16="http://schemas.microsoft.com/office/drawing/2014/main" id="{2CAF28D6-A175-4CC5-AE27-CB070A2A7DA7}"/>
+              </a:ext>
+            </a:extLst>
+          </p:cNvPr>
+          <p:cNvSpPr txBox="1"/>
+          <p:nvPr/>
+        </p:nvSpPr>
+        <p:spPr>
+          <a:xfrm>
+            <a:off x="3028885" y="1301631"/>
+            <a:ext cx="1071127" cy="276999"/>
+          </a:xfrm>
+          <a:prstGeom prst="rect">
+            <a:avLst/>
+          </a:prstGeom>
+          <a:noFill/>
+        </p:spPr>
+        <p:txBody>
+          <a:bodyPr wrap="none" rtlCol="0">
+            <a:spAutoFit/>
+          </a:bodyPr>
+          <a:lstStyle/>
+          <a:p>
+            <a:r>
+              <a:rPr lang="fr-FR" sz="1200" dirty="0"/>
+              <a:t>Accède à (P2) </a:t>
             </a:r>
           </a:p>
         </p:txBody>

</xml_diff>